<commit_message>
updated presentation - and initial position tracking
</commit_message>
<xml_diff>
--- a/openoptions/docs/OpenOptions.pptx
+++ b/openoptions/docs/OpenOptions.pptx
@@ -16,9 +16,9 @@
   </p:handoutMasterIdLst>
   <p:sldIdLst>
     <p:sldId id="256" r:id="rId7"/>
-    <p:sldId id="258" r:id="rId8"/>
-    <p:sldId id="264" r:id="rId9"/>
-    <p:sldId id="265" r:id="rId10"/>
+    <p:sldId id="264" r:id="rId8"/>
+    <p:sldId id="265" r:id="rId9"/>
+    <p:sldId id="258" r:id="rId10"/>
     <p:sldId id="259" r:id="rId11"/>
     <p:sldId id="257" r:id="rId12"/>
     <p:sldId id="260" r:id="rId13"/>
@@ -22002,7 +22002,7 @@
             <a:fld id="{BE1686F5-D9B0-4B87-9E68-28AD15F2A4F1}" type="slidenum">
               <a:rPr lang="en-US" smtClean="0"/>
               <a:pPr/>
-              <a:t>2</a:t>
+              <a:t>4</a:t>
             </a:fld>
             <a:endParaRPr lang="en-US"/>
           </a:p>
@@ -44299,207 +44299,6 @@
       </p:grpSpPr>
       <p:sp>
         <p:nvSpPr>
-          <p:cNvPr id="2" name="Rectangle 2"/>
-          <p:cNvSpPr>
-            <a:spLocks noGrp="1"/>
-          </p:cNvSpPr>
-          <p:nvPr>
-            <p:ph type="title"/>
-          </p:nvPr>
-        </p:nvSpPr>
-        <p:spPr/>
-        <p:txBody>
-          <a:bodyPr/>
-          <a:lstStyle/>
-          <a:p>
-            <a:r>
-              <a:rPr lang="en-US" dirty="0" smtClean="0">
-                <a:effectLst>
-                  <a:outerShdw blurRad="38100" dist="38100" dir="2700000" algn="tl">
-                    <a:srgbClr val="000000">
-                      <a:alpha val="43137"/>
-                    </a:srgbClr>
-                  </a:outerShdw>
-                </a:effectLst>
-              </a:rPr>
-              <a:t>Decisions, Decisions…</a:t>
-            </a:r>
-            <a:endParaRPr lang="en-US" dirty="0">
-              <a:effectLst>
-                <a:outerShdw blurRad="38100" dist="38100" dir="2700000" algn="tl">
-                  <a:srgbClr val="000000">
-                    <a:alpha val="43137"/>
-                  </a:srgbClr>
-                </a:outerShdw>
-              </a:effectLst>
-            </a:endParaRPr>
-          </a:p>
-        </p:txBody>
-      </p:sp>
-      <p:graphicFrame>
-        <p:nvGraphicFramePr>
-          <p:cNvPr id="5" name="Content Placeholder 4"/>
-          <p:cNvGraphicFramePr>
-            <a:graphicFrameLocks noGrp="1"/>
-          </p:cNvGraphicFramePr>
-          <p:nvPr>
-            <p:ph idx="1"/>
-            <p:extLst>
-              <p:ext uri="{D42A27DB-BD31-4B8C-83A1-F6EECF244321}">
-                <p14:modId xmlns:p14="http://schemas.microsoft.com/office/powerpoint/2010/main" val="460124129"/>
-              </p:ext>
-            </p:extLst>
-          </p:nvPr>
-        </p:nvGraphicFramePr>
-        <p:xfrm>
-          <a:off x="1524000" y="1590020"/>
-          <a:ext cx="6400800" cy="4963180"/>
-        </p:xfrm>
-        <a:graphic>
-          <a:graphicData uri="http://schemas.openxmlformats.org/drawingml/2006/diagram">
-            <dgm:relIds xmlns:dgm="http://schemas.openxmlformats.org/drawingml/2006/diagram" xmlns:r="http://schemas.openxmlformats.org/officeDocument/2006/relationships" r:dm="rId3" r:lo="rId4" r:qs="rId5" r:cs="rId6"/>
-          </a:graphicData>
-        </a:graphic>
-      </p:graphicFrame>
-      <p:sp>
-        <p:nvSpPr>
-          <p:cNvPr id="7" name="Rectangle 6"/>
-          <p:cNvSpPr/>
-          <p:nvPr/>
-        </p:nvSpPr>
-        <p:spPr>
-          <a:xfrm>
-            <a:off x="7772400" y="2971800"/>
-            <a:ext cx="740908" cy="1569660"/>
-          </a:xfrm>
-          <a:prstGeom prst="rect">
-            <a:avLst/>
-          </a:prstGeom>
-          <a:noFill/>
-        </p:spPr>
-        <p:txBody>
-          <a:bodyPr wrap="none" lIns="91440" tIns="45720" rIns="91440" bIns="45720">
-            <a:spAutoFit/>
-          </a:bodyPr>
-          <a:lstStyle/>
-          <a:p>
-            <a:pPr algn="ctr"/>
-            <a:r>
-              <a:rPr lang="en-US" sz="9600" b="1" cap="none" spc="0" dirty="0" smtClean="0">
-                <a:ln w="1905"/>
-                <a:gradFill>
-                  <a:gsLst>
-                    <a:gs pos="0">
-                      <a:schemeClr val="accent6">
-                        <a:shade val="20000"/>
-                        <a:satMod val="200000"/>
-                      </a:schemeClr>
-                    </a:gs>
-                    <a:gs pos="78000">
-                      <a:schemeClr val="accent6">
-                        <a:tint val="90000"/>
-                        <a:shade val="89000"/>
-                        <a:satMod val="220000"/>
-                      </a:schemeClr>
-                    </a:gs>
-                    <a:gs pos="100000">
-                      <a:schemeClr val="accent6">
-                        <a:tint val="12000"/>
-                        <a:satMod val="255000"/>
-                      </a:schemeClr>
-                    </a:gs>
-                  </a:gsLst>
-                  <a:lin ang="5400000"/>
-                </a:gradFill>
-                <a:effectLst>
-                  <a:innerShdw blurRad="69850" dist="43180" dir="5400000">
-                    <a:srgbClr val="000000">
-                      <a:alpha val="65000"/>
-                    </a:srgbClr>
-                  </a:innerShdw>
-                </a:effectLst>
-              </a:rPr>
-              <a:t>?</a:t>
-            </a:r>
-            <a:endParaRPr lang="en-US" sz="9600" b="1" cap="none" spc="0" dirty="0">
-              <a:ln w="1905"/>
-              <a:gradFill>
-                <a:gsLst>
-                  <a:gs pos="0">
-                    <a:schemeClr val="accent6">
-                      <a:shade val="20000"/>
-                      <a:satMod val="200000"/>
-                    </a:schemeClr>
-                  </a:gs>
-                  <a:gs pos="78000">
-                    <a:schemeClr val="accent6">
-                      <a:tint val="90000"/>
-                      <a:shade val="89000"/>
-                      <a:satMod val="220000"/>
-                    </a:schemeClr>
-                  </a:gs>
-                  <a:gs pos="100000">
-                    <a:schemeClr val="accent6">
-                      <a:tint val="12000"/>
-                      <a:satMod val="255000"/>
-                    </a:schemeClr>
-                  </a:gs>
-                </a:gsLst>
-                <a:lin ang="5400000"/>
-              </a:gradFill>
-              <a:effectLst>
-                <a:innerShdw blurRad="69850" dist="43180" dir="5400000">
-                  <a:srgbClr val="000000">
-                    <a:alpha val="65000"/>
-                  </a:srgbClr>
-                </a:innerShdw>
-              </a:effectLst>
-            </a:endParaRPr>
-          </a:p>
-        </p:txBody>
-      </p:sp>
-    </p:spTree>
-  </p:cSld>
-  <p:clrMapOvr>
-    <a:masterClrMapping/>
-  </p:clrMapOvr>
-  <mc:AlternateContent xmlns:mc="http://schemas.openxmlformats.org/markup-compatibility/2006">
-    <mc:Choice xmlns:p14="http://schemas.microsoft.com/office/powerpoint/2010/main" Requires="p14">
-      <p:transition spd="slow" p14:dur="2000"/>
-    </mc:Choice>
-    <mc:Fallback>
-      <p:transition spd="slow"/>
-    </mc:Fallback>
-  </mc:AlternateContent>
-  <p:timing>
-    <p:tnLst>
-      <p:par>
-        <p:cTn id="1" dur="indefinite" restart="never" nodeType="tmRoot"/>
-      </p:par>
-    </p:tnLst>
-  </p:timing>
-</p:sld>
-</file>
-
-<file path=ppt/slides/slide3.xml><?xml version="1.0" encoding="utf-8"?>
-<p:sld xmlns:a="http://schemas.openxmlformats.org/drawingml/2006/main" xmlns:r="http://schemas.openxmlformats.org/officeDocument/2006/relationships" xmlns:p="http://schemas.openxmlformats.org/presentationml/2006/main">
-  <p:cSld>
-    <p:spTree>
-      <p:nvGrpSpPr>
-        <p:cNvPr id="1" name=""/>
-        <p:cNvGrpSpPr/>
-        <p:nvPr/>
-      </p:nvGrpSpPr>
-      <p:grpSpPr>
-        <a:xfrm>
-          <a:off x="0" y="0"/>
-          <a:ext cx="0" cy="0"/>
-          <a:chOff x="0" y="0"/>
-          <a:chExt cx="0" cy="0"/>
-        </a:xfrm>
-      </p:grpSpPr>
-      <p:sp>
-        <p:nvSpPr>
           <p:cNvPr id="2" name="Title 1"/>
           <p:cNvSpPr>
             <a:spLocks noGrp="1"/>
@@ -44582,7 +44381,7 @@
 </p:sld>
 </file>
 
-<file path=ppt/slides/slide4.xml><?xml version="1.0" encoding="utf-8"?>
+<file path=ppt/slides/slide3.xml><?xml version="1.0" encoding="utf-8"?>
 <p:sld xmlns:a="http://schemas.openxmlformats.org/drawingml/2006/main" xmlns:r="http://schemas.openxmlformats.org/officeDocument/2006/relationships" xmlns:p="http://schemas.openxmlformats.org/presentationml/2006/main">
   <p:cSld>
     <p:spTree>
@@ -44696,6 +44495,207 @@
   <p:clrMapOvr>
     <a:masterClrMapping/>
   </p:clrMapOvr>
+  <p:timing>
+    <p:tnLst>
+      <p:par>
+        <p:cTn id="1" dur="indefinite" restart="never" nodeType="tmRoot"/>
+      </p:par>
+    </p:tnLst>
+  </p:timing>
+</p:sld>
+</file>
+
+<file path=ppt/slides/slide4.xml><?xml version="1.0" encoding="utf-8"?>
+<p:sld xmlns:a="http://schemas.openxmlformats.org/drawingml/2006/main" xmlns:r="http://schemas.openxmlformats.org/officeDocument/2006/relationships" xmlns:p="http://schemas.openxmlformats.org/presentationml/2006/main">
+  <p:cSld>
+    <p:spTree>
+      <p:nvGrpSpPr>
+        <p:cNvPr id="1" name=""/>
+        <p:cNvGrpSpPr/>
+        <p:nvPr/>
+      </p:nvGrpSpPr>
+      <p:grpSpPr>
+        <a:xfrm>
+          <a:off x="0" y="0"/>
+          <a:ext cx="0" cy="0"/>
+          <a:chOff x="0" y="0"/>
+          <a:chExt cx="0" cy="0"/>
+        </a:xfrm>
+      </p:grpSpPr>
+      <p:sp>
+        <p:nvSpPr>
+          <p:cNvPr id="2" name="Rectangle 2"/>
+          <p:cNvSpPr>
+            <a:spLocks noGrp="1"/>
+          </p:cNvSpPr>
+          <p:nvPr>
+            <p:ph type="title"/>
+          </p:nvPr>
+        </p:nvSpPr>
+        <p:spPr/>
+        <p:txBody>
+          <a:bodyPr/>
+          <a:lstStyle/>
+          <a:p>
+            <a:r>
+              <a:rPr lang="en-US" dirty="0" smtClean="0">
+                <a:effectLst>
+                  <a:outerShdw blurRad="38100" dist="38100" dir="2700000" algn="tl">
+                    <a:srgbClr val="000000">
+                      <a:alpha val="43137"/>
+                    </a:srgbClr>
+                  </a:outerShdw>
+                </a:effectLst>
+              </a:rPr>
+              <a:t>Decisions, Decisions…</a:t>
+            </a:r>
+            <a:endParaRPr lang="en-US" dirty="0">
+              <a:effectLst>
+                <a:outerShdw blurRad="38100" dist="38100" dir="2700000" algn="tl">
+                  <a:srgbClr val="000000">
+                    <a:alpha val="43137"/>
+                  </a:srgbClr>
+                </a:outerShdw>
+              </a:effectLst>
+            </a:endParaRPr>
+          </a:p>
+        </p:txBody>
+      </p:sp>
+      <p:graphicFrame>
+        <p:nvGraphicFramePr>
+          <p:cNvPr id="5" name="Content Placeholder 4"/>
+          <p:cNvGraphicFramePr>
+            <a:graphicFrameLocks noGrp="1"/>
+          </p:cNvGraphicFramePr>
+          <p:nvPr>
+            <p:ph idx="1"/>
+            <p:extLst>
+              <p:ext uri="{D42A27DB-BD31-4B8C-83A1-F6EECF244321}">
+                <p14:modId xmlns:p14="http://schemas.microsoft.com/office/powerpoint/2010/main" val="460124129"/>
+              </p:ext>
+            </p:extLst>
+          </p:nvPr>
+        </p:nvGraphicFramePr>
+        <p:xfrm>
+          <a:off x="1524000" y="1590020"/>
+          <a:ext cx="6400800" cy="4963180"/>
+        </p:xfrm>
+        <a:graphic>
+          <a:graphicData uri="http://schemas.openxmlformats.org/drawingml/2006/diagram">
+            <dgm:relIds xmlns:dgm="http://schemas.openxmlformats.org/drawingml/2006/diagram" xmlns:r="http://schemas.openxmlformats.org/officeDocument/2006/relationships" r:dm="rId3" r:lo="rId4" r:qs="rId5" r:cs="rId6"/>
+          </a:graphicData>
+        </a:graphic>
+      </p:graphicFrame>
+      <p:sp>
+        <p:nvSpPr>
+          <p:cNvPr id="7" name="Rectangle 6"/>
+          <p:cNvSpPr/>
+          <p:nvPr/>
+        </p:nvSpPr>
+        <p:spPr>
+          <a:xfrm>
+            <a:off x="7772400" y="2971800"/>
+            <a:ext cx="740908" cy="1569660"/>
+          </a:xfrm>
+          <a:prstGeom prst="rect">
+            <a:avLst/>
+          </a:prstGeom>
+          <a:noFill/>
+        </p:spPr>
+        <p:txBody>
+          <a:bodyPr wrap="none" lIns="91440" tIns="45720" rIns="91440" bIns="45720">
+            <a:spAutoFit/>
+          </a:bodyPr>
+          <a:lstStyle/>
+          <a:p>
+            <a:pPr algn="ctr"/>
+            <a:r>
+              <a:rPr lang="en-US" sz="9600" b="1" cap="none" spc="0" dirty="0" smtClean="0">
+                <a:ln w="1905"/>
+                <a:gradFill>
+                  <a:gsLst>
+                    <a:gs pos="0">
+                      <a:schemeClr val="accent6">
+                        <a:shade val="20000"/>
+                        <a:satMod val="200000"/>
+                      </a:schemeClr>
+                    </a:gs>
+                    <a:gs pos="78000">
+                      <a:schemeClr val="accent6">
+                        <a:tint val="90000"/>
+                        <a:shade val="89000"/>
+                        <a:satMod val="220000"/>
+                      </a:schemeClr>
+                    </a:gs>
+                    <a:gs pos="100000">
+                      <a:schemeClr val="accent6">
+                        <a:tint val="12000"/>
+                        <a:satMod val="255000"/>
+                      </a:schemeClr>
+                    </a:gs>
+                  </a:gsLst>
+                  <a:lin ang="5400000"/>
+                </a:gradFill>
+                <a:effectLst>
+                  <a:innerShdw blurRad="69850" dist="43180" dir="5400000">
+                    <a:srgbClr val="000000">
+                      <a:alpha val="65000"/>
+                    </a:srgbClr>
+                  </a:innerShdw>
+                </a:effectLst>
+              </a:rPr>
+              <a:t>?</a:t>
+            </a:r>
+            <a:endParaRPr lang="en-US" sz="9600" b="1" cap="none" spc="0" dirty="0">
+              <a:ln w="1905"/>
+              <a:gradFill>
+                <a:gsLst>
+                  <a:gs pos="0">
+                    <a:schemeClr val="accent6">
+                      <a:shade val="20000"/>
+                      <a:satMod val="200000"/>
+                    </a:schemeClr>
+                  </a:gs>
+                  <a:gs pos="78000">
+                    <a:schemeClr val="accent6">
+                      <a:tint val="90000"/>
+                      <a:shade val="89000"/>
+                      <a:satMod val="220000"/>
+                    </a:schemeClr>
+                  </a:gs>
+                  <a:gs pos="100000">
+                    <a:schemeClr val="accent6">
+                      <a:tint val="12000"/>
+                      <a:satMod val="255000"/>
+                    </a:schemeClr>
+                  </a:gs>
+                </a:gsLst>
+                <a:lin ang="5400000"/>
+              </a:gradFill>
+              <a:effectLst>
+                <a:innerShdw blurRad="69850" dist="43180" dir="5400000">
+                  <a:srgbClr val="000000">
+                    <a:alpha val="65000"/>
+                  </a:srgbClr>
+                </a:innerShdw>
+              </a:effectLst>
+            </a:endParaRPr>
+          </a:p>
+        </p:txBody>
+      </p:sp>
+    </p:spTree>
+  </p:cSld>
+  <p:clrMapOvr>
+    <a:masterClrMapping/>
+  </p:clrMapOvr>
+  <mc:AlternateContent xmlns:mc="http://schemas.openxmlformats.org/markup-compatibility/2006">
+    <mc:Choice xmlns:p14="http://schemas.microsoft.com/office/powerpoint/2010/main" Requires="p14">
+      <p:transition spd="slow" p14:dur="2000"/>
+    </mc:Choice>
+    <mc:Fallback>
+      <p:transition spd="slow"/>
+    </mc:Fallback>
+  </mc:AlternateContent>
   <p:timing>
     <p:tnLst>
       <p:par>

</xml_diff>

<commit_message>
updated presentation with technology details
</commit_message>
<xml_diff>
--- a/openoptions/docs/OpenOptions.pptx
+++ b/openoptions/docs/OpenOptions.pptx
@@ -9,10 +9,10 @@
     <p:sldMasterId id="2147483840" r:id="rId6"/>
   </p:sldMasterIdLst>
   <p:notesMasterIdLst>
-    <p:notesMasterId r:id="rId17"/>
+    <p:notesMasterId r:id="rId19"/>
   </p:notesMasterIdLst>
   <p:handoutMasterIdLst>
-    <p:handoutMasterId r:id="rId18"/>
+    <p:handoutMasterId r:id="rId20"/>
   </p:handoutMasterIdLst>
   <p:sldIdLst>
     <p:sldId id="256" r:id="rId7"/>
@@ -22,9 +22,11 @@
     <p:sldId id="259" r:id="rId11"/>
     <p:sldId id="257" r:id="rId12"/>
     <p:sldId id="260" r:id="rId13"/>
-    <p:sldId id="262" r:id="rId14"/>
-    <p:sldId id="261" r:id="rId15"/>
-    <p:sldId id="263" r:id="rId16"/>
+    <p:sldId id="267" r:id="rId14"/>
+    <p:sldId id="262" r:id="rId15"/>
+    <p:sldId id="261" r:id="rId16"/>
+    <p:sldId id="266" r:id="rId17"/>
+    <p:sldId id="263" r:id="rId18"/>
   </p:sldIdLst>
   <p:sldSz cx="9144000" cy="6858000" type="screen4x3"/>
   <p:notesSz cx="6997700" cy="9283700"/>
@@ -4041,6 +4043,13 @@
         </dgm:presLayoutVars>
       </dgm:prSet>
       <dgm:spPr/>
+      <dgm:t>
+        <a:bodyPr/>
+        <a:lstStyle/>
+        <a:p>
+          <a:endParaRPr lang="en-US"/>
+        </a:p>
+      </dgm:t>
     </dgm:pt>
     <dgm:pt modelId="{BCBE17F1-0F84-48C4-A52C-7FDF6EC88086}" type="pres">
       <dgm:prSet presAssocID="{ED320231-47EC-4DF1-9FB8-BD44F0868258}" presName="composite" presStyleCnt="0"/>
@@ -4148,6 +4157,13 @@
         </dgm:presLayoutVars>
       </dgm:prSet>
       <dgm:spPr/>
+      <dgm:t>
+        <a:bodyPr/>
+        <a:lstStyle/>
+        <a:p>
+          <a:endParaRPr lang="en-US"/>
+        </a:p>
+      </dgm:t>
     </dgm:pt>
     <dgm:pt modelId="{3E04C3CA-278D-4A85-BCE1-CA0A716BFD82}" type="pres">
       <dgm:prSet presAssocID="{1A9D4B4B-8BBB-42AE-84B3-466E680F5F94}" presName="Child2Accent1" presStyleLbl="alignNode1" presStyleIdx="20" presStyleCnt="34"/>
@@ -4186,6 +4202,13 @@
         </dgm:presLayoutVars>
       </dgm:prSet>
       <dgm:spPr/>
+      <dgm:t>
+        <a:bodyPr/>
+        <a:lstStyle/>
+        <a:p>
+          <a:endParaRPr lang="en-US"/>
+        </a:p>
+      </dgm:t>
     </dgm:pt>
     <dgm:pt modelId="{500F1BD4-D51C-4A2E-8750-8720F3AED704}" type="pres">
       <dgm:prSet presAssocID="{2900D742-A78B-4209-91D2-10336A3FDC07}" presName="Child3Accent1" presStyleLbl="alignNode1" presStyleIdx="27" presStyleCnt="34"/>
@@ -4224,6 +4247,13 @@
         </dgm:presLayoutVars>
       </dgm:prSet>
       <dgm:spPr/>
+      <dgm:t>
+        <a:bodyPr/>
+        <a:lstStyle/>
+        <a:p>
+          <a:endParaRPr lang="en-US"/>
+        </a:p>
+      </dgm:t>
     </dgm:pt>
   </dgm:ptLst>
   <dgm:cxnLst>
@@ -4587,15 +4617,15 @@
     </dgm:pt>
   </dgm:ptLst>
   <dgm:cxnLst>
+    <dgm:cxn modelId="{2AE7E93A-B8BD-411B-B984-E12F86522AC5}" srcId="{5C66FDC3-2A01-413D-9B40-CF9CCA3FC227}" destId="{F9B8E1D9-C748-48FC-A725-2E22E9830EA5}" srcOrd="0" destOrd="0" parTransId="{D297A700-36F2-47A2-A7D8-F5611AEA3310}" sibTransId="{FC0DF4C9-16DD-4481-A318-10249DBD9843}"/>
     <dgm:cxn modelId="{88AA559D-964F-4A23-83DA-28BAD02D2422}" type="presOf" srcId="{CD699A2E-9BC6-48DA-A353-7AE5E36094C2}" destId="{2FB823A9-59DD-41A2-BA60-E7A37DDB037D}" srcOrd="0" destOrd="0" presId="urn:microsoft.com/office/officeart/2005/8/layout/funnel1#1"/>
+    <dgm:cxn modelId="{CC62D72D-2A78-4695-BC2F-2D02CE05A4DD}" type="presOf" srcId="{7867B346-CC9E-44CB-A117-1A1F38BDF7A9}" destId="{01DEDD22-553A-454C-8CB4-8BDE2171A8D5}" srcOrd="0" destOrd="0" presId="urn:microsoft.com/office/officeart/2005/8/layout/funnel1#1"/>
+    <dgm:cxn modelId="{273F2338-0745-457D-8357-2A0089BF1117}" srcId="{5C66FDC3-2A01-413D-9B40-CF9CCA3FC227}" destId="{9BFDE9DE-5854-4C8A-8A3A-42146DC8337F}" srcOrd="3" destOrd="0" parTransId="{8F906776-B064-474F-8626-CE4B25C07E3F}" sibTransId="{0DE2D488-41B4-466C-A2B9-60AE8F96125B}"/>
     <dgm:cxn modelId="{DC060B8B-9C7B-4195-92CA-17E40231AC22}" srcId="{5C66FDC3-2A01-413D-9B40-CF9CCA3FC227}" destId="{7867B346-CC9E-44CB-A117-1A1F38BDF7A9}" srcOrd="2" destOrd="0" parTransId="{4D4D5D1D-406B-467E-9050-28D33A614A8D}" sibTransId="{205C03FA-F87F-48DC-A894-9DA2EAD33C04}"/>
     <dgm:cxn modelId="{F697751B-0608-45EE-85BE-2CD41827BC66}" type="presOf" srcId="{5C66FDC3-2A01-413D-9B40-CF9CCA3FC227}" destId="{FFD4AA85-D9A8-41DC-807B-1681B2B0C678}" srcOrd="0" destOrd="0" presId="urn:microsoft.com/office/officeart/2005/8/layout/funnel1#1"/>
-    <dgm:cxn modelId="{273F2338-0745-457D-8357-2A0089BF1117}" srcId="{5C66FDC3-2A01-413D-9B40-CF9CCA3FC227}" destId="{9BFDE9DE-5854-4C8A-8A3A-42146DC8337F}" srcOrd="3" destOrd="0" parTransId="{8F906776-B064-474F-8626-CE4B25C07E3F}" sibTransId="{0DE2D488-41B4-466C-A2B9-60AE8F96125B}"/>
-    <dgm:cxn modelId="{2AE7E93A-B8BD-411B-B984-E12F86522AC5}" srcId="{5C66FDC3-2A01-413D-9B40-CF9CCA3FC227}" destId="{F9B8E1D9-C748-48FC-A725-2E22E9830EA5}" srcOrd="0" destOrd="0" parTransId="{D297A700-36F2-47A2-A7D8-F5611AEA3310}" sibTransId="{FC0DF4C9-16DD-4481-A318-10249DBD9843}"/>
     <dgm:cxn modelId="{B1F49099-A3D7-4C51-A99B-D126A30ECA04}" srcId="{5C66FDC3-2A01-413D-9B40-CF9CCA3FC227}" destId="{CD699A2E-9BC6-48DA-A353-7AE5E36094C2}" srcOrd="1" destOrd="0" parTransId="{14E9E9A3-77B2-40EA-B914-E54F8807358C}" sibTransId="{E14C4834-BED4-4044-8A9A-5EB7FE82D3F8}"/>
+    <dgm:cxn modelId="{08ABA17F-DCF3-45D8-8A9F-C33B259BAF37}" type="presOf" srcId="{9BFDE9DE-5854-4C8A-8A3A-42146DC8337F}" destId="{B02D1F6B-F0F8-4CDA-94E3-6586D70F350F}" srcOrd="0" destOrd="0" presId="urn:microsoft.com/office/officeart/2005/8/layout/funnel1#1"/>
     <dgm:cxn modelId="{36643C94-694D-4870-A860-AB444686A6D2}" type="presOf" srcId="{F9B8E1D9-C748-48FC-A725-2E22E9830EA5}" destId="{51FD6B82-684A-43EE-BA07-CF6B818CBE56}" srcOrd="0" destOrd="0" presId="urn:microsoft.com/office/officeart/2005/8/layout/funnel1#1"/>
-    <dgm:cxn modelId="{CC62D72D-2A78-4695-BC2F-2D02CE05A4DD}" type="presOf" srcId="{7867B346-CC9E-44CB-A117-1A1F38BDF7A9}" destId="{01DEDD22-553A-454C-8CB4-8BDE2171A8D5}" srcOrd="0" destOrd="0" presId="urn:microsoft.com/office/officeart/2005/8/layout/funnel1#1"/>
-    <dgm:cxn modelId="{08ABA17F-DCF3-45D8-8A9F-C33B259BAF37}" type="presOf" srcId="{9BFDE9DE-5854-4C8A-8A3A-42146DC8337F}" destId="{B02D1F6B-F0F8-4CDA-94E3-6586D70F350F}" srcOrd="0" destOrd="0" presId="urn:microsoft.com/office/officeart/2005/8/layout/funnel1#1"/>
     <dgm:cxn modelId="{32687F6E-5A0A-4771-AB39-34CA8CE133B9}" type="presParOf" srcId="{FFD4AA85-D9A8-41DC-807B-1681B2B0C678}" destId="{3D513930-97ED-4E4E-9943-CF42B65C3D5F}" srcOrd="0" destOrd="0" presId="urn:microsoft.com/office/officeart/2005/8/layout/funnel1#1"/>
     <dgm:cxn modelId="{4F0277A8-B225-4B5A-86B3-89B54092C3E4}" type="presParOf" srcId="{FFD4AA85-D9A8-41DC-807B-1681B2B0C678}" destId="{6953BEB1-F1B0-4471-9842-CD5AA6057D87}" srcOrd="1" destOrd="0" presId="urn:microsoft.com/office/officeart/2005/8/layout/funnel1#1"/>
     <dgm:cxn modelId="{94AC9708-3929-47DC-A8E2-88B74035F491}" type="presParOf" srcId="{FFD4AA85-D9A8-41DC-807B-1681B2B0C678}" destId="{B02D1F6B-F0F8-4CDA-94E3-6586D70F350F}" srcOrd="2" destOrd="0" presId="urn:microsoft.com/office/officeart/2005/8/layout/funnel1#1"/>
@@ -4786,14 +4816,35 @@
         </dgm:presLayoutVars>
       </dgm:prSet>
       <dgm:spPr/>
+      <dgm:t>
+        <a:bodyPr/>
+        <a:lstStyle/>
+        <a:p>
+          <a:endParaRPr lang="en-US"/>
+        </a:p>
+      </dgm:t>
     </dgm:pt>
     <dgm:pt modelId="{D7B7DE6C-A529-4297-A53E-0C31959CBC32}" type="pres">
       <dgm:prSet presAssocID="{FBD5590D-9049-455C-986B-CF34495E2695}" presName="centerShape" presStyleLbl="node0" presStyleIdx="0" presStyleCnt="1"/>
       <dgm:spPr/>
+      <dgm:t>
+        <a:bodyPr/>
+        <a:lstStyle/>
+        <a:p>
+          <a:endParaRPr lang="en-US"/>
+        </a:p>
+      </dgm:t>
     </dgm:pt>
     <dgm:pt modelId="{FB668947-469B-4595-BBCE-569FE889209C}" type="pres">
       <dgm:prSet presAssocID="{23F1AF1B-3152-4E3A-BF40-0EB2DEF91F39}" presName="parTrans" presStyleLbl="bgSibTrans2D1" presStyleIdx="0" presStyleCnt="3"/>
       <dgm:spPr/>
+      <dgm:t>
+        <a:bodyPr/>
+        <a:lstStyle/>
+        <a:p>
+          <a:endParaRPr lang="en-US"/>
+        </a:p>
+      </dgm:t>
     </dgm:pt>
     <dgm:pt modelId="{94C5F997-DE63-482E-AF05-00760AAB08C3}" type="pres">
       <dgm:prSet presAssocID="{F3B8A8AD-C742-4F19-952A-8229531D29B3}" presName="node" presStyleLbl="node1" presStyleIdx="0" presStyleCnt="3">
@@ -4813,6 +4864,13 @@
     <dgm:pt modelId="{06AE91DD-1F91-4147-962E-C95DB2D12FC9}" type="pres">
       <dgm:prSet presAssocID="{A7610A14-5555-434F-A1E0-EE951D9D3FAC}" presName="parTrans" presStyleLbl="bgSibTrans2D1" presStyleIdx="1" presStyleCnt="3"/>
       <dgm:spPr/>
+      <dgm:t>
+        <a:bodyPr/>
+        <a:lstStyle/>
+        <a:p>
+          <a:endParaRPr lang="en-US"/>
+        </a:p>
+      </dgm:t>
     </dgm:pt>
     <dgm:pt modelId="{02D331E4-9775-463A-9ADD-605250613E10}" type="pres">
       <dgm:prSet presAssocID="{493E3EF7-3080-4F97-9207-86EEAED2F9BD}" presName="node" presStyleLbl="node1" presStyleIdx="1" presStyleCnt="3">
@@ -4821,10 +4879,24 @@
         </dgm:presLayoutVars>
       </dgm:prSet>
       <dgm:spPr/>
+      <dgm:t>
+        <a:bodyPr/>
+        <a:lstStyle/>
+        <a:p>
+          <a:endParaRPr lang="en-US"/>
+        </a:p>
+      </dgm:t>
     </dgm:pt>
     <dgm:pt modelId="{03611E55-5232-4828-928A-ACC3E9518C18}" type="pres">
       <dgm:prSet presAssocID="{4A761AE8-6667-4662-818B-6E6302AAC697}" presName="parTrans" presStyleLbl="bgSibTrans2D1" presStyleIdx="2" presStyleCnt="3"/>
       <dgm:spPr/>
+      <dgm:t>
+        <a:bodyPr/>
+        <a:lstStyle/>
+        <a:p>
+          <a:endParaRPr lang="en-US"/>
+        </a:p>
+      </dgm:t>
     </dgm:pt>
     <dgm:pt modelId="{B57C308D-8F9B-4369-AE41-806F2BE72432}" type="pres">
       <dgm:prSet presAssocID="{338156B8-868C-4C35-99FD-9DD8BC1CA695}" presName="node" presStyleLbl="node1" presStyleIdx="2" presStyleCnt="3">
@@ -4833,6 +4905,13 @@
         </dgm:presLayoutVars>
       </dgm:prSet>
       <dgm:spPr/>
+      <dgm:t>
+        <a:bodyPr/>
+        <a:lstStyle/>
+        <a:p>
+          <a:endParaRPr lang="en-US"/>
+        </a:p>
+      </dgm:t>
     </dgm:pt>
   </dgm:ptLst>
   <dgm:cxnLst>
@@ -5801,49 +5880,49 @@
     </dgm:pt>
   </dgm:ptLst>
   <dgm:cxnLst>
+    <dgm:cxn modelId="{8C281292-E9B7-461E-904F-D1D4C623F28B}" srcId="{B61CEB4B-F8AB-4EA2-9D71-A11D04A293F2}" destId="{AD80D54B-A264-4AF7-9643-086ACFDC240C}" srcOrd="0" destOrd="0" parTransId="{BFD993D0-F061-48E7-96F3-B5FA6796258E}" sibTransId="{8E44A573-9EFC-4361-A76E-A3C7E86E6F09}"/>
+    <dgm:cxn modelId="{867C763C-18A0-440F-9283-6E0B99B9959B}" srcId="{AD80D54B-A264-4AF7-9643-086ACFDC240C}" destId="{2FF9D139-D4E4-44B3-A42A-B9C4C1B9C0BF}" srcOrd="2" destOrd="0" parTransId="{7D5B630D-B089-4091-8DD9-503E14088ECE}" sibTransId="{E1290CCC-165D-48E7-B339-289912C8811F}"/>
+    <dgm:cxn modelId="{228E93E6-0774-4E6A-9B26-ED2139424C61}" srcId="{6C569E96-FE13-4534-A102-A6AE3B21227F}" destId="{1D962B4C-8637-4AB6-8F6A-A02C9A12D911}" srcOrd="0" destOrd="0" parTransId="{02FCD9AB-677E-4492-8928-C6D38DE07892}" sibTransId="{0178877C-6897-46D0-BB03-3CA1D6B340CC}"/>
+    <dgm:cxn modelId="{6D789034-8EC0-41F9-BDB2-20BDF87EE493}" srcId="{B61CEB4B-F8AB-4EA2-9D71-A11D04A293F2}" destId="{75B3E0C6-864D-47D2-BF91-C4509DD562BE}" srcOrd="2" destOrd="0" parTransId="{82028262-E32E-4AB1-9C09-1B29AD36A9CB}" sibTransId="{5064DFDC-97AC-4C81-B96D-20C88F87C104}"/>
     <dgm:cxn modelId="{2879FB5B-1449-48CC-B368-8984FCCDDAF8}" srcId="{1C3CAE02-1C1A-48AD-9A36-B2822FDBFD9E}" destId="{EC7DED0F-D394-47D7-B936-A304E4F24BB8}" srcOrd="1" destOrd="0" parTransId="{C72EB5BD-1183-48A0-B011-6477DAFFF9F6}" sibTransId="{AE56A096-3B0D-4D9A-80A1-A6DE9F648488}"/>
+    <dgm:cxn modelId="{42E76B2C-F769-47C7-BFB5-39D5850474D5}" type="presOf" srcId="{ABCCBE0D-0694-43A7-8FDC-D826CD16DF82}" destId="{7A7FA498-31EF-4BC3-B6BB-ADB35275FB7D}" srcOrd="0" destOrd="1" presId="urn:microsoft.com/office/officeart/2005/8/layout/process3"/>
+    <dgm:cxn modelId="{E1A76EBB-7D03-4ADB-B33F-4DD8591790F3}" srcId="{AD80D54B-A264-4AF7-9643-086ACFDC240C}" destId="{ABCCBE0D-0694-43A7-8FDC-D826CD16DF82}" srcOrd="1" destOrd="0" parTransId="{A06AA2F7-0DBA-4F2C-A941-541CCC5B9B33}" sibTransId="{2691FA88-0AEC-4C47-9643-E49E7388422C}"/>
+    <dgm:cxn modelId="{C83BDF56-6BA6-457F-AAE5-79663CB09AB5}" type="presOf" srcId="{42BD20CC-BDF6-4463-A288-266A3969E780}" destId="{6CA435D9-4BF5-4596-8138-A7F06827D255}" srcOrd="0" destOrd="1" presId="urn:microsoft.com/office/officeart/2005/8/layout/process3"/>
+    <dgm:cxn modelId="{C69BAF85-B0D9-4DDA-870A-08F92078F6B2}" type="presOf" srcId="{47C3126E-77C4-43B1-8B98-04B737026C6C}" destId="{B9073262-5466-4251-B38A-465D00743F5C}" srcOrd="0" destOrd="2" presId="urn:microsoft.com/office/officeart/2005/8/layout/process3"/>
+    <dgm:cxn modelId="{810A725D-ACD9-462A-89B5-D9C1AB8CB03D}" type="presOf" srcId="{5A3F3E0A-326C-48A7-871F-F037C9B9CE83}" destId="{6CA435D9-4BF5-4596-8138-A7F06827D255}" srcOrd="0" destOrd="3" presId="urn:microsoft.com/office/officeart/2005/8/layout/process3"/>
+    <dgm:cxn modelId="{B1C5DF10-9FBF-4CDD-A4BC-264A41D64CDA}" type="presOf" srcId="{33931E14-E734-4793-AAC7-1AD6758D9714}" destId="{EFA5943A-9729-4D4A-9D50-EC9ADB635C8F}" srcOrd="0" destOrd="0" presId="urn:microsoft.com/office/officeart/2005/8/layout/process3"/>
+    <dgm:cxn modelId="{BFDEB0E5-4C9D-41F2-AB47-CC91D5D46E9D}" srcId="{6C569E96-FE13-4534-A102-A6AE3B21227F}" destId="{5A3F3E0A-326C-48A7-871F-F037C9B9CE83}" srcOrd="3" destOrd="0" parTransId="{8FF6094D-254E-40DE-9BDC-3E10AC847501}" sibTransId="{2B13AD27-9DB3-4567-BE70-F1567A4F753C}"/>
+    <dgm:cxn modelId="{A3088EC2-D75A-4433-AABC-D25E59A9761E}" type="presOf" srcId="{8E44A573-9EFC-4361-A76E-A3C7E86E6F09}" destId="{D4403C3F-0C94-4AB6-84E4-2D785482D0F1}" srcOrd="1" destOrd="0" presId="urn:microsoft.com/office/officeart/2005/8/layout/process3"/>
+    <dgm:cxn modelId="{88F15408-C455-41D4-BF24-D1D6DDD4BF8F}" srcId="{75B3E0C6-864D-47D2-BF91-C4509DD562BE}" destId="{29B129E9-B740-4E3C-A627-61F9BE488F8D}" srcOrd="1" destOrd="0" parTransId="{4EC1C845-8027-4B40-855E-722EF6B2C8D5}" sibTransId="{15220166-761A-4011-A052-CCD8F7132928}"/>
+    <dgm:cxn modelId="{09948C85-3D80-4E90-98F5-0FD9AE2A5C4F}" type="presOf" srcId="{ACC9ABBC-A5C4-4422-8FA0-14D2293F5868}" destId="{B9073262-5466-4251-B38A-465D00743F5C}" srcOrd="0" destOrd="0" presId="urn:microsoft.com/office/officeart/2005/8/layout/process3"/>
     <dgm:cxn modelId="{569D72EE-6372-43B2-8636-B03EA12F78D4}" type="presOf" srcId="{1C3CAE02-1C1A-48AD-9A36-B2822FDBFD9E}" destId="{83A31CD4-A1A0-40D0-8D9E-80186B60DA2D}" srcOrd="0" destOrd="0" presId="urn:microsoft.com/office/officeart/2005/8/layout/process3"/>
-    <dgm:cxn modelId="{1C2DFEEC-3C7C-49A3-B318-D6D3F67B782F}" type="presOf" srcId="{33931E14-E734-4793-AAC7-1AD6758D9714}" destId="{362CE78E-B1B8-49AB-9E6F-9F4F75F5FD37}" srcOrd="1" destOrd="0" presId="urn:microsoft.com/office/officeart/2005/8/layout/process3"/>
-    <dgm:cxn modelId="{5D85FB88-48B1-42E2-84BD-AD810DBA7A68}" srcId="{75B3E0C6-864D-47D2-BF91-C4509DD562BE}" destId="{A1450F3C-FF87-47A7-8924-E852747704DB}" srcOrd="0" destOrd="0" parTransId="{0EB3EC1F-EFFF-4AC9-A24F-184CD49F5635}" sibTransId="{260BB700-3C70-4C3F-9ED2-3293CE0F4BE9}"/>
-    <dgm:cxn modelId="{E7C7E8D2-B881-42CB-8A42-62B0956E641F}" type="presOf" srcId="{29B129E9-B740-4E3C-A627-61F9BE488F8D}" destId="{A147FEDC-E22B-4C4B-A851-E80FDE8654E6}" srcOrd="0" destOrd="1" presId="urn:microsoft.com/office/officeart/2005/8/layout/process3"/>
-    <dgm:cxn modelId="{57350A6C-B4CA-4C79-825B-EBD5488A1986}" srcId="{B61CEB4B-F8AB-4EA2-9D71-A11D04A293F2}" destId="{6C569E96-FE13-4534-A102-A6AE3B21227F}" srcOrd="1" destOrd="0" parTransId="{34972A00-CE16-4231-B1C6-CEE6DFF9830E}" sibTransId="{33931E14-E734-4793-AAC7-1AD6758D9714}"/>
-    <dgm:cxn modelId="{C69BAF85-B0D9-4DDA-870A-08F92078F6B2}" type="presOf" srcId="{47C3126E-77C4-43B1-8B98-04B737026C6C}" destId="{B9073262-5466-4251-B38A-465D00743F5C}" srcOrd="0" destOrd="2" presId="urn:microsoft.com/office/officeart/2005/8/layout/process3"/>
-    <dgm:cxn modelId="{0ACB0A7D-9292-4468-ADFC-37C919E0998E}" type="presOf" srcId="{AD80D54B-A264-4AF7-9643-086ACFDC240C}" destId="{20B466A6-903E-43E2-8E0B-456E2290BE42}" srcOrd="0" destOrd="0" presId="urn:microsoft.com/office/officeart/2005/8/layout/process3"/>
+    <dgm:cxn modelId="{426265DD-0F62-4BF6-9B89-88E4BFB5003F}" type="presOf" srcId="{5064DFDC-97AC-4C81-B96D-20C88F87C104}" destId="{69240CDF-F5EB-421D-9BFF-6388817B09AB}" srcOrd="1" destOrd="0" presId="urn:microsoft.com/office/officeart/2005/8/layout/process3"/>
+    <dgm:cxn modelId="{7B9CD630-6AAA-4E2A-90AD-33365450A5BD}" type="presOf" srcId="{A1450F3C-FF87-47A7-8924-E852747704DB}" destId="{A147FEDC-E22B-4C4B-A851-E80FDE8654E6}" srcOrd="0" destOrd="0" presId="urn:microsoft.com/office/officeart/2005/8/layout/process3"/>
+    <dgm:cxn modelId="{2502587E-3445-4C38-8BCF-FEEB75979A3C}" type="presOf" srcId="{3A6BE45E-AD32-4A7B-BA39-EFD05D841ED0}" destId="{7A7FA498-31EF-4BC3-B6BB-ADB35275FB7D}" srcOrd="0" destOrd="0" presId="urn:microsoft.com/office/officeart/2005/8/layout/process3"/>
+    <dgm:cxn modelId="{0C07397D-7327-4241-BB22-EA4B3C71F093}" type="presOf" srcId="{04785C09-080B-4BD5-B69C-ABD17FFF25F1}" destId="{6CA435D9-4BF5-4596-8138-A7F06827D255}" srcOrd="0" destOrd="2" presId="urn:microsoft.com/office/officeart/2005/8/layout/process3"/>
+    <dgm:cxn modelId="{4C58C868-F925-435E-AF16-7D3336703079}" srcId="{1C3CAE02-1C1A-48AD-9A36-B2822FDBFD9E}" destId="{ACC9ABBC-A5C4-4422-8FA0-14D2293F5868}" srcOrd="0" destOrd="0" parTransId="{079C4180-F319-45F5-AF2A-03FBF6A1F33A}" sibTransId="{E698F5DF-EC66-439D-9B55-41E143222C95}"/>
     <dgm:cxn modelId="{DB5AF753-0999-41CC-BFAC-D49774E5C71C}" type="presOf" srcId="{AD80D54B-A264-4AF7-9643-086ACFDC240C}" destId="{BE91C442-7A40-416C-97D0-2D1EDC5ACAE8}" srcOrd="1" destOrd="0" presId="urn:microsoft.com/office/officeart/2005/8/layout/process3"/>
-    <dgm:cxn modelId="{2F687985-D590-4195-804B-B29D050E73FF}" srcId="{1C3CAE02-1C1A-48AD-9A36-B2822FDBFD9E}" destId="{47C3126E-77C4-43B1-8B98-04B737026C6C}" srcOrd="2" destOrd="0" parTransId="{D5B77B23-FB40-4838-B1E6-76F8B09E65A8}" sibTransId="{88F2F41E-4FC0-437A-A130-52BBDF736421}"/>
-    <dgm:cxn modelId="{85EF8F0E-4CA1-4065-9F1D-770C0E5B2A71}" type="presOf" srcId="{75B3E0C6-864D-47D2-BF91-C4509DD562BE}" destId="{03034E63-3F42-4141-8768-14F5FE4CC9C5}" srcOrd="0" destOrd="0" presId="urn:microsoft.com/office/officeart/2005/8/layout/process3"/>
-    <dgm:cxn modelId="{A3088EC2-D75A-4433-AABC-D25E59A9761E}" type="presOf" srcId="{8E44A573-9EFC-4361-A76E-A3C7E86E6F09}" destId="{D4403C3F-0C94-4AB6-84E4-2D785482D0F1}" srcOrd="1" destOrd="0" presId="urn:microsoft.com/office/officeart/2005/8/layout/process3"/>
-    <dgm:cxn modelId="{6D789034-8EC0-41F9-BDB2-20BDF87EE493}" srcId="{B61CEB4B-F8AB-4EA2-9D71-A11D04A293F2}" destId="{75B3E0C6-864D-47D2-BF91-C4509DD562BE}" srcOrd="2" destOrd="0" parTransId="{82028262-E32E-4AB1-9C09-1B29AD36A9CB}" sibTransId="{5064DFDC-97AC-4C81-B96D-20C88F87C104}"/>
-    <dgm:cxn modelId="{075C29AC-E9C2-4A4C-853D-A543B3ED31A2}" srcId="{6C569E96-FE13-4534-A102-A6AE3B21227F}" destId="{42BD20CC-BDF6-4463-A288-266A3969E780}" srcOrd="1" destOrd="0" parTransId="{706EA3E1-F305-4694-9DEE-F760237D39FB}" sibTransId="{D564DE12-3DF5-477C-9C16-948DA66EE507}"/>
-    <dgm:cxn modelId="{C4C99033-9167-48FD-99D1-27F78B698A7E}" type="presOf" srcId="{5064DFDC-97AC-4C81-B96D-20C88F87C104}" destId="{39911D69-181D-4CA5-8590-9ECF2E454815}" srcOrd="0" destOrd="0" presId="urn:microsoft.com/office/officeart/2005/8/layout/process3"/>
-    <dgm:cxn modelId="{0FAAFF07-8391-4B46-A81B-475AB0790A1B}" type="presOf" srcId="{1C3CAE02-1C1A-48AD-9A36-B2822FDBFD9E}" destId="{9D17F6BE-EFF0-498E-A26D-31CCF5918832}" srcOrd="1" destOrd="0" presId="urn:microsoft.com/office/officeart/2005/8/layout/process3"/>
     <dgm:cxn modelId="{DC11A434-5E5A-46EC-BE70-D0588AE57FF7}" type="presOf" srcId="{B61CEB4B-F8AB-4EA2-9D71-A11D04A293F2}" destId="{3B69F22A-260C-43A3-9BC9-3B89F89B49C7}" srcOrd="0" destOrd="0" presId="urn:microsoft.com/office/officeart/2005/8/layout/process3"/>
     <dgm:cxn modelId="{ADAC59D6-8130-4BEB-AE05-BEC58C36259A}" type="presOf" srcId="{6C569E96-FE13-4534-A102-A6AE3B21227F}" destId="{6CF91E8B-3686-4030-9DE9-DF15F9658D97}" srcOrd="1" destOrd="0" presId="urn:microsoft.com/office/officeart/2005/8/layout/process3"/>
-    <dgm:cxn modelId="{7B9CD630-6AAA-4E2A-90AD-33365450A5BD}" type="presOf" srcId="{A1450F3C-FF87-47A7-8924-E852747704DB}" destId="{A147FEDC-E22B-4C4B-A851-E80FDE8654E6}" srcOrd="0" destOrd="0" presId="urn:microsoft.com/office/officeart/2005/8/layout/process3"/>
-    <dgm:cxn modelId="{42E76B2C-F769-47C7-BFB5-39D5850474D5}" type="presOf" srcId="{ABCCBE0D-0694-43A7-8FDC-D826CD16DF82}" destId="{7A7FA498-31EF-4BC3-B6BB-ADB35275FB7D}" srcOrd="0" destOrd="1" presId="urn:microsoft.com/office/officeart/2005/8/layout/process3"/>
-    <dgm:cxn modelId="{09948C85-3D80-4E90-98F5-0FD9AE2A5C4F}" type="presOf" srcId="{ACC9ABBC-A5C4-4422-8FA0-14D2293F5868}" destId="{B9073262-5466-4251-B38A-465D00743F5C}" srcOrd="0" destOrd="0" presId="urn:microsoft.com/office/officeart/2005/8/layout/process3"/>
-    <dgm:cxn modelId="{8C281292-E9B7-461E-904F-D1D4C623F28B}" srcId="{B61CEB4B-F8AB-4EA2-9D71-A11D04A293F2}" destId="{AD80D54B-A264-4AF7-9643-086ACFDC240C}" srcOrd="0" destOrd="0" parTransId="{BFD993D0-F061-48E7-96F3-B5FA6796258E}" sibTransId="{8E44A573-9EFC-4361-A76E-A3C7E86E6F09}"/>
-    <dgm:cxn modelId="{919FDF6D-1718-4827-BF73-FC9ED3289198}" srcId="{B61CEB4B-F8AB-4EA2-9D71-A11D04A293F2}" destId="{1C3CAE02-1C1A-48AD-9A36-B2822FDBFD9E}" srcOrd="3" destOrd="0" parTransId="{395F597A-9443-4560-BAEC-576D12CEFE92}" sibTransId="{AB2274CF-4A80-49F0-8DC7-FC612679A744}"/>
-    <dgm:cxn modelId="{4C58C868-F925-435E-AF16-7D3336703079}" srcId="{1C3CAE02-1C1A-48AD-9A36-B2822FDBFD9E}" destId="{ACC9ABBC-A5C4-4422-8FA0-14D2293F5868}" srcOrd="0" destOrd="0" parTransId="{079C4180-F319-45F5-AF2A-03FBF6A1F33A}" sibTransId="{E698F5DF-EC66-439D-9B55-41E143222C95}"/>
-    <dgm:cxn modelId="{4C7B17C1-84DF-496B-AF59-C0EE623E35BA}" type="presOf" srcId="{1D962B4C-8637-4AB6-8F6A-A02C9A12D911}" destId="{6CA435D9-4BF5-4596-8138-A7F06827D255}" srcOrd="0" destOrd="0" presId="urn:microsoft.com/office/officeart/2005/8/layout/process3"/>
-    <dgm:cxn modelId="{88F15408-C455-41D4-BF24-D1D6DDD4BF8F}" srcId="{75B3E0C6-864D-47D2-BF91-C4509DD562BE}" destId="{29B129E9-B740-4E3C-A627-61F9BE488F8D}" srcOrd="1" destOrd="0" parTransId="{4EC1C845-8027-4B40-855E-722EF6B2C8D5}" sibTransId="{15220166-761A-4011-A052-CCD8F7132928}"/>
-    <dgm:cxn modelId="{426265DD-0F62-4BF6-9B89-88E4BFB5003F}" type="presOf" srcId="{5064DFDC-97AC-4C81-B96D-20C88F87C104}" destId="{69240CDF-F5EB-421D-9BFF-6388817B09AB}" srcOrd="1" destOrd="0" presId="urn:microsoft.com/office/officeart/2005/8/layout/process3"/>
-    <dgm:cxn modelId="{1072AB24-7F6C-40C3-BCFE-2824DB4F399B}" type="presOf" srcId="{8E44A573-9EFC-4361-A76E-A3C7E86E6F09}" destId="{37D8455D-9A5F-45B8-A406-389E432A9ADC}" srcOrd="0" destOrd="0" presId="urn:microsoft.com/office/officeart/2005/8/layout/process3"/>
-    <dgm:cxn modelId="{BFDEB0E5-4C9D-41F2-AB47-CC91D5D46E9D}" srcId="{6C569E96-FE13-4534-A102-A6AE3B21227F}" destId="{5A3F3E0A-326C-48A7-871F-F037C9B9CE83}" srcOrd="3" destOrd="0" parTransId="{8FF6094D-254E-40DE-9BDC-3E10AC847501}" sibTransId="{2B13AD27-9DB3-4567-BE70-F1567A4F753C}"/>
-    <dgm:cxn modelId="{E1A76EBB-7D03-4ADB-B33F-4DD8591790F3}" srcId="{AD80D54B-A264-4AF7-9643-086ACFDC240C}" destId="{ABCCBE0D-0694-43A7-8FDC-D826CD16DF82}" srcOrd="1" destOrd="0" parTransId="{A06AA2F7-0DBA-4F2C-A941-541CCC5B9B33}" sibTransId="{2691FA88-0AEC-4C47-9643-E49E7388422C}"/>
-    <dgm:cxn modelId="{C83BDF56-6BA6-457F-AAE5-79663CB09AB5}" type="presOf" srcId="{42BD20CC-BDF6-4463-A288-266A3969E780}" destId="{6CA435D9-4BF5-4596-8138-A7F06827D255}" srcOrd="0" destOrd="1" presId="urn:microsoft.com/office/officeart/2005/8/layout/process3"/>
-    <dgm:cxn modelId="{867C763C-18A0-440F-9283-6E0B99B9959B}" srcId="{AD80D54B-A264-4AF7-9643-086ACFDC240C}" destId="{2FF9D139-D4E4-44B3-A42A-B9C4C1B9C0BF}" srcOrd="2" destOrd="0" parTransId="{7D5B630D-B089-4091-8DD9-503E14088ECE}" sibTransId="{E1290CCC-165D-48E7-B339-289912C8811F}"/>
-    <dgm:cxn modelId="{3A3A13F8-6753-4E2D-AD00-B91A3CED0D73}" type="presOf" srcId="{6C569E96-FE13-4534-A102-A6AE3B21227F}" destId="{B4807CA4-4BEF-43AC-AF30-11EF11E852DF}" srcOrd="0" destOrd="0" presId="urn:microsoft.com/office/officeart/2005/8/layout/process3"/>
-    <dgm:cxn modelId="{228E93E6-0774-4E6A-9B26-ED2139424C61}" srcId="{6C569E96-FE13-4534-A102-A6AE3B21227F}" destId="{1D962B4C-8637-4AB6-8F6A-A02C9A12D911}" srcOrd="0" destOrd="0" parTransId="{02FCD9AB-677E-4492-8928-C6D38DE07892}" sibTransId="{0178877C-6897-46D0-BB03-3CA1D6B340CC}"/>
-    <dgm:cxn modelId="{3A3F3722-3D1A-4B1D-B25C-7188EE158C44}" srcId="{6C569E96-FE13-4534-A102-A6AE3B21227F}" destId="{04785C09-080B-4BD5-B69C-ABD17FFF25F1}" srcOrd="2" destOrd="0" parTransId="{265EDB04-BAC1-4E29-B247-8256495C7E40}" sibTransId="{6061CB64-4AEC-4CFF-A6DA-33C4A4436EE2}"/>
-    <dgm:cxn modelId="{2502587E-3445-4C38-8BCF-FEEB75979A3C}" type="presOf" srcId="{3A6BE45E-AD32-4A7B-BA39-EFD05D841ED0}" destId="{7A7FA498-31EF-4BC3-B6BB-ADB35275FB7D}" srcOrd="0" destOrd="0" presId="urn:microsoft.com/office/officeart/2005/8/layout/process3"/>
-    <dgm:cxn modelId="{CD8676E8-A146-425E-9DBC-1C4656ECDAFB}" type="presOf" srcId="{75B3E0C6-864D-47D2-BF91-C4509DD562BE}" destId="{FAB49BEF-32FB-4F0B-BD83-71146F511D2C}" srcOrd="1" destOrd="0" presId="urn:microsoft.com/office/officeart/2005/8/layout/process3"/>
-    <dgm:cxn modelId="{0C07397D-7327-4241-BB22-EA4B3C71F093}" type="presOf" srcId="{04785C09-080B-4BD5-B69C-ABD17FFF25F1}" destId="{6CA435D9-4BF5-4596-8138-A7F06827D255}" srcOrd="0" destOrd="2" presId="urn:microsoft.com/office/officeart/2005/8/layout/process3"/>
+    <dgm:cxn modelId="{5D85FB88-48B1-42E2-84BD-AD810DBA7A68}" srcId="{75B3E0C6-864D-47D2-BF91-C4509DD562BE}" destId="{A1450F3C-FF87-47A7-8924-E852747704DB}" srcOrd="0" destOrd="0" parTransId="{0EB3EC1F-EFFF-4AC9-A24F-184CD49F5635}" sibTransId="{260BB700-3C70-4C3F-9ED2-3293CE0F4BE9}"/>
+    <dgm:cxn modelId="{C4C99033-9167-48FD-99D1-27F78B698A7E}" type="presOf" srcId="{5064DFDC-97AC-4C81-B96D-20C88F87C104}" destId="{39911D69-181D-4CA5-8590-9ECF2E454815}" srcOrd="0" destOrd="0" presId="urn:microsoft.com/office/officeart/2005/8/layout/process3"/>
+    <dgm:cxn modelId="{85EF8F0E-4CA1-4065-9F1D-770C0E5B2A71}" type="presOf" srcId="{75B3E0C6-864D-47D2-BF91-C4509DD562BE}" destId="{03034E63-3F42-4141-8768-14F5FE4CC9C5}" srcOrd="0" destOrd="0" presId="urn:microsoft.com/office/officeart/2005/8/layout/process3"/>
+    <dgm:cxn modelId="{0ACB0A7D-9292-4468-ADFC-37C919E0998E}" type="presOf" srcId="{AD80D54B-A264-4AF7-9643-086ACFDC240C}" destId="{20B466A6-903E-43E2-8E0B-456E2290BE42}" srcOrd="0" destOrd="0" presId="urn:microsoft.com/office/officeart/2005/8/layout/process3"/>
+    <dgm:cxn modelId="{E7C7E8D2-B881-42CB-8A42-62B0956E641F}" type="presOf" srcId="{29B129E9-B740-4E3C-A627-61F9BE488F8D}" destId="{A147FEDC-E22B-4C4B-A851-E80FDE8654E6}" srcOrd="0" destOrd="1" presId="urn:microsoft.com/office/officeart/2005/8/layout/process3"/>
     <dgm:cxn modelId="{EBE07C07-B90D-4992-B869-93D9199DC431}" srcId="{AD80D54B-A264-4AF7-9643-086ACFDC240C}" destId="{3A6BE45E-AD32-4A7B-BA39-EFD05D841ED0}" srcOrd="0" destOrd="0" parTransId="{8FDE22ED-AB52-463E-B8CC-3F271BB07C40}" sibTransId="{AC17102F-14DA-411D-AEA4-451861E9C681}"/>
     <dgm:cxn modelId="{4EE9F26F-02FE-40DB-AE33-98D1655DF331}" type="presOf" srcId="{EC7DED0F-D394-47D7-B936-A304E4F24BB8}" destId="{B9073262-5466-4251-B38A-465D00743F5C}" srcOrd="0" destOrd="1" presId="urn:microsoft.com/office/officeart/2005/8/layout/process3"/>
-    <dgm:cxn modelId="{810A725D-ACD9-462A-89B5-D9C1AB8CB03D}" type="presOf" srcId="{5A3F3E0A-326C-48A7-871F-F037C9B9CE83}" destId="{6CA435D9-4BF5-4596-8138-A7F06827D255}" srcOrd="0" destOrd="3" presId="urn:microsoft.com/office/officeart/2005/8/layout/process3"/>
+    <dgm:cxn modelId="{919FDF6D-1718-4827-BF73-FC9ED3289198}" srcId="{B61CEB4B-F8AB-4EA2-9D71-A11D04A293F2}" destId="{1C3CAE02-1C1A-48AD-9A36-B2822FDBFD9E}" srcOrd="3" destOrd="0" parTransId="{395F597A-9443-4560-BAEC-576D12CEFE92}" sibTransId="{AB2274CF-4A80-49F0-8DC7-FC612679A744}"/>
     <dgm:cxn modelId="{4F351B75-BDC4-48F7-B950-C7CB67994732}" type="presOf" srcId="{2FF9D139-D4E4-44B3-A42A-B9C4C1B9C0BF}" destId="{7A7FA498-31EF-4BC3-B6BB-ADB35275FB7D}" srcOrd="0" destOrd="2" presId="urn:microsoft.com/office/officeart/2005/8/layout/process3"/>
-    <dgm:cxn modelId="{B1C5DF10-9FBF-4CDD-A4BC-264A41D64CDA}" type="presOf" srcId="{33931E14-E734-4793-AAC7-1AD6758D9714}" destId="{EFA5943A-9729-4D4A-9D50-EC9ADB635C8F}" srcOrd="0" destOrd="0" presId="urn:microsoft.com/office/officeart/2005/8/layout/process3"/>
+    <dgm:cxn modelId="{3A3F3722-3D1A-4B1D-B25C-7188EE158C44}" srcId="{6C569E96-FE13-4534-A102-A6AE3B21227F}" destId="{04785C09-080B-4BD5-B69C-ABD17FFF25F1}" srcOrd="2" destOrd="0" parTransId="{265EDB04-BAC1-4E29-B247-8256495C7E40}" sibTransId="{6061CB64-4AEC-4CFF-A6DA-33C4A4436EE2}"/>
+    <dgm:cxn modelId="{3A3A13F8-6753-4E2D-AD00-B91A3CED0D73}" type="presOf" srcId="{6C569E96-FE13-4534-A102-A6AE3B21227F}" destId="{B4807CA4-4BEF-43AC-AF30-11EF11E852DF}" srcOrd="0" destOrd="0" presId="urn:microsoft.com/office/officeart/2005/8/layout/process3"/>
+    <dgm:cxn modelId="{CD8676E8-A146-425E-9DBC-1C4656ECDAFB}" type="presOf" srcId="{75B3E0C6-864D-47D2-BF91-C4509DD562BE}" destId="{FAB49BEF-32FB-4F0B-BD83-71146F511D2C}" srcOrd="1" destOrd="0" presId="urn:microsoft.com/office/officeart/2005/8/layout/process3"/>
+    <dgm:cxn modelId="{075C29AC-E9C2-4A4C-853D-A543B3ED31A2}" srcId="{6C569E96-FE13-4534-A102-A6AE3B21227F}" destId="{42BD20CC-BDF6-4463-A288-266A3969E780}" srcOrd="1" destOrd="0" parTransId="{706EA3E1-F305-4694-9DEE-F760237D39FB}" sibTransId="{D564DE12-3DF5-477C-9C16-948DA66EE507}"/>
+    <dgm:cxn modelId="{57350A6C-B4CA-4C79-825B-EBD5488A1986}" srcId="{B61CEB4B-F8AB-4EA2-9D71-A11D04A293F2}" destId="{6C569E96-FE13-4534-A102-A6AE3B21227F}" srcOrd="1" destOrd="0" parTransId="{34972A00-CE16-4231-B1C6-CEE6DFF9830E}" sibTransId="{33931E14-E734-4793-AAC7-1AD6758D9714}"/>
+    <dgm:cxn modelId="{1C2DFEEC-3C7C-49A3-B318-D6D3F67B782F}" type="presOf" srcId="{33931E14-E734-4793-AAC7-1AD6758D9714}" destId="{362CE78E-B1B8-49AB-9E6F-9F4F75F5FD37}" srcOrd="1" destOrd="0" presId="urn:microsoft.com/office/officeart/2005/8/layout/process3"/>
+    <dgm:cxn modelId="{4C7B17C1-84DF-496B-AF59-C0EE623E35BA}" type="presOf" srcId="{1D962B4C-8637-4AB6-8F6A-A02C9A12D911}" destId="{6CA435D9-4BF5-4596-8138-A7F06827D255}" srcOrd="0" destOrd="0" presId="urn:microsoft.com/office/officeart/2005/8/layout/process3"/>
+    <dgm:cxn modelId="{2F687985-D590-4195-804B-B29D050E73FF}" srcId="{1C3CAE02-1C1A-48AD-9A36-B2822FDBFD9E}" destId="{47C3126E-77C4-43B1-8B98-04B737026C6C}" srcOrd="2" destOrd="0" parTransId="{D5B77B23-FB40-4838-B1E6-76F8B09E65A8}" sibTransId="{88F2F41E-4FC0-437A-A130-52BBDF736421}"/>
+    <dgm:cxn modelId="{1072AB24-7F6C-40C3-BCFE-2824DB4F399B}" type="presOf" srcId="{8E44A573-9EFC-4361-A76E-A3C7E86E6F09}" destId="{37D8455D-9A5F-45B8-A406-389E432A9ADC}" srcOrd="0" destOrd="0" presId="urn:microsoft.com/office/officeart/2005/8/layout/process3"/>
+    <dgm:cxn modelId="{0FAAFF07-8391-4B46-A81B-475AB0790A1B}" type="presOf" srcId="{1C3CAE02-1C1A-48AD-9A36-B2822FDBFD9E}" destId="{9D17F6BE-EFF0-498E-A26D-31CCF5918832}" srcOrd="1" destOrd="0" presId="urn:microsoft.com/office/officeart/2005/8/layout/process3"/>
     <dgm:cxn modelId="{244D3EC1-2391-40F6-B45E-11235BE1DD6F}" type="presParOf" srcId="{3B69F22A-260C-43A3-9BC9-3B89F89B49C7}" destId="{EFE82D1F-618E-49C9-A77B-8390A8BDD33B}" srcOrd="0" destOrd="0" presId="urn:microsoft.com/office/officeart/2005/8/layout/process3"/>
     <dgm:cxn modelId="{3DD081D4-2D1F-4223-ADD8-A3E38FE52333}" type="presParOf" srcId="{EFE82D1F-618E-49C9-A77B-8390A8BDD33B}" destId="{20B466A6-903E-43E2-8E0B-456E2290BE42}" srcOrd="0" destOrd="0" presId="urn:microsoft.com/office/officeart/2005/8/layout/process3"/>
     <dgm:cxn modelId="{67FB6BDE-8220-433B-89BE-03CCE70C0357}" type="presParOf" srcId="{EFE82D1F-618E-49C9-A77B-8390A8BDD33B}" destId="{BE91C442-7A40-416C-97D0-2D1EDC5ACAE8}" srcOrd="1" destOrd="0" presId="urn:microsoft.com/office/officeart/2005/8/layout/process3"/>
@@ -5937,7 +6016,7 @@
         <a:p>
           <a:r>
             <a:rPr lang="en-US" dirty="0" smtClean="0"/>
-            <a:t>Model</a:t>
+            <a:t>Library</a:t>
           </a:r>
           <a:endParaRPr lang="en-US" dirty="0"/>
         </a:p>
@@ -5974,7 +6053,7 @@
         <a:p>
           <a:r>
             <a:rPr lang="en-US" dirty="0" smtClean="0"/>
-            <a:t>Price</a:t>
+            <a:t>Integration Example (UI)</a:t>
           </a:r>
           <a:endParaRPr lang="en-US" dirty="0"/>
         </a:p>
@@ -6048,7 +6127,7 @@
         <a:p>
           <a:r>
             <a:rPr lang="en-US" dirty="0" smtClean="0"/>
-            <a:t>Model</a:t>
+            <a:t>Library</a:t>
           </a:r>
           <a:endParaRPr lang="en-US" dirty="0"/>
         </a:p>
@@ -6085,7 +6164,15 @@
         <a:p>
           <a:r>
             <a:rPr lang="en-US" dirty="0" smtClean="0"/>
-            <a:t>Price</a:t>
+            <a:t>Integration Examples (</a:t>
+          </a:r>
+          <a:r>
+            <a:rPr lang="en-US" dirty="0" err="1" smtClean="0"/>
+            <a:t>Scala</a:t>
+          </a:r>
+          <a:r>
+            <a:rPr lang="en-US" dirty="0" smtClean="0"/>
+            <a:t>/Java)</a:t>
           </a:r>
           <a:endParaRPr lang="en-US" dirty="0"/>
         </a:p>
@@ -6159,7 +6246,7 @@
         <a:p>
           <a:r>
             <a:rPr lang="en-US" dirty="0" smtClean="0"/>
-            <a:t>Model</a:t>
+            <a:t>TODO</a:t>
           </a:r>
           <a:endParaRPr lang="en-US" dirty="0"/>
         </a:p>
@@ -6196,7 +6283,7 @@
         <a:p>
           <a:r>
             <a:rPr lang="en-US" dirty="0" smtClean="0"/>
-            <a:t>Price</a:t>
+            <a:t>TODO</a:t>
           </a:r>
           <a:endParaRPr lang="en-US" dirty="0"/>
         </a:p>
@@ -6270,7 +6357,7 @@
         <a:p>
           <a:r>
             <a:rPr lang="en-US" dirty="0" smtClean="0"/>
-            <a:t>A</a:t>
+            <a:t>TODO</a:t>
           </a:r>
           <a:endParaRPr lang="en-US" dirty="0"/>
         </a:p>
@@ -6307,7 +6394,7 @@
         <a:p>
           <a:r>
             <a:rPr lang="en-US" dirty="0" smtClean="0"/>
-            <a:t>B</a:t>
+            <a:t>TODO</a:t>
           </a:r>
           <a:endParaRPr lang="en-US" dirty="0"/>
         </a:p>
@@ -6370,6 +6457,13 @@
     <dgm:pt modelId="{5D764795-966C-4F53-9A01-B4FEEFA0BF5B}" type="pres">
       <dgm:prSet presAssocID="{E2DCDC5A-990F-44DB-8FBD-1BECB81FB5BA}" presName="parTrans" presStyleLbl="sibTrans2D1" presStyleIdx="0" presStyleCnt="8"/>
       <dgm:spPr/>
+      <dgm:t>
+        <a:bodyPr/>
+        <a:lstStyle/>
+        <a:p>
+          <a:endParaRPr lang="en-US"/>
+        </a:p>
+      </dgm:t>
     </dgm:pt>
     <dgm:pt modelId="{DCDC15D9-667E-409D-9980-2FC1E9E34816}" type="pres">
       <dgm:prSet presAssocID="{D3B81CFE-F024-4A2F-A036-45C7DC70E930}" presName="child" presStyleLbl="alignAccFollowNode1" presStyleIdx="0" presStyleCnt="8">
@@ -6390,6 +6484,13 @@
     <dgm:pt modelId="{220A4533-BE80-42DA-BA97-817D933198DE}" type="pres">
       <dgm:prSet presAssocID="{159A71CA-ADA8-4CA0-9589-56CFD68103AF}" presName="sibTrans" presStyleLbl="sibTrans2D1" presStyleIdx="1" presStyleCnt="8"/>
       <dgm:spPr/>
+      <dgm:t>
+        <a:bodyPr/>
+        <a:lstStyle/>
+        <a:p>
+          <a:endParaRPr lang="en-US"/>
+        </a:p>
+      </dgm:t>
     </dgm:pt>
     <dgm:pt modelId="{CA316164-C52F-46E0-B335-77929574E012}" type="pres">
       <dgm:prSet presAssocID="{531B3967-25C6-4142-9364-52CF28354393}" presName="child" presStyleLbl="alignAccFollowNode1" presStyleIdx="1" presStyleCnt="8">
@@ -6429,6 +6530,13 @@
     <dgm:pt modelId="{5784213F-0272-4E91-A488-E34103EE77BF}" type="pres">
       <dgm:prSet presAssocID="{3CC15E98-F09E-46C4-8710-53A52828F77D}" presName="parTrans" presStyleLbl="sibTrans2D1" presStyleIdx="2" presStyleCnt="8"/>
       <dgm:spPr/>
+      <dgm:t>
+        <a:bodyPr/>
+        <a:lstStyle/>
+        <a:p>
+          <a:endParaRPr lang="en-US"/>
+        </a:p>
+      </dgm:t>
     </dgm:pt>
     <dgm:pt modelId="{D19AF41A-4A27-443D-A04C-75CAB550D324}" type="pres">
       <dgm:prSet presAssocID="{AEC3EE32-5217-40B6-9BF6-C5F9CA3CE607}" presName="child" presStyleLbl="alignAccFollowNode1" presStyleIdx="2" presStyleCnt="8">
@@ -6449,6 +6557,13 @@
     <dgm:pt modelId="{5A44B652-FF40-4ABC-9BD2-4C442839E94C}" type="pres">
       <dgm:prSet presAssocID="{D205FB33-F5AC-4D7B-863F-4A5D49625412}" presName="sibTrans" presStyleLbl="sibTrans2D1" presStyleIdx="3" presStyleCnt="8"/>
       <dgm:spPr/>
+      <dgm:t>
+        <a:bodyPr/>
+        <a:lstStyle/>
+        <a:p>
+          <a:endParaRPr lang="en-US"/>
+        </a:p>
+      </dgm:t>
     </dgm:pt>
     <dgm:pt modelId="{8472C19D-7D7C-48F2-A09F-742AEA9DB007}" type="pres">
       <dgm:prSet presAssocID="{40ABCF4E-B4F7-44B8-84DA-B5FF81C8757D}" presName="child" presStyleLbl="alignAccFollowNode1" presStyleIdx="3" presStyleCnt="8">
@@ -6488,6 +6603,13 @@
     <dgm:pt modelId="{F08BBB78-1D36-45B5-9104-730D1A9CD3AE}" type="pres">
       <dgm:prSet presAssocID="{42693A09-D334-4279-A0F7-C19D08CDE280}" presName="parTrans" presStyleLbl="sibTrans2D1" presStyleIdx="4" presStyleCnt="8"/>
       <dgm:spPr/>
+      <dgm:t>
+        <a:bodyPr/>
+        <a:lstStyle/>
+        <a:p>
+          <a:endParaRPr lang="en-US"/>
+        </a:p>
+      </dgm:t>
     </dgm:pt>
     <dgm:pt modelId="{50B8B4B6-01A1-47E8-80C8-D029174F0045}" type="pres">
       <dgm:prSet presAssocID="{8DE6327D-A1F8-4AA9-B89F-061051A1E118}" presName="child" presStyleLbl="alignAccFollowNode1" presStyleIdx="4" presStyleCnt="8">
@@ -6508,6 +6630,13 @@
     <dgm:pt modelId="{3629B93E-0DDE-4147-B818-81758F5DD307}" type="pres">
       <dgm:prSet presAssocID="{CA01D505-80DB-4086-9399-6B431F45D49D}" presName="sibTrans" presStyleLbl="sibTrans2D1" presStyleIdx="5" presStyleCnt="8"/>
       <dgm:spPr/>
+      <dgm:t>
+        <a:bodyPr/>
+        <a:lstStyle/>
+        <a:p>
+          <a:endParaRPr lang="en-US"/>
+        </a:p>
+      </dgm:t>
     </dgm:pt>
     <dgm:pt modelId="{9BD4878A-053E-44F5-A6F3-2B977983FF76}" type="pres">
       <dgm:prSet presAssocID="{B0351FEC-00B4-450F-A319-1012D79FCD7E}" presName="child" presStyleLbl="alignAccFollowNode1" presStyleIdx="5" presStyleCnt="8">
@@ -6547,6 +6676,13 @@
     <dgm:pt modelId="{90DCE11D-36EA-44D1-83B5-B10761EA554C}" type="pres">
       <dgm:prSet presAssocID="{6403F1C7-30BE-47C1-B907-7B79DC54C3D7}" presName="parTrans" presStyleLbl="sibTrans2D1" presStyleIdx="6" presStyleCnt="8"/>
       <dgm:spPr/>
+      <dgm:t>
+        <a:bodyPr/>
+        <a:lstStyle/>
+        <a:p>
+          <a:endParaRPr lang="en-US"/>
+        </a:p>
+      </dgm:t>
     </dgm:pt>
     <dgm:pt modelId="{DF33878E-5D53-4B3F-A9D0-369D9D8947A2}" type="pres">
       <dgm:prSet presAssocID="{497C85C1-2BA4-4E58-B629-50E81F68CB7A}" presName="child" presStyleLbl="alignAccFollowNode1" presStyleIdx="6" presStyleCnt="8">
@@ -6567,6 +6703,13 @@
     <dgm:pt modelId="{52252059-5659-40E4-B8C3-642B6677E4C6}" type="pres">
       <dgm:prSet presAssocID="{17F9D3A2-DFF9-4F1A-9C12-E9AD2A7E0302}" presName="sibTrans" presStyleLbl="sibTrans2D1" presStyleIdx="7" presStyleCnt="8"/>
       <dgm:spPr/>
+      <dgm:t>
+        <a:bodyPr/>
+        <a:lstStyle/>
+        <a:p>
+          <a:endParaRPr lang="en-US"/>
+        </a:p>
+      </dgm:t>
     </dgm:pt>
     <dgm:pt modelId="{40286D35-8CA8-436E-9008-2C5C0141454F}" type="pres">
       <dgm:prSet presAssocID="{C181D51F-1EC5-414F-9829-EB6F6B38C78B}" presName="child" presStyleLbl="alignAccFollowNode1" presStyleIdx="7" presStyleCnt="8">
@@ -6586,39 +6729,39 @@
     </dgm:pt>
   </dgm:ptLst>
   <dgm:cxnLst>
+    <dgm:cxn modelId="{B2ADF806-6659-44FF-A522-FB09CF22B6BC}" srcId="{9EF412E8-EB21-49C9-8153-F1009AB26693}" destId="{8DE6327D-A1F8-4AA9-B89F-061051A1E118}" srcOrd="0" destOrd="0" parTransId="{42693A09-D334-4279-A0F7-C19D08CDE280}" sibTransId="{CA01D505-80DB-4086-9399-6B431F45D49D}"/>
+    <dgm:cxn modelId="{5D030CBB-0215-44FE-ADE9-046ECD4EA795}" type="presOf" srcId="{D3B81CFE-F024-4A2F-A036-45C7DC70E930}" destId="{DCDC15D9-667E-409D-9980-2FC1E9E34816}" srcOrd="0" destOrd="0" presId="urn:microsoft.com/office/officeart/2005/8/layout/lProcess1"/>
+    <dgm:cxn modelId="{3A2BD304-9822-4F9D-9ED2-E2B6C3BD4102}" type="presOf" srcId="{159A71CA-ADA8-4CA0-9589-56CFD68103AF}" destId="{220A4533-BE80-42DA-BA97-817D933198DE}" srcOrd="0" destOrd="0" presId="urn:microsoft.com/office/officeart/2005/8/layout/lProcess1"/>
+    <dgm:cxn modelId="{1F1FFC82-6640-4AD6-90B1-7DF8FE6A0111}" srcId="{B2951EE1-3465-4C95-87EB-379D6C8BC820}" destId="{D3B81CFE-F024-4A2F-A036-45C7DC70E930}" srcOrd="0" destOrd="0" parTransId="{E2DCDC5A-990F-44DB-8FBD-1BECB81FB5BA}" sibTransId="{159A71CA-ADA8-4CA0-9589-56CFD68103AF}"/>
+    <dgm:cxn modelId="{6410A7FF-36FD-402A-BEEC-7E0F864DF72C}" srcId="{FF1DCEE5-248E-496F-86F6-E709CAD4C4BC}" destId="{9EF412E8-EB21-49C9-8153-F1009AB26693}" srcOrd="2" destOrd="0" parTransId="{103CCF25-8720-451E-9C2D-7477383EDC18}" sibTransId="{4E5D6CB8-FC1E-4307-A290-D1737A514288}"/>
+    <dgm:cxn modelId="{24B36CC5-9E23-4288-83A1-946A964D26CF}" type="presOf" srcId="{17F9D3A2-DFF9-4F1A-9C12-E9AD2A7E0302}" destId="{52252059-5659-40E4-B8C3-642B6677E4C6}" srcOrd="0" destOrd="0" presId="urn:microsoft.com/office/officeart/2005/8/layout/lProcess1"/>
+    <dgm:cxn modelId="{DCC459A1-79A9-4C0C-8368-D6584EEFEABC}" type="presOf" srcId="{ABE55376-B9C6-487C-AD38-9BD25390EE75}" destId="{139E35F9-A021-422B-A3EE-F99867EAA5D9}" srcOrd="0" destOrd="0" presId="urn:microsoft.com/office/officeart/2005/8/layout/lProcess1"/>
+    <dgm:cxn modelId="{31AA94ED-D0FD-4D44-8F70-FE7247D8C70F}" type="presOf" srcId="{42693A09-D334-4279-A0F7-C19D08CDE280}" destId="{F08BBB78-1D36-45B5-9104-730D1A9CD3AE}" srcOrd="0" destOrd="0" presId="urn:microsoft.com/office/officeart/2005/8/layout/lProcess1"/>
+    <dgm:cxn modelId="{DB9E2177-C3E1-4F6B-B99D-467B250E5684}" srcId="{47F99050-C4B9-4AE8-85E7-0F40ECA7EF12}" destId="{497C85C1-2BA4-4E58-B629-50E81F68CB7A}" srcOrd="0" destOrd="0" parTransId="{6403F1C7-30BE-47C1-B907-7B79DC54C3D7}" sibTransId="{17F9D3A2-DFF9-4F1A-9C12-E9AD2A7E0302}"/>
+    <dgm:cxn modelId="{43BF464B-B69C-490B-BA86-9372959BA80C}" type="presOf" srcId="{FF1DCEE5-248E-496F-86F6-E709CAD4C4BC}" destId="{D237ED92-7ED4-4A47-8BB1-E88334868F0B}" srcOrd="0" destOrd="0" presId="urn:microsoft.com/office/officeart/2005/8/layout/lProcess1"/>
+    <dgm:cxn modelId="{E9A7BAE6-BEEF-4FA3-9E57-7487BC2EA7E5}" type="presOf" srcId="{3CC15E98-F09E-46C4-8710-53A52828F77D}" destId="{5784213F-0272-4E91-A488-E34103EE77BF}" srcOrd="0" destOrd="0" presId="urn:microsoft.com/office/officeart/2005/8/layout/lProcess1"/>
+    <dgm:cxn modelId="{25144A64-D7A1-4AEA-8266-E48BBA7D1C02}" srcId="{ABE55376-B9C6-487C-AD38-9BD25390EE75}" destId="{AEC3EE32-5217-40B6-9BF6-C5F9CA3CE607}" srcOrd="0" destOrd="0" parTransId="{3CC15E98-F09E-46C4-8710-53A52828F77D}" sibTransId="{D205FB33-F5AC-4D7B-863F-4A5D49625412}"/>
+    <dgm:cxn modelId="{C0209A85-6850-45F0-8CDE-CC6E9E590ABC}" srcId="{B2951EE1-3465-4C95-87EB-379D6C8BC820}" destId="{531B3967-25C6-4142-9364-52CF28354393}" srcOrd="1" destOrd="0" parTransId="{B4A8E85F-75B8-40B7-A962-0232DC293170}" sibTransId="{1D8522B7-AA79-4822-9CFC-1C1AABCC7641}"/>
+    <dgm:cxn modelId="{C731D225-E1E4-4E7E-9168-715D1E681425}" srcId="{9EF412E8-EB21-49C9-8153-F1009AB26693}" destId="{B0351FEC-00B4-450F-A319-1012D79FCD7E}" srcOrd="1" destOrd="0" parTransId="{B89309DC-8D99-4976-AADC-5BFF99C760DF}" sibTransId="{6322A5A9-2650-458A-84DB-F5E363BD29CD}"/>
+    <dgm:cxn modelId="{3B57530E-E1FB-4F3D-BA07-1BD153AC52A0}" type="presOf" srcId="{8DE6327D-A1F8-4AA9-B89F-061051A1E118}" destId="{50B8B4B6-01A1-47E8-80C8-D029174F0045}" srcOrd="0" destOrd="0" presId="urn:microsoft.com/office/officeart/2005/8/layout/lProcess1"/>
+    <dgm:cxn modelId="{ED20C477-B580-407D-A303-B5C5A2E02738}" srcId="{FF1DCEE5-248E-496F-86F6-E709CAD4C4BC}" destId="{47F99050-C4B9-4AE8-85E7-0F40ECA7EF12}" srcOrd="3" destOrd="0" parTransId="{0A9562B0-E76C-423F-B10C-2109BBC35BB8}" sibTransId="{650E5D5F-D128-4455-BC45-EEF0B043938C}"/>
+    <dgm:cxn modelId="{79258257-9463-4FA3-97ED-5A9F01CAA77D}" srcId="{FF1DCEE5-248E-496F-86F6-E709CAD4C4BC}" destId="{B2951EE1-3465-4C95-87EB-379D6C8BC820}" srcOrd="0" destOrd="0" parTransId="{19242C52-8ABC-4DF0-B626-0C7A98BA35F7}" sibTransId="{D9450A57-D831-4363-8A6B-F17FAC5233E4}"/>
+    <dgm:cxn modelId="{68185BA4-7E9A-4E5A-8845-BF2B9951BC4E}" type="presOf" srcId="{531B3967-25C6-4142-9364-52CF28354393}" destId="{CA316164-C52F-46E0-B335-77929574E012}" srcOrd="0" destOrd="0" presId="urn:microsoft.com/office/officeart/2005/8/layout/lProcess1"/>
+    <dgm:cxn modelId="{5E1F08FC-3333-4B56-87ED-F65EB43F85D5}" type="presOf" srcId="{C181D51F-1EC5-414F-9829-EB6F6B38C78B}" destId="{40286D35-8CA8-436E-9008-2C5C0141454F}" srcOrd="0" destOrd="0" presId="urn:microsoft.com/office/officeart/2005/8/layout/lProcess1"/>
+    <dgm:cxn modelId="{BBCD05D9-ABDD-447F-A4F1-2FA6C1EC4E1A}" type="presOf" srcId="{B2951EE1-3465-4C95-87EB-379D6C8BC820}" destId="{7BDBB33D-5CE7-43F4-ACBA-C713FCCD0D08}" srcOrd="0" destOrd="0" presId="urn:microsoft.com/office/officeart/2005/8/layout/lProcess1"/>
+    <dgm:cxn modelId="{4B992A60-18C9-4C63-B50C-D29B735E67E4}" type="presOf" srcId="{E2DCDC5A-990F-44DB-8FBD-1BECB81FB5BA}" destId="{5D764795-966C-4F53-9A01-B4FEEFA0BF5B}" srcOrd="0" destOrd="0" presId="urn:microsoft.com/office/officeart/2005/8/layout/lProcess1"/>
+    <dgm:cxn modelId="{DAF458CC-E578-4B0A-B7ED-B8944993FD93}" type="presOf" srcId="{AEC3EE32-5217-40B6-9BF6-C5F9CA3CE607}" destId="{D19AF41A-4A27-443D-A04C-75CAB550D324}" srcOrd="0" destOrd="0" presId="urn:microsoft.com/office/officeart/2005/8/layout/lProcess1"/>
+    <dgm:cxn modelId="{6028098F-A718-44C1-B2D8-EDFC0228FA7D}" type="presOf" srcId="{9EF412E8-EB21-49C9-8153-F1009AB26693}" destId="{87BFC86C-4BCA-462C-B691-D76D2907C82A}" srcOrd="0" destOrd="0" presId="urn:microsoft.com/office/officeart/2005/8/layout/lProcess1"/>
+    <dgm:cxn modelId="{0997E4C5-1F44-402F-BB3E-62E1665CD1E4}" type="presOf" srcId="{B0351FEC-00B4-450F-A319-1012D79FCD7E}" destId="{9BD4878A-053E-44F5-A6F3-2B977983FF76}" srcOrd="0" destOrd="0" presId="urn:microsoft.com/office/officeart/2005/8/layout/lProcess1"/>
+    <dgm:cxn modelId="{5D9181AA-690B-4CEB-A0EC-ECBB6E842917}" type="presOf" srcId="{6403F1C7-30BE-47C1-B907-7B79DC54C3D7}" destId="{90DCE11D-36EA-44D1-83B5-B10761EA554C}" srcOrd="0" destOrd="0" presId="urn:microsoft.com/office/officeart/2005/8/layout/lProcess1"/>
+    <dgm:cxn modelId="{2A78A4D2-D49B-45D3-AEDC-FC6A10095FA8}" type="presOf" srcId="{497C85C1-2BA4-4E58-B629-50E81F68CB7A}" destId="{DF33878E-5D53-4B3F-A9D0-369D9D8947A2}" srcOrd="0" destOrd="0" presId="urn:microsoft.com/office/officeart/2005/8/layout/lProcess1"/>
+    <dgm:cxn modelId="{5964A6E4-587C-454E-A1B0-0F0805C0FBD0}" type="presOf" srcId="{D205FB33-F5AC-4D7B-863F-4A5D49625412}" destId="{5A44B652-FF40-4ABC-9BD2-4C442839E94C}" srcOrd="0" destOrd="0" presId="urn:microsoft.com/office/officeart/2005/8/layout/lProcess1"/>
+    <dgm:cxn modelId="{1C717A0B-9EA4-4517-A88F-A6A584D1F7F5}" srcId="{FF1DCEE5-248E-496F-86F6-E709CAD4C4BC}" destId="{ABE55376-B9C6-487C-AD38-9BD25390EE75}" srcOrd="1" destOrd="0" parTransId="{13CB3BBD-D724-44CD-A73C-F6550C8E925B}" sibTransId="{0023D312-6DDD-433D-B3E7-2502D31B05D0}"/>
+    <dgm:cxn modelId="{0ED35EB1-A23C-40BE-B32C-DBE5ECF20DFE}" type="presOf" srcId="{40ABCF4E-B4F7-44B8-84DA-B5FF81C8757D}" destId="{8472C19D-7D7C-48F2-A09F-742AEA9DB007}" srcOrd="0" destOrd="0" presId="urn:microsoft.com/office/officeart/2005/8/layout/lProcess1"/>
+    <dgm:cxn modelId="{FB80A565-96D5-4995-88EE-5BAB532771CB}" type="presOf" srcId="{47F99050-C4B9-4AE8-85E7-0F40ECA7EF12}" destId="{D3AF237B-171F-4217-AD54-BE32220B9E7E}" srcOrd="0" destOrd="0" presId="urn:microsoft.com/office/officeart/2005/8/layout/lProcess1"/>
+    <dgm:cxn modelId="{C41986B3-9EDE-4A97-934F-3E7790D089AD}" srcId="{ABE55376-B9C6-487C-AD38-9BD25390EE75}" destId="{40ABCF4E-B4F7-44B8-84DA-B5FF81C8757D}" srcOrd="1" destOrd="0" parTransId="{0A5BD047-F0D2-4372-8C15-8C5396B14547}" sibTransId="{5346C8F5-F119-47DE-979C-62A751F14E22}"/>
     <dgm:cxn modelId="{D5DE17B7-4517-4B1A-983B-C418EFEEECFA}" srcId="{47F99050-C4B9-4AE8-85E7-0F40ECA7EF12}" destId="{C181D51F-1EC5-414F-9829-EB6F6B38C78B}" srcOrd="1" destOrd="0" parTransId="{FD23C63D-EBB1-422E-BC25-BAE519070901}" sibTransId="{1B118362-1023-4EE7-B21D-B21A92BDAD8A}"/>
-    <dgm:cxn modelId="{79258257-9463-4FA3-97ED-5A9F01CAA77D}" srcId="{FF1DCEE5-248E-496F-86F6-E709CAD4C4BC}" destId="{B2951EE1-3465-4C95-87EB-379D6C8BC820}" srcOrd="0" destOrd="0" parTransId="{19242C52-8ABC-4DF0-B626-0C7A98BA35F7}" sibTransId="{D9450A57-D831-4363-8A6B-F17FAC5233E4}"/>
-    <dgm:cxn modelId="{2A78A4D2-D49B-45D3-AEDC-FC6A10095FA8}" type="presOf" srcId="{497C85C1-2BA4-4E58-B629-50E81F68CB7A}" destId="{DF33878E-5D53-4B3F-A9D0-369D9D8947A2}" srcOrd="0" destOrd="0" presId="urn:microsoft.com/office/officeart/2005/8/layout/lProcess1"/>
-    <dgm:cxn modelId="{ED20C477-B580-407D-A303-B5C5A2E02738}" srcId="{FF1DCEE5-248E-496F-86F6-E709CAD4C4BC}" destId="{47F99050-C4B9-4AE8-85E7-0F40ECA7EF12}" srcOrd="3" destOrd="0" parTransId="{0A9562B0-E76C-423F-B10C-2109BBC35BB8}" sibTransId="{650E5D5F-D128-4455-BC45-EEF0B043938C}"/>
-    <dgm:cxn modelId="{C41986B3-9EDE-4A97-934F-3E7790D089AD}" srcId="{ABE55376-B9C6-487C-AD38-9BD25390EE75}" destId="{40ABCF4E-B4F7-44B8-84DA-B5FF81C8757D}" srcOrd="1" destOrd="0" parTransId="{0A5BD047-F0D2-4372-8C15-8C5396B14547}" sibTransId="{5346C8F5-F119-47DE-979C-62A751F14E22}"/>
-    <dgm:cxn modelId="{5E1F08FC-3333-4B56-87ED-F65EB43F85D5}" type="presOf" srcId="{C181D51F-1EC5-414F-9829-EB6F6B38C78B}" destId="{40286D35-8CA8-436E-9008-2C5C0141454F}" srcOrd="0" destOrd="0" presId="urn:microsoft.com/office/officeart/2005/8/layout/lProcess1"/>
-    <dgm:cxn modelId="{24B36CC5-9E23-4288-83A1-946A964D26CF}" type="presOf" srcId="{17F9D3A2-DFF9-4F1A-9C12-E9AD2A7E0302}" destId="{52252059-5659-40E4-B8C3-642B6677E4C6}" srcOrd="0" destOrd="0" presId="urn:microsoft.com/office/officeart/2005/8/layout/lProcess1"/>
-    <dgm:cxn modelId="{4B992A60-18C9-4C63-B50C-D29B735E67E4}" type="presOf" srcId="{E2DCDC5A-990F-44DB-8FBD-1BECB81FB5BA}" destId="{5D764795-966C-4F53-9A01-B4FEEFA0BF5B}" srcOrd="0" destOrd="0" presId="urn:microsoft.com/office/officeart/2005/8/layout/lProcess1"/>
-    <dgm:cxn modelId="{3B57530E-E1FB-4F3D-BA07-1BD153AC52A0}" type="presOf" srcId="{8DE6327D-A1F8-4AA9-B89F-061051A1E118}" destId="{50B8B4B6-01A1-47E8-80C8-D029174F0045}" srcOrd="0" destOrd="0" presId="urn:microsoft.com/office/officeart/2005/8/layout/lProcess1"/>
-    <dgm:cxn modelId="{3A2BD304-9822-4F9D-9ED2-E2B6C3BD4102}" type="presOf" srcId="{159A71CA-ADA8-4CA0-9589-56CFD68103AF}" destId="{220A4533-BE80-42DA-BA97-817D933198DE}" srcOrd="0" destOrd="0" presId="urn:microsoft.com/office/officeart/2005/8/layout/lProcess1"/>
-    <dgm:cxn modelId="{C731D225-E1E4-4E7E-9168-715D1E681425}" srcId="{9EF412E8-EB21-49C9-8153-F1009AB26693}" destId="{B0351FEC-00B4-450F-A319-1012D79FCD7E}" srcOrd="1" destOrd="0" parTransId="{B89309DC-8D99-4976-AADC-5BFF99C760DF}" sibTransId="{6322A5A9-2650-458A-84DB-F5E363BD29CD}"/>
-    <dgm:cxn modelId="{6028098F-A718-44C1-B2D8-EDFC0228FA7D}" type="presOf" srcId="{9EF412E8-EB21-49C9-8153-F1009AB26693}" destId="{87BFC86C-4BCA-462C-B691-D76D2907C82A}" srcOrd="0" destOrd="0" presId="urn:microsoft.com/office/officeart/2005/8/layout/lProcess1"/>
-    <dgm:cxn modelId="{6410A7FF-36FD-402A-BEEC-7E0F864DF72C}" srcId="{FF1DCEE5-248E-496F-86F6-E709CAD4C4BC}" destId="{9EF412E8-EB21-49C9-8153-F1009AB26693}" srcOrd="2" destOrd="0" parTransId="{103CCF25-8720-451E-9C2D-7477383EDC18}" sibTransId="{4E5D6CB8-FC1E-4307-A290-D1737A514288}"/>
-    <dgm:cxn modelId="{FB80A565-96D5-4995-88EE-5BAB532771CB}" type="presOf" srcId="{47F99050-C4B9-4AE8-85E7-0F40ECA7EF12}" destId="{D3AF237B-171F-4217-AD54-BE32220B9E7E}" srcOrd="0" destOrd="0" presId="urn:microsoft.com/office/officeart/2005/8/layout/lProcess1"/>
-    <dgm:cxn modelId="{DB9E2177-C3E1-4F6B-B99D-467B250E5684}" srcId="{47F99050-C4B9-4AE8-85E7-0F40ECA7EF12}" destId="{497C85C1-2BA4-4E58-B629-50E81F68CB7A}" srcOrd="0" destOrd="0" parTransId="{6403F1C7-30BE-47C1-B907-7B79DC54C3D7}" sibTransId="{17F9D3A2-DFF9-4F1A-9C12-E9AD2A7E0302}"/>
-    <dgm:cxn modelId="{BBCD05D9-ABDD-447F-A4F1-2FA6C1EC4E1A}" type="presOf" srcId="{B2951EE1-3465-4C95-87EB-379D6C8BC820}" destId="{7BDBB33D-5CE7-43F4-ACBA-C713FCCD0D08}" srcOrd="0" destOrd="0" presId="urn:microsoft.com/office/officeart/2005/8/layout/lProcess1"/>
-    <dgm:cxn modelId="{5964A6E4-587C-454E-A1B0-0F0805C0FBD0}" type="presOf" srcId="{D205FB33-F5AC-4D7B-863F-4A5D49625412}" destId="{5A44B652-FF40-4ABC-9BD2-4C442839E94C}" srcOrd="0" destOrd="0" presId="urn:microsoft.com/office/officeart/2005/8/layout/lProcess1"/>
-    <dgm:cxn modelId="{5D9181AA-690B-4CEB-A0EC-ECBB6E842917}" type="presOf" srcId="{6403F1C7-30BE-47C1-B907-7B79DC54C3D7}" destId="{90DCE11D-36EA-44D1-83B5-B10761EA554C}" srcOrd="0" destOrd="0" presId="urn:microsoft.com/office/officeart/2005/8/layout/lProcess1"/>
-    <dgm:cxn modelId="{31AA94ED-D0FD-4D44-8F70-FE7247D8C70F}" type="presOf" srcId="{42693A09-D334-4279-A0F7-C19D08CDE280}" destId="{F08BBB78-1D36-45B5-9104-730D1A9CD3AE}" srcOrd="0" destOrd="0" presId="urn:microsoft.com/office/officeart/2005/8/layout/lProcess1"/>
-    <dgm:cxn modelId="{0ED35EB1-A23C-40BE-B32C-DBE5ECF20DFE}" type="presOf" srcId="{40ABCF4E-B4F7-44B8-84DA-B5FF81C8757D}" destId="{8472C19D-7D7C-48F2-A09F-742AEA9DB007}" srcOrd="0" destOrd="0" presId="urn:microsoft.com/office/officeart/2005/8/layout/lProcess1"/>
-    <dgm:cxn modelId="{5D030CBB-0215-44FE-ADE9-046ECD4EA795}" type="presOf" srcId="{D3B81CFE-F024-4A2F-A036-45C7DC70E930}" destId="{DCDC15D9-667E-409D-9980-2FC1E9E34816}" srcOrd="0" destOrd="0" presId="urn:microsoft.com/office/officeart/2005/8/layout/lProcess1"/>
-    <dgm:cxn modelId="{25144A64-D7A1-4AEA-8266-E48BBA7D1C02}" srcId="{ABE55376-B9C6-487C-AD38-9BD25390EE75}" destId="{AEC3EE32-5217-40B6-9BF6-C5F9CA3CE607}" srcOrd="0" destOrd="0" parTransId="{3CC15E98-F09E-46C4-8710-53A52828F77D}" sibTransId="{D205FB33-F5AC-4D7B-863F-4A5D49625412}"/>
-    <dgm:cxn modelId="{B2ADF806-6659-44FF-A522-FB09CF22B6BC}" srcId="{9EF412E8-EB21-49C9-8153-F1009AB26693}" destId="{8DE6327D-A1F8-4AA9-B89F-061051A1E118}" srcOrd="0" destOrd="0" parTransId="{42693A09-D334-4279-A0F7-C19D08CDE280}" sibTransId="{CA01D505-80DB-4086-9399-6B431F45D49D}"/>
-    <dgm:cxn modelId="{DCC459A1-79A9-4C0C-8368-D6584EEFEABC}" type="presOf" srcId="{ABE55376-B9C6-487C-AD38-9BD25390EE75}" destId="{139E35F9-A021-422B-A3EE-F99867EAA5D9}" srcOrd="0" destOrd="0" presId="urn:microsoft.com/office/officeart/2005/8/layout/lProcess1"/>
-    <dgm:cxn modelId="{DAF458CC-E578-4B0A-B7ED-B8944993FD93}" type="presOf" srcId="{AEC3EE32-5217-40B6-9BF6-C5F9CA3CE607}" destId="{D19AF41A-4A27-443D-A04C-75CAB550D324}" srcOrd="0" destOrd="0" presId="urn:microsoft.com/office/officeart/2005/8/layout/lProcess1"/>
-    <dgm:cxn modelId="{1F1FFC82-6640-4AD6-90B1-7DF8FE6A0111}" srcId="{B2951EE1-3465-4C95-87EB-379D6C8BC820}" destId="{D3B81CFE-F024-4A2F-A036-45C7DC70E930}" srcOrd="0" destOrd="0" parTransId="{E2DCDC5A-990F-44DB-8FBD-1BECB81FB5BA}" sibTransId="{159A71CA-ADA8-4CA0-9589-56CFD68103AF}"/>
-    <dgm:cxn modelId="{0997E4C5-1F44-402F-BB3E-62E1665CD1E4}" type="presOf" srcId="{B0351FEC-00B4-450F-A319-1012D79FCD7E}" destId="{9BD4878A-053E-44F5-A6F3-2B977983FF76}" srcOrd="0" destOrd="0" presId="urn:microsoft.com/office/officeart/2005/8/layout/lProcess1"/>
     <dgm:cxn modelId="{B0FD8DDB-8B8E-4544-9B35-44242CD37344}" type="presOf" srcId="{CA01D505-80DB-4086-9399-6B431F45D49D}" destId="{3629B93E-0DDE-4147-B818-81758F5DD307}" srcOrd="0" destOrd="0" presId="urn:microsoft.com/office/officeart/2005/8/layout/lProcess1"/>
-    <dgm:cxn modelId="{1C717A0B-9EA4-4517-A88F-A6A584D1F7F5}" srcId="{FF1DCEE5-248E-496F-86F6-E709CAD4C4BC}" destId="{ABE55376-B9C6-487C-AD38-9BD25390EE75}" srcOrd="1" destOrd="0" parTransId="{13CB3BBD-D724-44CD-A73C-F6550C8E925B}" sibTransId="{0023D312-6DDD-433D-B3E7-2502D31B05D0}"/>
-    <dgm:cxn modelId="{68185BA4-7E9A-4E5A-8845-BF2B9951BC4E}" type="presOf" srcId="{531B3967-25C6-4142-9364-52CF28354393}" destId="{CA316164-C52F-46E0-B335-77929574E012}" srcOrd="0" destOrd="0" presId="urn:microsoft.com/office/officeart/2005/8/layout/lProcess1"/>
-    <dgm:cxn modelId="{E9A7BAE6-BEEF-4FA3-9E57-7487BC2EA7E5}" type="presOf" srcId="{3CC15E98-F09E-46C4-8710-53A52828F77D}" destId="{5784213F-0272-4E91-A488-E34103EE77BF}" srcOrd="0" destOrd="0" presId="urn:microsoft.com/office/officeart/2005/8/layout/lProcess1"/>
-    <dgm:cxn modelId="{43BF464B-B69C-490B-BA86-9372959BA80C}" type="presOf" srcId="{FF1DCEE5-248E-496F-86F6-E709CAD4C4BC}" destId="{D237ED92-7ED4-4A47-8BB1-E88334868F0B}" srcOrd="0" destOrd="0" presId="urn:microsoft.com/office/officeart/2005/8/layout/lProcess1"/>
-    <dgm:cxn modelId="{C0209A85-6850-45F0-8CDE-CC6E9E590ABC}" srcId="{B2951EE1-3465-4C95-87EB-379D6C8BC820}" destId="{531B3967-25C6-4142-9364-52CF28354393}" srcOrd="1" destOrd="0" parTransId="{B4A8E85F-75B8-40B7-A962-0232DC293170}" sibTransId="{1D8522B7-AA79-4822-9CFC-1C1AABCC7641}"/>
     <dgm:cxn modelId="{1BEB6370-F0A5-44B1-AAB0-10B4E8854188}" type="presParOf" srcId="{D237ED92-7ED4-4A47-8BB1-E88334868F0B}" destId="{B08E842E-53A1-4903-9B11-81180F12B964}" srcOrd="0" destOrd="0" presId="urn:microsoft.com/office/officeart/2005/8/layout/lProcess1"/>
     <dgm:cxn modelId="{4C387FE3-A02B-4BD8-A2A2-88A9203F54D4}" type="presParOf" srcId="{B08E842E-53A1-4903-9B11-81180F12B964}" destId="{7BDBB33D-5CE7-43F4-ACBA-C713FCCD0D08}" srcOrd="0" destOrd="0" presId="urn:microsoft.com/office/officeart/2005/8/layout/lProcess1"/>
     <dgm:cxn modelId="{76E94C11-9A67-48D7-9015-470B21558957}" type="presParOf" srcId="{B08E842E-53A1-4903-9B11-81180F12B964}" destId="{5D764795-966C-4F53-9A01-B4FEEFA0BF5B}" srcOrd="1" destOrd="0" presId="urn:microsoft.com/office/officeart/2005/8/layout/lProcess1"/>
@@ -11369,12 +11512,12 @@
         <a:fontRef idx="minor"/>
       </dsp:style>
       <dsp:txBody>
-        <a:bodyPr spcFirstLastPara="0" vert="horz" wrap="square" lIns="30480" tIns="30480" rIns="30480" bIns="30480" numCol="1" spcCol="1270" anchor="ctr" anchorCtr="0">
+        <a:bodyPr spcFirstLastPara="0" vert="horz" wrap="square" lIns="16510" tIns="16510" rIns="16510" bIns="16510" numCol="1" spcCol="1270" anchor="ctr" anchorCtr="0">
           <a:noAutofit/>
         </a:bodyPr>
         <a:lstStyle/>
         <a:p>
-          <a:pPr lvl="0" algn="ctr" defTabSz="1066800">
+          <a:pPr lvl="0" algn="ctr" defTabSz="577850">
             <a:lnSpc>
               <a:spcPct val="90000"/>
             </a:lnSpc>
@@ -11386,10 +11529,10 @@
             </a:spcAft>
           </a:pPr>
           <a:r>
-            <a:rPr lang="en-US" sz="2400" kern="1200" dirty="0" smtClean="0"/>
-            <a:t>Model</a:t>
+            <a:rPr lang="en-US" sz="1300" kern="1200" dirty="0" smtClean="0"/>
+            <a:t>Library</a:t>
           </a:r>
-          <a:endParaRPr lang="en-US" sz="2400" kern="1200" dirty="0"/>
+          <a:endParaRPr lang="en-US" sz="1300" kern="1200" dirty="0"/>
         </a:p>
       </dsp:txBody>
       <dsp:txXfrm>
@@ -11495,12 +11638,12 @@
         <a:fontRef idx="minor"/>
       </dsp:style>
       <dsp:txBody>
-        <a:bodyPr spcFirstLastPara="0" vert="horz" wrap="square" lIns="30480" tIns="30480" rIns="30480" bIns="30480" numCol="1" spcCol="1270" anchor="ctr" anchorCtr="0">
+        <a:bodyPr spcFirstLastPara="0" vert="horz" wrap="square" lIns="16510" tIns="16510" rIns="16510" bIns="16510" numCol="1" spcCol="1270" anchor="ctr" anchorCtr="0">
           <a:noAutofit/>
         </a:bodyPr>
         <a:lstStyle/>
         <a:p>
-          <a:pPr lvl="0" algn="ctr" defTabSz="1066800">
+          <a:pPr lvl="0" algn="ctr" defTabSz="577850">
             <a:lnSpc>
               <a:spcPct val="90000"/>
             </a:lnSpc>
@@ -11512,10 +11655,10 @@
             </a:spcAft>
           </a:pPr>
           <a:r>
-            <a:rPr lang="en-US" sz="2400" kern="1200" dirty="0" smtClean="0"/>
-            <a:t>Price</a:t>
+            <a:rPr lang="en-US" sz="1300" kern="1200" dirty="0" smtClean="0"/>
+            <a:t>Integration Example (UI)</a:t>
           </a:r>
-          <a:endParaRPr lang="en-US" sz="2400" kern="1200" dirty="0"/>
+          <a:endParaRPr lang="en-US" sz="1300" kern="1200" dirty="0"/>
         </a:p>
       </dsp:txBody>
       <dsp:txXfrm>
@@ -11700,12 +11843,12 @@
         <a:fontRef idx="minor"/>
       </dsp:style>
       <dsp:txBody>
-        <a:bodyPr spcFirstLastPara="0" vert="horz" wrap="square" lIns="30480" tIns="30480" rIns="30480" bIns="30480" numCol="1" spcCol="1270" anchor="ctr" anchorCtr="0">
+        <a:bodyPr spcFirstLastPara="0" vert="horz" wrap="square" lIns="16510" tIns="16510" rIns="16510" bIns="16510" numCol="1" spcCol="1270" anchor="ctr" anchorCtr="0">
           <a:noAutofit/>
         </a:bodyPr>
         <a:lstStyle/>
         <a:p>
-          <a:pPr lvl="0" algn="ctr" defTabSz="1066800">
+          <a:pPr lvl="0" algn="ctr" defTabSz="577850">
             <a:lnSpc>
               <a:spcPct val="90000"/>
             </a:lnSpc>
@@ -11717,10 +11860,10 @@
             </a:spcAft>
           </a:pPr>
           <a:r>
-            <a:rPr lang="en-US" sz="2400" kern="1200" dirty="0" smtClean="0"/>
-            <a:t>Model</a:t>
+            <a:rPr lang="en-US" sz="1300" kern="1200" dirty="0" smtClean="0"/>
+            <a:t>Library</a:t>
           </a:r>
-          <a:endParaRPr lang="en-US" sz="2400" kern="1200" dirty="0"/>
+          <a:endParaRPr lang="en-US" sz="1300" kern="1200" dirty="0"/>
         </a:p>
       </dsp:txBody>
       <dsp:txXfrm>
@@ -11826,12 +11969,12 @@
         <a:fontRef idx="minor"/>
       </dsp:style>
       <dsp:txBody>
-        <a:bodyPr spcFirstLastPara="0" vert="horz" wrap="square" lIns="30480" tIns="30480" rIns="30480" bIns="30480" numCol="1" spcCol="1270" anchor="ctr" anchorCtr="0">
+        <a:bodyPr spcFirstLastPara="0" vert="horz" wrap="square" lIns="16510" tIns="16510" rIns="16510" bIns="16510" numCol="1" spcCol="1270" anchor="ctr" anchorCtr="0">
           <a:noAutofit/>
         </a:bodyPr>
         <a:lstStyle/>
         <a:p>
-          <a:pPr lvl="0" algn="ctr" defTabSz="1066800">
+          <a:pPr lvl="0" algn="ctr" defTabSz="577850">
             <a:lnSpc>
               <a:spcPct val="90000"/>
             </a:lnSpc>
@@ -11843,10 +11986,18 @@
             </a:spcAft>
           </a:pPr>
           <a:r>
-            <a:rPr lang="en-US" sz="2400" kern="1200" dirty="0" smtClean="0"/>
-            <a:t>Price</a:t>
+            <a:rPr lang="en-US" sz="1300" kern="1200" dirty="0" smtClean="0"/>
+            <a:t>Integration Examples (</a:t>
           </a:r>
-          <a:endParaRPr lang="en-US" sz="2400" kern="1200" dirty="0"/>
+          <a:r>
+            <a:rPr lang="en-US" sz="1300" kern="1200" dirty="0" err="1" smtClean="0"/>
+            <a:t>Scala</a:t>
+          </a:r>
+          <a:r>
+            <a:rPr lang="en-US" sz="1300" kern="1200" dirty="0" smtClean="0"/>
+            <a:t>/Java)</a:t>
+          </a:r>
+          <a:endParaRPr lang="en-US" sz="1300" kern="1200" dirty="0"/>
         </a:p>
       </dsp:txBody>
       <dsp:txXfrm>
@@ -12031,12 +12182,12 @@
         <a:fontRef idx="minor"/>
       </dsp:style>
       <dsp:txBody>
-        <a:bodyPr spcFirstLastPara="0" vert="horz" wrap="square" lIns="30480" tIns="30480" rIns="30480" bIns="30480" numCol="1" spcCol="1270" anchor="ctr" anchorCtr="0">
+        <a:bodyPr spcFirstLastPara="0" vert="horz" wrap="square" lIns="16510" tIns="16510" rIns="16510" bIns="16510" numCol="1" spcCol="1270" anchor="ctr" anchorCtr="0">
           <a:noAutofit/>
         </a:bodyPr>
         <a:lstStyle/>
         <a:p>
-          <a:pPr lvl="0" algn="ctr" defTabSz="1066800">
+          <a:pPr lvl="0" algn="ctr" defTabSz="577850">
             <a:lnSpc>
               <a:spcPct val="90000"/>
             </a:lnSpc>
@@ -12048,10 +12199,10 @@
             </a:spcAft>
           </a:pPr>
           <a:r>
-            <a:rPr lang="en-US" sz="2400" kern="1200" dirty="0" smtClean="0"/>
-            <a:t>Model</a:t>
+            <a:rPr lang="en-US" sz="1300" kern="1200" dirty="0" smtClean="0"/>
+            <a:t>TODO</a:t>
           </a:r>
-          <a:endParaRPr lang="en-US" sz="2400" kern="1200" dirty="0"/>
+          <a:endParaRPr lang="en-US" sz="1300" kern="1200" dirty="0"/>
         </a:p>
       </dsp:txBody>
       <dsp:txXfrm>
@@ -12157,12 +12308,12 @@
         <a:fontRef idx="minor"/>
       </dsp:style>
       <dsp:txBody>
-        <a:bodyPr spcFirstLastPara="0" vert="horz" wrap="square" lIns="30480" tIns="30480" rIns="30480" bIns="30480" numCol="1" spcCol="1270" anchor="ctr" anchorCtr="0">
+        <a:bodyPr spcFirstLastPara="0" vert="horz" wrap="square" lIns="16510" tIns="16510" rIns="16510" bIns="16510" numCol="1" spcCol="1270" anchor="ctr" anchorCtr="0">
           <a:noAutofit/>
         </a:bodyPr>
         <a:lstStyle/>
         <a:p>
-          <a:pPr lvl="0" algn="ctr" defTabSz="1066800">
+          <a:pPr lvl="0" algn="ctr" defTabSz="577850">
             <a:lnSpc>
               <a:spcPct val="90000"/>
             </a:lnSpc>
@@ -12174,10 +12325,10 @@
             </a:spcAft>
           </a:pPr>
           <a:r>
-            <a:rPr lang="en-US" sz="2400" kern="1200" dirty="0" smtClean="0"/>
-            <a:t>Price</a:t>
+            <a:rPr lang="en-US" sz="1300" kern="1200" dirty="0" smtClean="0"/>
+            <a:t>TODO</a:t>
           </a:r>
-          <a:endParaRPr lang="en-US" sz="2400" kern="1200" dirty="0"/>
+          <a:endParaRPr lang="en-US" sz="1300" kern="1200" dirty="0"/>
         </a:p>
       </dsp:txBody>
       <dsp:txXfrm>
@@ -12362,12 +12513,12 @@
         <a:fontRef idx="minor"/>
       </dsp:style>
       <dsp:txBody>
-        <a:bodyPr spcFirstLastPara="0" vert="horz" wrap="square" lIns="30480" tIns="30480" rIns="30480" bIns="30480" numCol="1" spcCol="1270" anchor="ctr" anchorCtr="0">
+        <a:bodyPr spcFirstLastPara="0" vert="horz" wrap="square" lIns="16510" tIns="16510" rIns="16510" bIns="16510" numCol="1" spcCol="1270" anchor="ctr" anchorCtr="0">
           <a:noAutofit/>
         </a:bodyPr>
         <a:lstStyle/>
         <a:p>
-          <a:pPr lvl="0" algn="ctr" defTabSz="1066800">
+          <a:pPr lvl="0" algn="ctr" defTabSz="577850">
             <a:lnSpc>
               <a:spcPct val="90000"/>
             </a:lnSpc>
@@ -12379,10 +12530,10 @@
             </a:spcAft>
           </a:pPr>
           <a:r>
-            <a:rPr lang="en-US" sz="2400" kern="1200" dirty="0" smtClean="0"/>
-            <a:t>A</a:t>
+            <a:rPr lang="en-US" sz="1300" kern="1200" dirty="0" smtClean="0"/>
+            <a:t>TODO</a:t>
           </a:r>
-          <a:endParaRPr lang="en-US" sz="2400" kern="1200" dirty="0"/>
+          <a:endParaRPr lang="en-US" sz="1300" kern="1200" dirty="0"/>
         </a:p>
       </dsp:txBody>
       <dsp:txXfrm>
@@ -12488,12 +12639,12 @@
         <a:fontRef idx="minor"/>
       </dsp:style>
       <dsp:txBody>
-        <a:bodyPr spcFirstLastPara="0" vert="horz" wrap="square" lIns="30480" tIns="30480" rIns="30480" bIns="30480" numCol="1" spcCol="1270" anchor="ctr" anchorCtr="0">
+        <a:bodyPr spcFirstLastPara="0" vert="horz" wrap="square" lIns="16510" tIns="16510" rIns="16510" bIns="16510" numCol="1" spcCol="1270" anchor="ctr" anchorCtr="0">
           <a:noAutofit/>
         </a:bodyPr>
         <a:lstStyle/>
         <a:p>
-          <a:pPr lvl="0" algn="ctr" defTabSz="1066800">
+          <a:pPr lvl="0" algn="ctr" defTabSz="577850">
             <a:lnSpc>
               <a:spcPct val="90000"/>
             </a:lnSpc>
@@ -12505,10 +12656,10 @@
             </a:spcAft>
           </a:pPr>
           <a:r>
-            <a:rPr lang="en-US" sz="2400" kern="1200" dirty="0" smtClean="0"/>
-            <a:t>B</a:t>
+            <a:rPr lang="en-US" sz="1300" kern="1200" dirty="0" smtClean="0"/>
+            <a:t>TODO</a:t>
           </a:r>
-          <a:endParaRPr lang="en-US" sz="2400" kern="1200" dirty="0"/>
+          <a:endParaRPr lang="en-US" sz="1300" kern="1200" dirty="0"/>
         </a:p>
       </dsp:txBody>
       <dsp:txXfrm>
@@ -21322,7 +21473,7 @@
             <a:fld id="{3739F75B-3842-4986-B379-A25F65D2E2D9}" type="datetimeFigureOut">
               <a:rPr lang="en-US" smtClean="0"/>
               <a:pPr/>
-              <a:t>6/6/2013</a:t>
+              <a:t>6/7/2013</a:t>
             </a:fld>
             <a:endParaRPr lang="en-US"/>
           </a:p>
@@ -21473,7 +21624,7 @@
             <a:fld id="{866387FC-CCBE-45D6-8023-B2729909DF51}" type="datetimeFigureOut">
               <a:rPr lang="en-US" smtClean="0"/>
               <a:pPr/>
-              <a:t>6/6/2013</a:t>
+              <a:t>6/7/2013</a:t>
             </a:fld>
             <a:endParaRPr lang="en-US"/>
           </a:p>
@@ -21810,7 +21961,7 @@
             <a:fld id="{866387FC-CCBE-45D6-8023-B2729909DF51}" type="datetimeFigureOut">
               <a:rPr lang="en-US" smtClean="0"/>
               <a:pPr/>
-              <a:t>6/6/2013</a:t>
+              <a:t>6/7/2013</a:t>
             </a:fld>
             <a:endParaRPr lang="en-US"/>
           </a:p>
@@ -21959,7 +22110,7 @@
             <a:fld id="{866387FC-CCBE-45D6-8023-B2729909DF51}" type="datetimeFigureOut">
               <a:rPr lang="en-US" smtClean="0"/>
               <a:pPr/>
-              <a:t>6/6/2013</a:t>
+              <a:t>6/7/2013</a:t>
             </a:fld>
             <a:endParaRPr lang="en-US"/>
           </a:p>
@@ -22108,7 +22259,7 @@
             <a:fld id="{866387FC-CCBE-45D6-8023-B2729909DF51}" type="datetimeFigureOut">
               <a:rPr lang="en-US" smtClean="0"/>
               <a:pPr/>
-              <a:t>6/6/2013</a:t>
+              <a:t>6/7/2013</a:t>
             </a:fld>
             <a:endParaRPr lang="en-US"/>
           </a:p>
@@ -22257,7 +22408,7 @@
             <a:fld id="{866387FC-CCBE-45D6-8023-B2729909DF51}" type="datetimeFigureOut">
               <a:rPr lang="en-US" smtClean="0"/>
               <a:pPr/>
-              <a:t>6/6/2013</a:t>
+              <a:t>6/7/2013</a:t>
             </a:fld>
             <a:endParaRPr lang="en-US"/>
           </a:p>
@@ -22406,7 +22557,7 @@
             <a:fld id="{866387FC-CCBE-45D6-8023-B2729909DF51}" type="datetimeFigureOut">
               <a:rPr lang="en-US" smtClean="0"/>
               <a:pPr/>
-              <a:t>6/6/2013</a:t>
+              <a:t>6/7/2013</a:t>
             </a:fld>
             <a:endParaRPr lang="en-US"/>
           </a:p>
@@ -22555,7 +22706,7 @@
             <a:fld id="{866387FC-CCBE-45D6-8023-B2729909DF51}" type="datetimeFigureOut">
               <a:rPr lang="en-US" smtClean="0"/>
               <a:pPr/>
-              <a:t>6/6/2013</a:t>
+              <a:t>6/7/2013</a:t>
             </a:fld>
             <a:endParaRPr lang="en-US"/>
           </a:p>
@@ -22598,7 +22749,7 @@
             <a:fld id="{BE1686F5-D9B0-4B87-9E68-28AD15F2A4F1}" type="slidenum">
               <a:rPr lang="en-US" smtClean="0"/>
               <a:pPr/>
-              <a:t>8</a:t>
+              <a:t>9</a:t>
             </a:fld>
             <a:endParaRPr lang="en-US"/>
           </a:p>
@@ -22704,7 +22855,7 @@
             <a:fld id="{866387FC-CCBE-45D6-8023-B2729909DF51}" type="datetimeFigureOut">
               <a:rPr lang="en-US" smtClean="0"/>
               <a:pPr/>
-              <a:t>6/6/2013</a:t>
+              <a:t>6/7/2013</a:t>
             </a:fld>
             <a:endParaRPr lang="en-US"/>
           </a:p>
@@ -22747,7 +22898,7 @@
             <a:fld id="{BE1686F5-D9B0-4B87-9E68-28AD15F2A4F1}" type="slidenum">
               <a:rPr lang="en-US" smtClean="0"/>
               <a:pPr/>
-              <a:t>9</a:t>
+              <a:t>10</a:t>
             </a:fld>
             <a:endParaRPr lang="en-US"/>
           </a:p>
@@ -22909,11 +23060,6 @@
             </a:lvl1pPr>
           </a:lstStyle>
           <a:p>
-            <a:fld id="{633EFA78-DE0E-433D-8CFA-D9FBF0D95DCD}" type="datetime1">
-              <a:rPr lang="en-US" smtClean="0"/>
-              <a:pPr/>
-              <a:t>6/6/2013</a:t>
-            </a:fld>
             <a:endParaRPr lang="en-US"/>
           </a:p>
         </p:txBody>
@@ -22937,6 +23083,10 @@
             </a:lvl1pPr>
           </a:lstStyle>
           <a:p>
+            <a:r>
+              <a:rPr lang="en-US" smtClean="0"/>
+              <a:t>Copyright (c) 2013 Chetan Gadgil</a:t>
+            </a:r>
             <a:endParaRPr lang="en-US"/>
           </a:p>
         </p:txBody>
@@ -23089,11 +23239,6 @@
           </a:lstStyle>
           <a:p>
             <a:pPr algn="r"/>
-            <a:fld id="{1BC102A9-C1B1-4354-89E4-F43472216A4F}" type="datetime1">
-              <a:rPr lang="en-US" smtClean="0"/>
-              <a:pPr algn="r"/>
-              <a:t>6/6/2013</a:t>
-            </a:fld>
             <a:endParaRPr lang="en-US" sz="1000" dirty="0">
               <a:solidFill>
                 <a:schemeClr val="bg2">
@@ -23124,6 +23269,16 @@
           </a:lstStyle>
           <a:p>
             <a:pPr algn="l"/>
+            <a:r>
+              <a:rPr lang="en-US" sz="1000" smtClean="0">
+                <a:solidFill>
+                  <a:schemeClr val="bg2">
+                    <a:shade val="50000"/>
+                  </a:schemeClr>
+                </a:solidFill>
+              </a:rPr>
+              <a:t>Copyright (c) 2013 Chetan Gadgil</a:t>
+            </a:r>
             <a:endParaRPr lang="en-US" sz="1000" dirty="0">
               <a:solidFill>
                 <a:schemeClr val="bg2">
@@ -23304,11 +23459,6 @@
           </a:lstStyle>
           <a:p>
             <a:pPr algn="r"/>
-            <a:fld id="{1BC102A9-C1B1-4354-89E4-F43472216A4F}" type="datetime1">
-              <a:rPr lang="en-US" smtClean="0"/>
-              <a:pPr algn="r"/>
-              <a:t>6/6/2013</a:t>
-            </a:fld>
             <a:endParaRPr lang="en-US" sz="1000" dirty="0">
               <a:solidFill>
                 <a:schemeClr val="bg2">
@@ -23339,6 +23489,16 @@
           </a:lstStyle>
           <a:p>
             <a:pPr algn="l"/>
+            <a:r>
+              <a:rPr lang="en-US" sz="1000" smtClean="0">
+                <a:solidFill>
+                  <a:schemeClr val="bg2">
+                    <a:shade val="50000"/>
+                  </a:schemeClr>
+                </a:solidFill>
+              </a:rPr>
+              <a:t>Copyright (c) 2013 Chetan Gadgil</a:t>
+            </a:r>
             <a:endParaRPr lang="en-US" sz="1000" dirty="0">
               <a:solidFill>
                 <a:schemeClr val="bg2">
@@ -23549,6 +23709,10 @@
             </a:lvl1pPr>
           </a:lstStyle>
           <a:p>
+            <a:r>
+              <a:rPr lang="en-MY" smtClean="0"/>
+              <a:t>Copyright (c) 2013 Chetan Gadgil</a:t>
+            </a:r>
             <a:endParaRPr lang="en-MY"/>
           </a:p>
         </p:txBody>
@@ -23723,6 +23887,10 @@
             </a:lvl1pPr>
           </a:lstStyle>
           <a:p>
+            <a:r>
+              <a:rPr lang="en-MY" smtClean="0"/>
+              <a:t>Copyright (c) 2013 Chetan Gadgil</a:t>
+            </a:r>
             <a:endParaRPr lang="en-MY"/>
           </a:p>
         </p:txBody>
@@ -23919,6 +24087,10 @@
             </a:lvl1pPr>
           </a:lstStyle>
           <a:p>
+            <a:r>
+              <a:rPr lang="en-MY" smtClean="0"/>
+              <a:t>Copyright (c) 2013 Chetan Gadgil</a:t>
+            </a:r>
             <a:endParaRPr lang="en-MY"/>
           </a:p>
         </p:txBody>
@@ -24211,6 +24383,10 @@
             </a:lvl1pPr>
           </a:lstStyle>
           <a:p>
+            <a:r>
+              <a:rPr lang="en-MY" smtClean="0"/>
+              <a:t>Copyright (c) 2013 Chetan Gadgil</a:t>
+            </a:r>
             <a:endParaRPr lang="en-MY"/>
           </a:p>
         </p:txBody>
@@ -24642,6 +24818,10 @@
             </a:lvl1pPr>
           </a:lstStyle>
           <a:p>
+            <a:r>
+              <a:rPr lang="en-MY" smtClean="0"/>
+              <a:t>Copyright (c) 2013 Chetan Gadgil</a:t>
+            </a:r>
             <a:endParaRPr lang="en-MY"/>
           </a:p>
         </p:txBody>
@@ -24764,6 +24944,10 @@
             </a:lvl1pPr>
           </a:lstStyle>
           <a:p>
+            <a:r>
+              <a:rPr lang="en-MY" smtClean="0"/>
+              <a:t>Copyright (c) 2013 Chetan Gadgil</a:t>
+            </a:r>
             <a:endParaRPr lang="en-MY"/>
           </a:p>
         </p:txBody>
@@ -24863,6 +25047,10 @@
             </a:lvl1pPr>
           </a:lstStyle>
           <a:p>
+            <a:r>
+              <a:rPr lang="en-MY" smtClean="0"/>
+              <a:t>Copyright (c) 2013 Chetan Gadgil</a:t>
+            </a:r>
             <a:endParaRPr lang="en-MY"/>
           </a:p>
         </p:txBody>
@@ -25144,6 +25332,10 @@
             </a:lvl1pPr>
           </a:lstStyle>
           <a:p>
+            <a:r>
+              <a:rPr lang="en-MY" smtClean="0"/>
+              <a:t>Copyright (c) 2013 Chetan Gadgil</a:t>
+            </a:r>
             <a:endParaRPr lang="en-MY"/>
           </a:p>
         </p:txBody>
@@ -25295,11 +25487,6 @@
             </a:lvl1pPr>
           </a:lstStyle>
           <a:p>
-            <a:fld id="{4427F9C6-20A9-45D8-B666-D95AD1AA535F}" type="datetime1">
-              <a:rPr lang="en-US" smtClean="0"/>
-              <a:pPr/>
-              <a:t>6/6/2013</a:t>
-            </a:fld>
             <a:endParaRPr lang="en-US"/>
           </a:p>
         </p:txBody>
@@ -25323,6 +25510,10 @@
             </a:lvl1pPr>
           </a:lstStyle>
           <a:p>
+            <a:r>
+              <a:rPr lang="en-US" smtClean="0"/>
+              <a:t>Copyright (c) 2013 Chetan Gadgil</a:t>
+            </a:r>
             <a:endParaRPr lang="en-US"/>
           </a:p>
         </p:txBody>
@@ -25584,6 +25775,10 @@
             </a:lvl1pPr>
           </a:lstStyle>
           <a:p>
+            <a:r>
+              <a:rPr lang="en-MY" smtClean="0"/>
+              <a:t>Copyright (c) 2013 Chetan Gadgil</a:t>
+            </a:r>
             <a:endParaRPr lang="en-MY"/>
           </a:p>
         </p:txBody>
@@ -25758,6 +25953,10 @@
             </a:lvl1pPr>
           </a:lstStyle>
           <a:p>
+            <a:r>
+              <a:rPr lang="en-MY" smtClean="0"/>
+              <a:t>Copyright (c) 2013 Chetan Gadgil</a:t>
+            </a:r>
             <a:endParaRPr lang="en-MY"/>
           </a:p>
         </p:txBody>
@@ -25942,6 +26141,10 @@
             </a:lvl1pPr>
           </a:lstStyle>
           <a:p>
+            <a:r>
+              <a:rPr lang="en-MY" smtClean="0"/>
+              <a:t>Copyright (c) 2013 Chetan Gadgil</a:t>
+            </a:r>
             <a:endParaRPr lang="en-MY"/>
           </a:p>
         </p:txBody>
@@ -26134,6 +26337,10 @@
             </a:lvl1pPr>
           </a:lstStyle>
           <a:p>
+            <a:r>
+              <a:rPr lang="en-MY" smtClean="0"/>
+              <a:t>Copyright (c) 2013 Chetan Gadgil</a:t>
+            </a:r>
             <a:endParaRPr lang="en-MY"/>
           </a:p>
         </p:txBody>
@@ -26309,6 +26516,10 @@
             </a:lvl1pPr>
           </a:lstStyle>
           <a:p>
+            <a:r>
+              <a:rPr lang="en-MY" smtClean="0"/>
+              <a:t>Copyright (c) 2013 Chetan Gadgil</a:t>
+            </a:r>
             <a:endParaRPr lang="en-MY"/>
           </a:p>
         </p:txBody>
@@ -26506,6 +26717,10 @@
             </a:lvl1pPr>
           </a:lstStyle>
           <a:p>
+            <a:r>
+              <a:rPr lang="en-MY" smtClean="0"/>
+              <a:t>Copyright (c) 2013 Chetan Gadgil</a:t>
+            </a:r>
             <a:endParaRPr lang="en-MY"/>
           </a:p>
         </p:txBody>
@@ -26799,6 +27014,10 @@
             </a:lvl1pPr>
           </a:lstStyle>
           <a:p>
+            <a:r>
+              <a:rPr lang="en-MY" smtClean="0"/>
+              <a:t>Copyright (c) 2013 Chetan Gadgil</a:t>
+            </a:r>
             <a:endParaRPr lang="en-MY"/>
           </a:p>
         </p:txBody>
@@ -27231,6 +27450,10 @@
             </a:lvl1pPr>
           </a:lstStyle>
           <a:p>
+            <a:r>
+              <a:rPr lang="en-MY" smtClean="0"/>
+              <a:t>Copyright (c) 2013 Chetan Gadgil</a:t>
+            </a:r>
             <a:endParaRPr lang="en-MY"/>
           </a:p>
         </p:txBody>
@@ -27354,6 +27577,10 @@
             </a:lvl1pPr>
           </a:lstStyle>
           <a:p>
+            <a:r>
+              <a:rPr lang="en-MY" smtClean="0"/>
+              <a:t>Copyright (c) 2013 Chetan Gadgil</a:t>
+            </a:r>
             <a:endParaRPr lang="en-MY"/>
           </a:p>
         </p:txBody>
@@ -27454,6 +27681,10 @@
             </a:lvl1pPr>
           </a:lstStyle>
           <a:p>
+            <a:r>
+              <a:rPr lang="en-MY" smtClean="0"/>
+              <a:t>Copyright (c) 2013 Chetan Gadgil</a:t>
+            </a:r>
             <a:endParaRPr lang="en-MY"/>
           </a:p>
         </p:txBody>
@@ -27629,11 +27860,6 @@
           </a:lstStyle>
           <a:p>
             <a:pPr algn="r"/>
-            <a:fld id="{1BC102A9-C1B1-4354-89E4-F43472216A4F}" type="datetime1">
-              <a:rPr lang="en-US" smtClean="0"/>
-              <a:pPr algn="r"/>
-              <a:t>6/6/2013</a:t>
-            </a:fld>
             <a:endParaRPr lang="en-US" sz="1000" dirty="0">
               <a:solidFill>
                 <a:schemeClr val="bg2">
@@ -27664,6 +27890,16 @@
           </a:lstStyle>
           <a:p>
             <a:pPr algn="l"/>
+            <a:r>
+              <a:rPr lang="en-US" sz="1000" smtClean="0">
+                <a:solidFill>
+                  <a:schemeClr val="bg2">
+                    <a:shade val="50000"/>
+                  </a:schemeClr>
+                </a:solidFill>
+              </a:rPr>
+              <a:t>Copyright (c) 2013 Chetan Gadgil</a:t>
+            </a:r>
             <a:endParaRPr lang="en-US" sz="1000" dirty="0">
               <a:solidFill>
                 <a:schemeClr val="bg2">
@@ -27963,6 +28199,10 @@
             </a:lvl1pPr>
           </a:lstStyle>
           <a:p>
+            <a:r>
+              <a:rPr lang="en-MY" smtClean="0"/>
+              <a:t>Copyright (c) 2013 Chetan Gadgil</a:t>
+            </a:r>
             <a:endParaRPr lang="en-MY"/>
           </a:p>
         </p:txBody>
@@ -28225,6 +28465,10 @@
             </a:lvl1pPr>
           </a:lstStyle>
           <a:p>
+            <a:r>
+              <a:rPr lang="en-MY" smtClean="0"/>
+              <a:t>Copyright (c) 2013 Chetan Gadgil</a:t>
+            </a:r>
             <a:endParaRPr lang="en-MY"/>
           </a:p>
         </p:txBody>
@@ -28400,6 +28644,10 @@
             </a:lvl1pPr>
           </a:lstStyle>
           <a:p>
+            <a:r>
+              <a:rPr lang="en-MY" smtClean="0"/>
+              <a:t>Copyright (c) 2013 Chetan Gadgil</a:t>
+            </a:r>
             <a:endParaRPr lang="en-MY"/>
           </a:p>
         </p:txBody>
@@ -28585,6 +28833,10 @@
             </a:lvl1pPr>
           </a:lstStyle>
           <a:p>
+            <a:r>
+              <a:rPr lang="en-MY" smtClean="0"/>
+              <a:t>Copyright (c) 2013 Chetan Gadgil</a:t>
+            </a:r>
             <a:endParaRPr lang="en-MY"/>
           </a:p>
         </p:txBody>
@@ -28781,6 +29033,10 @@
             </a:lvl1pPr>
           </a:lstStyle>
           <a:p>
+            <a:r>
+              <a:rPr lang="en-MY" smtClean="0"/>
+              <a:t>Copyright (c) 2013 Chetan Gadgil</a:t>
+            </a:r>
             <a:endParaRPr lang="en-MY"/>
           </a:p>
         </p:txBody>
@@ -28963,6 +29219,10 @@
             </a:lvl1pPr>
           </a:lstStyle>
           <a:p>
+            <a:r>
+              <a:rPr lang="en-MY" smtClean="0"/>
+              <a:t>Copyright (c) 2013 Chetan Gadgil</a:t>
+            </a:r>
             <a:endParaRPr lang="en-MY"/>
           </a:p>
         </p:txBody>
@@ -29162,6 +29422,10 @@
             </a:lvl1pPr>
           </a:lstStyle>
           <a:p>
+            <a:r>
+              <a:rPr lang="en-MY" smtClean="0"/>
+              <a:t>Copyright (c) 2013 Chetan Gadgil</a:t>
+            </a:r>
             <a:endParaRPr lang="en-MY"/>
           </a:p>
         </p:txBody>
@@ -29460,6 +29724,10 @@
             </a:lvl1pPr>
           </a:lstStyle>
           <a:p>
+            <a:r>
+              <a:rPr lang="en-MY" smtClean="0"/>
+              <a:t>Copyright (c) 2013 Chetan Gadgil</a:t>
+            </a:r>
             <a:endParaRPr lang="en-MY"/>
           </a:p>
         </p:txBody>
@@ -29903,6 +30171,10 @@
             </a:lvl1pPr>
           </a:lstStyle>
           <a:p>
+            <a:r>
+              <a:rPr lang="en-MY" smtClean="0"/>
+              <a:t>Copyright (c) 2013 Chetan Gadgil</a:t>
+            </a:r>
             <a:endParaRPr lang="en-MY"/>
           </a:p>
         </p:txBody>
@@ -30025,6 +30297,10 @@
             </a:lvl1pPr>
           </a:lstStyle>
           <a:p>
+            <a:r>
+              <a:rPr lang="en-MY" smtClean="0"/>
+              <a:t>Copyright (c) 2013 Chetan Gadgil</a:t>
+            </a:r>
             <a:endParaRPr lang="en-MY"/>
           </a:p>
         </p:txBody>
@@ -30295,11 +30571,6 @@
           </a:lstStyle>
           <a:p>
             <a:pPr algn="r"/>
-            <a:fld id="{1BC102A9-C1B1-4354-89E4-F43472216A4F}" type="datetime1">
-              <a:rPr lang="en-US" smtClean="0"/>
-              <a:pPr algn="r"/>
-              <a:t>6/6/2013</a:t>
-            </a:fld>
             <a:endParaRPr lang="en-US" sz="1000" dirty="0">
               <a:solidFill>
                 <a:schemeClr val="bg2">
@@ -30330,6 +30601,16 @@
           </a:lstStyle>
           <a:p>
             <a:pPr algn="l"/>
+            <a:r>
+              <a:rPr lang="en-US" sz="1000" smtClean="0">
+                <a:solidFill>
+                  <a:schemeClr val="bg2">
+                    <a:shade val="50000"/>
+                  </a:schemeClr>
+                </a:solidFill>
+              </a:rPr>
+              <a:t>Copyright (c) 2013 Chetan Gadgil</a:t>
+            </a:r>
             <a:endParaRPr lang="en-US" sz="1000" dirty="0">
               <a:solidFill>
                 <a:schemeClr val="bg2">
@@ -30447,6 +30728,10 @@
             </a:lvl1pPr>
           </a:lstStyle>
           <a:p>
+            <a:r>
+              <a:rPr lang="en-MY" smtClean="0"/>
+              <a:t>Copyright (c) 2013 Chetan Gadgil</a:t>
+            </a:r>
             <a:endParaRPr lang="en-MY"/>
           </a:p>
         </p:txBody>
@@ -30734,6 +31019,10 @@
             </a:lvl1pPr>
           </a:lstStyle>
           <a:p>
+            <a:r>
+              <a:rPr lang="en-MY" smtClean="0"/>
+              <a:t>Copyright (c) 2013 Chetan Gadgil</a:t>
+            </a:r>
             <a:endParaRPr lang="en-MY"/>
           </a:p>
         </p:txBody>
@@ -31001,6 +31290,10 @@
             </a:lvl1pPr>
           </a:lstStyle>
           <a:p>
+            <a:r>
+              <a:rPr lang="en-MY" smtClean="0"/>
+              <a:t>Copyright (c) 2013 Chetan Gadgil</a:t>
+            </a:r>
             <a:endParaRPr lang="en-MY"/>
           </a:p>
         </p:txBody>
@@ -31183,6 +31476,10 @@
             </a:lvl1pPr>
           </a:lstStyle>
           <a:p>
+            <a:r>
+              <a:rPr lang="en-MY" smtClean="0"/>
+              <a:t>Copyright (c) 2013 Chetan Gadgil</a:t>
+            </a:r>
             <a:endParaRPr lang="en-MY"/>
           </a:p>
         </p:txBody>
@@ -31370,6 +31667,10 @@
             </a:lvl1pPr>
           </a:lstStyle>
           <a:p>
+            <a:r>
+              <a:rPr lang="en-MY" smtClean="0"/>
+              <a:t>Copyright (c) 2013 Chetan Gadgil</a:t>
+            </a:r>
             <a:endParaRPr lang="en-MY"/>
           </a:p>
         </p:txBody>
@@ -31937,6 +32238,10 @@
             </a:lvl1pPr>
           </a:lstStyle>
           <a:p>
+            <a:r>
+              <a:rPr lang="en-MY" smtClean="0"/>
+              <a:t>Copyright (c) 2013 Chetan Gadgil</a:t>
+            </a:r>
             <a:endParaRPr lang="en-MY"/>
           </a:p>
         </p:txBody>
@@ -32145,6 +32450,10 @@
           <a:bodyPr/>
           <a:lstStyle/>
           <a:p>
+            <a:r>
+              <a:rPr lang="en-MY" smtClean="0"/>
+              <a:t>Copyright (c) 2013 Chetan Gadgil</a:t>
+            </a:r>
             <a:endParaRPr lang="en-MY"/>
           </a:p>
         </p:txBody>
@@ -32383,6 +32692,10 @@
           <a:bodyPr/>
           <a:lstStyle/>
           <a:p>
+            <a:r>
+              <a:rPr lang="en-MY" smtClean="0"/>
+              <a:t>Copyright (c) 2013 Chetan Gadgil</a:t>
+            </a:r>
             <a:endParaRPr lang="en-MY"/>
           </a:p>
         </p:txBody>
@@ -32493,6 +32806,10 @@
           <a:bodyPr/>
           <a:lstStyle/>
           <a:p>
+            <a:r>
+              <a:rPr lang="en-MY" smtClean="0"/>
+              <a:t>Copyright (c) 2013 Chetan Gadgil</a:t>
+            </a:r>
             <a:endParaRPr lang="en-MY"/>
           </a:p>
         </p:txBody>
@@ -32867,6 +33184,10 @@
           <a:bodyPr/>
           <a:lstStyle/>
           <a:p>
+            <a:r>
+              <a:rPr lang="en-MY" smtClean="0"/>
+              <a:t>Copyright (c) 2013 Chetan Gadgil</a:t>
+            </a:r>
             <a:endParaRPr lang="en-MY"/>
           </a:p>
         </p:txBody>
@@ -38804,11 +39125,6 @@
           </a:lstStyle>
           <a:p>
             <a:pPr algn="r"/>
-            <a:fld id="{1BC102A9-C1B1-4354-89E4-F43472216A4F}" type="datetime1">
-              <a:rPr lang="en-US" smtClean="0"/>
-              <a:pPr algn="r"/>
-              <a:t>6/6/2013</a:t>
-            </a:fld>
             <a:endParaRPr lang="en-US" sz="1000" dirty="0">
               <a:solidFill>
                 <a:schemeClr val="bg2">
@@ -38839,6 +39155,16 @@
           </a:lstStyle>
           <a:p>
             <a:pPr algn="l"/>
+            <a:r>
+              <a:rPr lang="en-US" sz="1000" smtClean="0">
+                <a:solidFill>
+                  <a:schemeClr val="bg2">
+                    <a:shade val="50000"/>
+                  </a:schemeClr>
+                </a:solidFill>
+              </a:rPr>
+              <a:t>Copyright (c) 2013 Chetan Gadgil</a:t>
+            </a:r>
             <a:endParaRPr lang="en-US" sz="1000" dirty="0">
               <a:solidFill>
                 <a:schemeClr val="bg2">
@@ -38971,6 +39297,10 @@
           <a:bodyPr/>
           <a:lstStyle/>
           <a:p>
+            <a:r>
+              <a:rPr lang="en-MY" smtClean="0"/>
+              <a:t>Copyright (c) 2013 Chetan Gadgil</a:t>
+            </a:r>
             <a:endParaRPr lang="en-MY"/>
           </a:p>
         </p:txBody>
@@ -39058,6 +39388,10 @@
           <a:bodyPr/>
           <a:lstStyle/>
           <a:p>
+            <a:r>
+              <a:rPr lang="en-MY" smtClean="0"/>
+              <a:t>Copyright (c) 2013 Chetan Gadgil</a:t>
+            </a:r>
             <a:endParaRPr lang="en-MY"/>
           </a:p>
         </p:txBody>
@@ -39327,6 +39661,10 @@
           <a:bodyPr/>
           <a:lstStyle/>
           <a:p>
+            <a:r>
+              <a:rPr lang="en-MY" smtClean="0"/>
+              <a:t>Copyright (c) 2013 Chetan Gadgil</a:t>
+            </a:r>
             <a:endParaRPr lang="en-MY"/>
           </a:p>
         </p:txBody>
@@ -39632,6 +39970,10 @@
           <a:bodyPr/>
           <a:lstStyle/>
           <a:p>
+            <a:r>
+              <a:rPr lang="en-MY" smtClean="0"/>
+              <a:t>Copyright (c) 2013 Chetan Gadgil</a:t>
+            </a:r>
             <a:endParaRPr lang="en-MY"/>
           </a:p>
         </p:txBody>
@@ -39794,6 +40136,10 @@
           <a:bodyPr/>
           <a:lstStyle/>
           <a:p>
+            <a:r>
+              <a:rPr lang="en-MY" smtClean="0"/>
+              <a:t>Copyright (c) 2013 Chetan Gadgil</a:t>
+            </a:r>
             <a:endParaRPr lang="en-MY"/>
           </a:p>
         </p:txBody>
@@ -39966,6 +40312,10 @@
           <a:bodyPr/>
           <a:lstStyle/>
           <a:p>
+            <a:r>
+              <a:rPr lang="en-MY" smtClean="0"/>
+              <a:t>Copyright (c) 2013 Chetan Gadgil</a:t>
+            </a:r>
             <a:endParaRPr lang="en-MY"/>
           </a:p>
         </p:txBody>
@@ -40061,11 +40411,6 @@
             </a:lvl1pPr>
           </a:lstStyle>
           <a:p>
-            <a:fld id="{5AFB2161-9FCA-498A-A51E-7B90071250E8}" type="datetime1">
-              <a:rPr lang="en-US" smtClean="0"/>
-              <a:pPr/>
-              <a:t>6/6/2013</a:t>
-            </a:fld>
             <a:endParaRPr lang="en-US"/>
           </a:p>
         </p:txBody>
@@ -40089,6 +40434,10 @@
             </a:lvl1pPr>
           </a:lstStyle>
           <a:p>
+            <a:r>
+              <a:rPr lang="en-US" smtClean="0"/>
+              <a:t>Copyright (c) 2013 Chetan Gadgil</a:t>
+            </a:r>
             <a:endParaRPr lang="en-US"/>
           </a:p>
         </p:txBody>
@@ -40165,11 +40514,6 @@
             </a:lvl1pPr>
           </a:lstStyle>
           <a:p>
-            <a:fld id="{9F5395AF-258B-4502-92DF-E211AA281B41}" type="datetime1">
-              <a:rPr lang="en-US" smtClean="0"/>
-              <a:pPr/>
-              <a:t>6/6/2013</a:t>
-            </a:fld>
             <a:endParaRPr lang="en-US"/>
           </a:p>
         </p:txBody>
@@ -40193,6 +40537,10 @@
             </a:lvl1pPr>
           </a:lstStyle>
           <a:p>
+            <a:r>
+              <a:rPr lang="en-US" smtClean="0"/>
+              <a:t>Copyright (c) 2013 Chetan Gadgil</a:t>
+            </a:r>
             <a:endParaRPr lang="en-US"/>
           </a:p>
         </p:txBody>
@@ -40452,11 +40800,6 @@
           </a:lstStyle>
           <a:p>
             <a:pPr algn="r"/>
-            <a:fld id="{1BC102A9-C1B1-4354-89E4-F43472216A4F}" type="datetime1">
-              <a:rPr lang="en-US" smtClean="0"/>
-              <a:pPr algn="r"/>
-              <a:t>6/6/2013</a:t>
-            </a:fld>
             <a:endParaRPr lang="en-US" sz="1000" dirty="0">
               <a:solidFill>
                 <a:schemeClr val="bg2">
@@ -40487,6 +40830,16 @@
           </a:lstStyle>
           <a:p>
             <a:pPr algn="l"/>
+            <a:r>
+              <a:rPr lang="en-US" sz="1000" smtClean="0">
+                <a:solidFill>
+                  <a:schemeClr val="bg2">
+                    <a:shade val="50000"/>
+                  </a:schemeClr>
+                </a:solidFill>
+              </a:rPr>
+              <a:t>Copyright (c) 2013 Chetan Gadgil</a:t>
+            </a:r>
             <a:endParaRPr lang="en-US" sz="1000" dirty="0">
               <a:solidFill>
                 <a:schemeClr val="bg2">
@@ -40744,11 +41097,6 @@
           </a:lstStyle>
           <a:p>
             <a:pPr algn="r"/>
-            <a:fld id="{1BC102A9-C1B1-4354-89E4-F43472216A4F}" type="datetime1">
-              <a:rPr lang="en-US" smtClean="0"/>
-              <a:pPr algn="r"/>
-              <a:t>6/6/2013</a:t>
-            </a:fld>
             <a:endParaRPr lang="en-US" sz="1000" dirty="0">
               <a:solidFill>
                 <a:schemeClr val="bg2">
@@ -40779,6 +41127,16 @@
           </a:lstStyle>
           <a:p>
             <a:pPr algn="l"/>
+            <a:r>
+              <a:rPr lang="en-US" sz="1000" smtClean="0">
+                <a:solidFill>
+                  <a:schemeClr val="bg2">
+                    <a:shade val="50000"/>
+                  </a:schemeClr>
+                </a:solidFill>
+              </a:rPr>
+              <a:t>Copyright (c) 2013 Chetan Gadgil</a:t>
+            </a:r>
             <a:endParaRPr lang="en-US" sz="1000" dirty="0">
               <a:solidFill>
                 <a:schemeClr val="bg2">
@@ -40949,11 +41307,6 @@
           </a:lstStyle>
           <a:p>
             <a:pPr algn="r"/>
-            <a:fld id="{1BC102A9-C1B1-4354-89E4-F43472216A4F}" type="datetime1">
-              <a:rPr lang="en-US" smtClean="0"/>
-              <a:pPr algn="r"/>
-              <a:t>6/6/2013</a:t>
-            </a:fld>
             <a:endParaRPr lang="en-US" sz="1000" dirty="0">
               <a:solidFill>
                 <a:schemeClr val="bg2">
@@ -41004,6 +41357,16 @@
           </a:lstStyle>
           <a:p>
             <a:pPr algn="l"/>
+            <a:r>
+              <a:rPr lang="en-US" sz="1000" smtClean="0">
+                <a:solidFill>
+                  <a:schemeClr val="bg2">
+                    <a:shade val="50000"/>
+                  </a:schemeClr>
+                </a:solidFill>
+              </a:rPr>
+              <a:t>Copyright (c) 2013 Chetan Gadgil</a:t>
+            </a:r>
             <a:endParaRPr lang="en-US" sz="1000" dirty="0">
               <a:solidFill>
                 <a:schemeClr val="bg2">
@@ -41137,6 +41500,7 @@
     <p:sldLayoutId id="2147483682" r:id="rId10"/>
     <p:sldLayoutId id="2147483683" r:id="rId11"/>
   </p:sldLayoutIdLst>
+  <p:hf hdr="0" dt="0"/>
   <p:txStyles>
     <p:titleStyle>
       <a:lvl1pPr algn="ctr" rtl="0" eaLnBrk="1" fontAlgn="base" hangingPunct="1">
@@ -41701,6 +42065,10 @@
             </a:lvl1pPr>
           </a:lstStyle>
           <a:p>
+            <a:r>
+              <a:rPr lang="en-MY" smtClean="0"/>
+              <a:t>Copyright (c) 2013 Chetan Gadgil</a:t>
+            </a:r>
             <a:endParaRPr lang="en-MY"/>
           </a:p>
         </p:txBody>
@@ -41769,6 +42137,7 @@
     <p:sldLayoutId id="2147483694" r:id="rId10"/>
     <p:sldLayoutId id="2147483695" r:id="rId11"/>
   </p:sldLayoutIdLst>
+  <p:hf hdr="0" dt="0"/>
   <p:txStyles>
     <p:titleStyle>
       <a:lvl1pPr algn="l" rtl="0" eaLnBrk="1" fontAlgn="base" hangingPunct="1">
@@ -42248,6 +42617,10 @@
             </a:lvl1pPr>
           </a:lstStyle>
           <a:p>
+            <a:r>
+              <a:rPr lang="en-MY" smtClean="0"/>
+              <a:t>Copyright (c) 2013 Chetan Gadgil</a:t>
+            </a:r>
             <a:endParaRPr lang="en-MY"/>
           </a:p>
         </p:txBody>
@@ -42410,6 +42783,7 @@
       </p:par>
     </p:tnLst>
   </p:timing>
+  <p:hf hdr="0" dt="0"/>
   <p:txStyles>
     <p:titleStyle>
       <a:lvl1pPr algn="ctr" rtl="0" eaLnBrk="1" fontAlgn="base" hangingPunct="1">
@@ -42889,6 +43263,10 @@
             </a:lvl1pPr>
           </a:lstStyle>
           <a:p>
+            <a:r>
+              <a:rPr lang="en-MY" smtClean="0"/>
+              <a:t>Copyright (c) 2013 Chetan Gadgil</a:t>
+            </a:r>
             <a:endParaRPr lang="en-MY"/>
           </a:p>
         </p:txBody>
@@ -43000,6 +43378,7 @@
     <p:sldLayoutId id="2147483718" r:id="rId10"/>
     <p:sldLayoutId id="2147483719" r:id="rId11"/>
   </p:sldLayoutIdLst>
+  <p:hf hdr="0" dt="0"/>
   <p:txStyles>
     <p:titleStyle>
       <a:lvl1pPr algn="ctr" rtl="0" eaLnBrk="1" fontAlgn="base" hangingPunct="1">
@@ -43547,11 +43926,6 @@
           </a:lstStyle>
           <a:p>
             <a:pPr algn="r"/>
-            <a:fld id="{1BC102A9-C1B1-4354-89E4-F43472216A4F}" type="datetime1">
-              <a:rPr lang="en-US" smtClean="0"/>
-              <a:pPr algn="r"/>
-              <a:t>6/6/2013</a:t>
-            </a:fld>
             <a:endParaRPr lang="en-US" sz="1000" dirty="0">
               <a:solidFill>
                 <a:schemeClr val="bg2">
@@ -43599,6 +43973,16 @@
           </a:lstStyle>
           <a:p>
             <a:pPr algn="l"/>
+            <a:r>
+              <a:rPr lang="en-US" sz="1000" smtClean="0">
+                <a:solidFill>
+                  <a:schemeClr val="bg2">
+                    <a:shade val="50000"/>
+                  </a:schemeClr>
+                </a:solidFill>
+              </a:rPr>
+              <a:t>Copyright (c) 2013 Chetan Gadgil</a:t>
+            </a:r>
             <a:endParaRPr lang="en-US" sz="1000" dirty="0">
               <a:solidFill>
                 <a:schemeClr val="bg2">
@@ -43682,6 +44066,7 @@
     <p:sldLayoutId id="2147483850" r:id="rId10"/>
     <p:sldLayoutId id="2147483851" r:id="rId11"/>
   </p:sldLayoutIdLst>
+  <p:hf hdr="0" dt="0"/>
   <p:txStyles>
     <p:titleStyle>
       <a:lvl1pPr algn="ctr" defTabSz="457200" rtl="0" eaLnBrk="1" latinLnBrk="0" hangingPunct="1">
@@ -44204,16 +44589,63 @@
           </a:p>
         </p:txBody>
       </p:sp>
+      <p:sp>
+        <p:nvSpPr>
+          <p:cNvPr id="4" name="Footer Placeholder 3"/>
+          <p:cNvSpPr>
+            <a:spLocks noGrp="1"/>
+          </p:cNvSpPr>
+          <p:nvPr>
+            <p:ph type="ftr" sz="quarter" idx="11"/>
+          </p:nvPr>
+        </p:nvSpPr>
+        <p:spPr/>
+        <p:txBody>
+          <a:bodyPr/>
+          <a:lstStyle/>
+          <a:p>
+            <a:r>
+              <a:rPr lang="en-MY" smtClean="0"/>
+              <a:t>Copyright (c) 2013 Chetan Gadgil</a:t>
+            </a:r>
+            <a:endParaRPr lang="en-MY"/>
+          </a:p>
+        </p:txBody>
+      </p:sp>
+      <p:sp>
+        <p:nvSpPr>
+          <p:cNvPr id="5" name="Slide Number Placeholder 4"/>
+          <p:cNvSpPr>
+            <a:spLocks noGrp="1"/>
+          </p:cNvSpPr>
+          <p:nvPr>
+            <p:ph type="sldNum" sz="quarter" idx="12"/>
+          </p:nvPr>
+        </p:nvSpPr>
+        <p:spPr/>
+        <p:txBody>
+          <a:bodyPr/>
+          <a:lstStyle/>
+          <a:p>
+            <a:fld id="{B442522D-240E-4A4B-A439-F1959C9BA75C}" type="slidenum">
+              <a:rPr lang="en-MY" smtClean="0"/>
+              <a:pPr/>
+              <a:t>1</a:t>
+            </a:fld>
+            <a:endParaRPr lang="en-MY"/>
+          </a:p>
+        </p:txBody>
+      </p:sp>
     </p:spTree>
   </p:cSld>
   <p:clrMapOvr>
     <a:masterClrMapping/>
   </p:clrMapOvr>
-  <mc:AlternateContent xmlns:mc="http://schemas.openxmlformats.org/markup-compatibility/2006">
-    <mc:Choice xmlns:p14="http://schemas.microsoft.com/office/powerpoint/2010/main" Requires="p14">
+  <mc:AlternateContent xmlns:mc="http://schemas.openxmlformats.org/markup-compatibility/2006" xmlns:p14="http://schemas.microsoft.com/office/powerpoint/2010/main">
+    <mc:Choice Requires="p14">
       <p:transition spd="slow" p14:dur="2000"/>
     </mc:Choice>
-    <mc:Fallback>
+    <mc:Fallback xmlns="">
       <p:transition spd="slow"/>
     </mc:Fallback>
   </mc:AlternateContent>
@@ -44246,6 +44678,231 @@
       </p:grpSpPr>
       <p:sp>
         <p:nvSpPr>
+          <p:cNvPr id="5" name="Rounded Rectangle 4"/>
+          <p:cNvSpPr/>
+          <p:nvPr/>
+        </p:nvSpPr>
+        <p:spPr>
+          <a:xfrm>
+            <a:off x="609600" y="2763328"/>
+            <a:ext cx="3962400" cy="2514600"/>
+          </a:xfrm>
+          <a:prstGeom prst="roundRect">
+            <a:avLst/>
+          </a:prstGeom>
+          <a:solidFill>
+            <a:srgbClr val="92D050">
+              <a:alpha val="10000"/>
+            </a:srgbClr>
+          </a:solidFill>
+        </p:spPr>
+        <p:style>
+          <a:lnRef idx="2">
+            <a:schemeClr val="accent1">
+              <a:shade val="50000"/>
+            </a:schemeClr>
+          </a:lnRef>
+          <a:fillRef idx="1">
+            <a:schemeClr val="accent1"/>
+          </a:fillRef>
+          <a:effectRef idx="0">
+            <a:schemeClr val="accent1"/>
+          </a:effectRef>
+          <a:fontRef idx="minor">
+            <a:schemeClr val="lt1"/>
+          </a:fontRef>
+        </p:style>
+        <p:txBody>
+          <a:bodyPr rtlCol="0" anchor="ctr"/>
+          <a:lstStyle/>
+          <a:p>
+            <a:pPr algn="ctr"/>
+            <a:endParaRPr lang="en-US"/>
+          </a:p>
+        </p:txBody>
+      </p:sp>
+      <p:sp>
+        <p:nvSpPr>
+          <p:cNvPr id="2" name="Rectangle 2"/>
+          <p:cNvSpPr>
+            <a:spLocks noGrp="1"/>
+          </p:cNvSpPr>
+          <p:nvPr>
+            <p:ph type="title"/>
+          </p:nvPr>
+        </p:nvSpPr>
+        <p:spPr/>
+        <p:txBody>
+          <a:bodyPr/>
+          <a:lstStyle/>
+          <a:p>
+            <a:r>
+              <a:rPr lang="en-US" dirty="0" smtClean="0"/>
+              <a:t>Demo</a:t>
+            </a:r>
+            <a:endParaRPr lang="en-US" dirty="0"/>
+          </a:p>
+        </p:txBody>
+      </p:sp>
+      <p:graphicFrame>
+        <p:nvGraphicFramePr>
+          <p:cNvPr id="4" name="Diagram 4"/>
+          <p:cNvGraphicFramePr>
+            <a:graphicFrameLocks noGrp="1"/>
+          </p:cNvGraphicFramePr>
+          <p:nvPr>
+            <p:ph idx="1"/>
+            <p:extLst>
+              <p:ext uri="{D42A27DB-BD31-4B8C-83A1-F6EECF244321}">
+                <p14:modId xmlns:p14="http://schemas.microsoft.com/office/powerpoint/2010/main" val="4048377074"/>
+              </p:ext>
+            </p:extLst>
+          </p:nvPr>
+        </p:nvGraphicFramePr>
+        <p:xfrm>
+          <a:off x="838200" y="2038350"/>
+          <a:ext cx="7467600" cy="3951288"/>
+        </p:xfrm>
+        <a:graphic>
+          <a:graphicData uri="http://schemas.openxmlformats.org/drawingml/2006/diagram">
+            <dgm:relIds xmlns:dgm="http://schemas.openxmlformats.org/drawingml/2006/diagram" xmlns:r="http://schemas.openxmlformats.org/officeDocument/2006/relationships" r:dm="rId3" r:lo="rId4" r:qs="rId5" r:cs="rId6"/>
+          </a:graphicData>
+        </a:graphic>
+      </p:graphicFrame>
+      <p:sp>
+        <p:nvSpPr>
+          <p:cNvPr id="3" name="Rounded Rectangle 2"/>
+          <p:cNvSpPr/>
+          <p:nvPr/>
+        </p:nvSpPr>
+        <p:spPr>
+          <a:xfrm>
+            <a:off x="4572000" y="2763328"/>
+            <a:ext cx="3886200" cy="2514600"/>
+          </a:xfrm>
+          <a:prstGeom prst="roundRect">
+            <a:avLst/>
+          </a:prstGeom>
+          <a:solidFill>
+            <a:srgbClr val="002060">
+              <a:alpha val="59000"/>
+            </a:srgbClr>
+          </a:solidFill>
+        </p:spPr>
+        <p:style>
+          <a:lnRef idx="2">
+            <a:schemeClr val="accent1">
+              <a:shade val="50000"/>
+            </a:schemeClr>
+          </a:lnRef>
+          <a:fillRef idx="1">
+            <a:schemeClr val="accent1"/>
+          </a:fillRef>
+          <a:effectRef idx="0">
+            <a:schemeClr val="accent1"/>
+          </a:effectRef>
+          <a:fontRef idx="minor">
+            <a:schemeClr val="lt1"/>
+          </a:fontRef>
+        </p:style>
+        <p:txBody>
+          <a:bodyPr rtlCol="0" anchor="ctr"/>
+          <a:lstStyle/>
+          <a:p>
+            <a:pPr algn="ctr"/>
+            <a:endParaRPr lang="en-US"/>
+          </a:p>
+        </p:txBody>
+      </p:sp>
+      <p:sp>
+        <p:nvSpPr>
+          <p:cNvPr id="6" name="Footer Placeholder 5"/>
+          <p:cNvSpPr>
+            <a:spLocks noGrp="1"/>
+          </p:cNvSpPr>
+          <p:nvPr>
+            <p:ph type="ftr" sz="quarter" idx="11"/>
+          </p:nvPr>
+        </p:nvSpPr>
+        <p:spPr/>
+        <p:txBody>
+          <a:bodyPr/>
+          <a:lstStyle/>
+          <a:p>
+            <a:r>
+              <a:rPr lang="en-MY" smtClean="0"/>
+              <a:t>Copyright (c) 2013 Chetan Gadgil</a:t>
+            </a:r>
+            <a:endParaRPr lang="en-MY"/>
+          </a:p>
+        </p:txBody>
+      </p:sp>
+      <p:sp>
+        <p:nvSpPr>
+          <p:cNvPr id="7" name="Slide Number Placeholder 6"/>
+          <p:cNvSpPr>
+            <a:spLocks noGrp="1"/>
+          </p:cNvSpPr>
+          <p:nvPr>
+            <p:ph type="sldNum" sz="quarter" idx="12"/>
+          </p:nvPr>
+        </p:nvSpPr>
+        <p:spPr/>
+        <p:txBody>
+          <a:bodyPr/>
+          <a:lstStyle/>
+          <a:p>
+            <a:fld id="{CB67D5E6-BE40-49DF-9411-62F59E255471}" type="slidenum">
+              <a:rPr lang="en-MY" smtClean="0"/>
+              <a:pPr/>
+              <a:t>10</a:t>
+            </a:fld>
+            <a:endParaRPr lang="en-MY"/>
+          </a:p>
+        </p:txBody>
+      </p:sp>
+    </p:spTree>
+  </p:cSld>
+  <p:clrMapOvr>
+    <a:masterClrMapping/>
+  </p:clrMapOvr>
+  <mc:AlternateContent xmlns:mc="http://schemas.openxmlformats.org/markup-compatibility/2006" xmlns:p14="http://schemas.microsoft.com/office/powerpoint/2010/main">
+    <mc:Choice Requires="p14">
+      <p:transition spd="slow" p14:dur="2000"/>
+    </mc:Choice>
+    <mc:Fallback xmlns="">
+      <p:transition spd="slow"/>
+    </mc:Fallback>
+  </mc:AlternateContent>
+  <p:timing>
+    <p:tnLst>
+      <p:par>
+        <p:cTn id="1" dur="indefinite" restart="never" nodeType="tmRoot"/>
+      </p:par>
+    </p:tnLst>
+  </p:timing>
+</p:sld>
+</file>
+
+<file path=ppt/slides/slide11.xml><?xml version="1.0" encoding="utf-8"?>
+<p:sld xmlns:a="http://schemas.openxmlformats.org/drawingml/2006/main" xmlns:r="http://schemas.openxmlformats.org/officeDocument/2006/relationships" xmlns:p="http://schemas.openxmlformats.org/presentationml/2006/main">
+  <p:cSld>
+    <p:spTree>
+      <p:nvGrpSpPr>
+        <p:cNvPr id="1" name=""/>
+        <p:cNvGrpSpPr/>
+        <p:nvPr/>
+      </p:nvGrpSpPr>
+      <p:grpSpPr>
+        <a:xfrm>
+          <a:off x="0" y="0"/>
+          <a:ext cx="0" cy="0"/>
+          <a:chOff x="0" y="0"/>
+          <a:chExt cx="0" cy="0"/>
+        </a:xfrm>
+      </p:grpSpPr>
+      <p:sp>
+        <p:nvSpPr>
           <p:cNvPr id="2" name="Title 1"/>
           <p:cNvSpPr>
             <a:spLocks noGrp="1"/>
@@ -44261,9 +44918,1006 @@
           <a:p>
             <a:r>
               <a:rPr lang="en-US" dirty="0" smtClean="0"/>
+              <a:t>Java Sample</a:t>
+            </a:r>
+            <a:endParaRPr lang="en-US" dirty="0"/>
+          </a:p>
+        </p:txBody>
+      </p:sp>
+      <p:sp>
+        <p:nvSpPr>
+          <p:cNvPr id="3" name="Content Placeholder 2"/>
+          <p:cNvSpPr>
+            <a:spLocks noGrp="1"/>
+          </p:cNvSpPr>
+          <p:nvPr>
+            <p:ph idx="1"/>
+          </p:nvPr>
+        </p:nvSpPr>
+        <p:spPr>
+          <a:xfrm>
+            <a:off x="838200" y="2038389"/>
+            <a:ext cx="3505200" cy="2533611"/>
+          </a:xfrm>
+        </p:spPr>
+        <p:txBody>
+          <a:bodyPr>
+            <a:noAutofit/>
+          </a:bodyPr>
+          <a:lstStyle/>
+          <a:p>
+            <a:pPr marL="0" indent="0">
+              <a:buNone/>
+            </a:pPr>
+            <a:r>
+              <a:rPr lang="en-US" sz="800" dirty="0">
+                <a:latin typeface="Courier New" pitchFamily="49" charset="0"/>
+                <a:cs typeface="Courier New" pitchFamily="49" charset="0"/>
+              </a:rPr>
+              <a:t>&lt;dependency&gt;</a:t>
+            </a:r>
+          </a:p>
+          <a:p>
+            <a:pPr marL="0" indent="0">
+              <a:buNone/>
+            </a:pPr>
+            <a:r>
+              <a:rPr lang="en-US" sz="800" dirty="0">
+                <a:latin typeface="Courier New" pitchFamily="49" charset="0"/>
+                <a:cs typeface="Courier New" pitchFamily="49" charset="0"/>
+              </a:rPr>
+              <a:t>&lt;!-- net/</a:t>
+            </a:r>
+            <a:r>
+              <a:rPr lang="en-US" sz="800" u="sng" dirty="0" err="1">
+                <a:latin typeface="Courier New" pitchFamily="49" charset="0"/>
+                <a:cs typeface="Courier New" pitchFamily="49" charset="0"/>
+              </a:rPr>
+              <a:t>gadgil</a:t>
+            </a:r>
+            <a:r>
+              <a:rPr lang="en-US" sz="800" u="sng" dirty="0">
+                <a:latin typeface="Courier New" pitchFamily="49" charset="0"/>
+                <a:cs typeface="Courier New" pitchFamily="49" charset="0"/>
+              </a:rPr>
+              <a:t>/</a:t>
+            </a:r>
+            <a:r>
+              <a:rPr lang="en-US" sz="800" u="sng" dirty="0" err="1">
+                <a:latin typeface="Courier New" pitchFamily="49" charset="0"/>
+                <a:cs typeface="Courier New" pitchFamily="49" charset="0"/>
+              </a:rPr>
+              <a:t>cgoptprice</a:t>
+            </a:r>
+            <a:r>
+              <a:rPr lang="en-US" sz="800" u="sng" dirty="0">
+                <a:latin typeface="Courier New" pitchFamily="49" charset="0"/>
+                <a:cs typeface="Courier New" pitchFamily="49" charset="0"/>
+              </a:rPr>
+              <a:t>/options.pricing_2.10/0.0.1 --&gt;</a:t>
+            </a:r>
+          </a:p>
+          <a:p>
+            <a:pPr marL="0" indent="0">
+              <a:buNone/>
+            </a:pPr>
+            <a:r>
+              <a:rPr lang="en-US" sz="800" dirty="0">
+                <a:latin typeface="Courier New" pitchFamily="49" charset="0"/>
+                <a:cs typeface="Courier New" pitchFamily="49" charset="0"/>
+              </a:rPr>
+              <a:t>&lt;</a:t>
+            </a:r>
+            <a:r>
+              <a:rPr lang="en-US" sz="800" dirty="0" err="1">
+                <a:latin typeface="Courier New" pitchFamily="49" charset="0"/>
+                <a:cs typeface="Courier New" pitchFamily="49" charset="0"/>
+              </a:rPr>
+              <a:t>groupId</a:t>
+            </a:r>
+            <a:r>
+              <a:rPr lang="en-US" sz="800" dirty="0">
+                <a:latin typeface="Courier New" pitchFamily="49" charset="0"/>
+                <a:cs typeface="Courier New" pitchFamily="49" charset="0"/>
+              </a:rPr>
+              <a:t>&gt;</a:t>
+            </a:r>
+            <a:r>
+              <a:rPr lang="en-US" sz="800" dirty="0" err="1">
+                <a:latin typeface="Courier New" pitchFamily="49" charset="0"/>
+                <a:cs typeface="Courier New" pitchFamily="49" charset="0"/>
+              </a:rPr>
+              <a:t>net.gadgil.cgoptprice</a:t>
+            </a:r>
+            <a:r>
+              <a:rPr lang="en-US" sz="800" dirty="0">
+                <a:latin typeface="Courier New" pitchFamily="49" charset="0"/>
+                <a:cs typeface="Courier New" pitchFamily="49" charset="0"/>
+              </a:rPr>
+              <a:t>&lt;/</a:t>
+            </a:r>
+            <a:r>
+              <a:rPr lang="en-US" sz="800" dirty="0" err="1">
+                <a:latin typeface="Courier New" pitchFamily="49" charset="0"/>
+                <a:cs typeface="Courier New" pitchFamily="49" charset="0"/>
+              </a:rPr>
+              <a:t>groupId</a:t>
+            </a:r>
+            <a:r>
+              <a:rPr lang="en-US" sz="800" dirty="0">
+                <a:latin typeface="Courier New" pitchFamily="49" charset="0"/>
+                <a:cs typeface="Courier New" pitchFamily="49" charset="0"/>
+              </a:rPr>
+              <a:t>&gt;</a:t>
+            </a:r>
+          </a:p>
+          <a:p>
+            <a:pPr marL="0" indent="0">
+              <a:buNone/>
+            </a:pPr>
+            <a:r>
+              <a:rPr lang="en-US" sz="800" dirty="0">
+                <a:latin typeface="Courier New" pitchFamily="49" charset="0"/>
+                <a:cs typeface="Courier New" pitchFamily="49" charset="0"/>
+              </a:rPr>
+              <a:t>&lt;</a:t>
+            </a:r>
+            <a:r>
+              <a:rPr lang="en-US" sz="800" dirty="0" err="1">
+                <a:latin typeface="Courier New" pitchFamily="49" charset="0"/>
+                <a:cs typeface="Courier New" pitchFamily="49" charset="0"/>
+              </a:rPr>
+              <a:t>artifactId</a:t>
+            </a:r>
+            <a:r>
+              <a:rPr lang="en-US" sz="800" dirty="0">
+                <a:latin typeface="Courier New" pitchFamily="49" charset="0"/>
+                <a:cs typeface="Courier New" pitchFamily="49" charset="0"/>
+              </a:rPr>
+              <a:t>&gt;options.pricing_2.10&lt;/</a:t>
+            </a:r>
+            <a:r>
+              <a:rPr lang="en-US" sz="800" dirty="0" err="1">
+                <a:latin typeface="Courier New" pitchFamily="49" charset="0"/>
+                <a:cs typeface="Courier New" pitchFamily="49" charset="0"/>
+              </a:rPr>
+              <a:t>artifactId</a:t>
+            </a:r>
+            <a:r>
+              <a:rPr lang="en-US" sz="800" dirty="0">
+                <a:latin typeface="Courier New" pitchFamily="49" charset="0"/>
+                <a:cs typeface="Courier New" pitchFamily="49" charset="0"/>
+              </a:rPr>
+              <a:t>&gt;</a:t>
+            </a:r>
+          </a:p>
+          <a:p>
+            <a:pPr marL="0" indent="0">
+              <a:buNone/>
+            </a:pPr>
+            <a:r>
+              <a:rPr lang="en-US" sz="800" dirty="0">
+                <a:latin typeface="Courier New" pitchFamily="49" charset="0"/>
+                <a:cs typeface="Courier New" pitchFamily="49" charset="0"/>
+              </a:rPr>
+              <a:t>&lt;version&gt;0.0.1&lt;/version&gt;</a:t>
+            </a:r>
+          </a:p>
+          <a:p>
+            <a:pPr marL="0" indent="0">
+              <a:buNone/>
+            </a:pPr>
+            <a:r>
+              <a:rPr lang="en-US" sz="800" dirty="0">
+                <a:latin typeface="Courier New" pitchFamily="49" charset="0"/>
+                <a:cs typeface="Courier New" pitchFamily="49" charset="0"/>
+              </a:rPr>
+              <a:t>&lt;/dependency&gt;</a:t>
+            </a:r>
+          </a:p>
+          <a:p>
+            <a:pPr marL="0" indent="0">
+              <a:buNone/>
+            </a:pPr>
+            <a:r>
+              <a:rPr lang="en-US" sz="800" dirty="0">
+                <a:latin typeface="Courier New" pitchFamily="49" charset="0"/>
+                <a:cs typeface="Courier New" pitchFamily="49" charset="0"/>
+              </a:rPr>
+              <a:t>&lt;!-- </a:t>
+            </a:r>
+            <a:r>
+              <a:rPr lang="en-US" sz="800" u="sng" dirty="0" err="1">
+                <a:latin typeface="Courier New" pitchFamily="49" charset="0"/>
+                <a:cs typeface="Courier New" pitchFamily="49" charset="0"/>
+              </a:rPr>
+              <a:t>optionpricing</a:t>
+            </a:r>
+            <a:r>
+              <a:rPr lang="en-US" sz="800" u="sng" dirty="0">
+                <a:latin typeface="Courier New" pitchFamily="49" charset="0"/>
+                <a:cs typeface="Courier New" pitchFamily="49" charset="0"/>
+              </a:rPr>
+              <a:t> / </a:t>
+            </a:r>
+            <a:r>
+              <a:rPr lang="en-US" sz="800" u="sng" dirty="0" err="1">
+                <a:latin typeface="Courier New" pitchFamily="49" charset="0"/>
+                <a:cs typeface="Courier New" pitchFamily="49" charset="0"/>
+              </a:rPr>
+              <a:t>finance.portfolio</a:t>
+            </a:r>
+            <a:r>
+              <a:rPr lang="en-US" sz="800" u="sng" dirty="0">
+                <a:latin typeface="Courier New" pitchFamily="49" charset="0"/>
+                <a:cs typeface="Courier New" pitchFamily="49" charset="0"/>
+              </a:rPr>
+              <a:t> / releases / net / </a:t>
+            </a:r>
+            <a:r>
+              <a:rPr lang="en-US" sz="800" u="sng" dirty="0" err="1">
+                <a:latin typeface="Courier New" pitchFamily="49" charset="0"/>
+                <a:cs typeface="Courier New" pitchFamily="49" charset="0"/>
+              </a:rPr>
+              <a:t>gadgil</a:t>
+            </a:r>
+            <a:r>
+              <a:rPr lang="en-US" sz="800" u="sng" dirty="0">
+                <a:latin typeface="Courier New" pitchFamily="49" charset="0"/>
+                <a:cs typeface="Courier New" pitchFamily="49" charset="0"/>
+              </a:rPr>
+              <a:t> / finance.portfolio_2.10 </a:t>
+            </a:r>
+          </a:p>
+          <a:p>
+            <a:pPr marL="0" indent="0">
+              <a:buNone/>
+            </a:pPr>
+            <a:r>
+              <a:rPr lang="en-US" sz="800" dirty="0">
+                <a:latin typeface="Courier New" pitchFamily="49" charset="0"/>
+                <a:cs typeface="Courier New" pitchFamily="49" charset="0"/>
+              </a:rPr>
+              <a:t>/ 0.1.0-SNAPSHOT --&gt;</a:t>
+            </a:r>
+          </a:p>
+          <a:p>
+            <a:pPr marL="0" indent="0">
+              <a:buNone/>
+            </a:pPr>
+            <a:r>
+              <a:rPr lang="en-US" sz="800" dirty="0">
+                <a:latin typeface="Courier New" pitchFamily="49" charset="0"/>
+                <a:cs typeface="Courier New" pitchFamily="49" charset="0"/>
+              </a:rPr>
+              <a:t>&lt;dependency&gt;</a:t>
+            </a:r>
+          </a:p>
+          <a:p>
+            <a:pPr marL="0" indent="0">
+              <a:buNone/>
+            </a:pPr>
+            <a:r>
+              <a:rPr lang="en-US" sz="800" dirty="0">
+                <a:latin typeface="Courier New" pitchFamily="49" charset="0"/>
+                <a:cs typeface="Courier New" pitchFamily="49" charset="0"/>
+              </a:rPr>
+              <a:t>&lt;</a:t>
+            </a:r>
+            <a:r>
+              <a:rPr lang="en-US" sz="800" dirty="0" err="1">
+                <a:latin typeface="Courier New" pitchFamily="49" charset="0"/>
+                <a:cs typeface="Courier New" pitchFamily="49" charset="0"/>
+              </a:rPr>
+              <a:t>groupId</a:t>
+            </a:r>
+            <a:r>
+              <a:rPr lang="en-US" sz="800" dirty="0">
+                <a:latin typeface="Courier New" pitchFamily="49" charset="0"/>
+                <a:cs typeface="Courier New" pitchFamily="49" charset="0"/>
+              </a:rPr>
+              <a:t>&gt;</a:t>
+            </a:r>
+            <a:r>
+              <a:rPr lang="en-US" sz="800" dirty="0" err="1">
+                <a:latin typeface="Courier New" pitchFamily="49" charset="0"/>
+                <a:cs typeface="Courier New" pitchFamily="49" charset="0"/>
+              </a:rPr>
+              <a:t>net.gadgil</a:t>
+            </a:r>
+            <a:r>
+              <a:rPr lang="en-US" sz="800" dirty="0">
+                <a:latin typeface="Courier New" pitchFamily="49" charset="0"/>
+                <a:cs typeface="Courier New" pitchFamily="49" charset="0"/>
+              </a:rPr>
+              <a:t>&lt;/</a:t>
+            </a:r>
+            <a:r>
+              <a:rPr lang="en-US" sz="800" dirty="0" err="1">
+                <a:latin typeface="Courier New" pitchFamily="49" charset="0"/>
+                <a:cs typeface="Courier New" pitchFamily="49" charset="0"/>
+              </a:rPr>
+              <a:t>groupId</a:t>
+            </a:r>
+            <a:r>
+              <a:rPr lang="en-US" sz="800" dirty="0">
+                <a:latin typeface="Courier New" pitchFamily="49" charset="0"/>
+                <a:cs typeface="Courier New" pitchFamily="49" charset="0"/>
+              </a:rPr>
+              <a:t>&gt;</a:t>
+            </a:r>
+          </a:p>
+          <a:p>
+            <a:pPr marL="0" indent="0">
+              <a:buNone/>
+            </a:pPr>
+            <a:r>
+              <a:rPr lang="en-US" sz="800" dirty="0">
+                <a:latin typeface="Courier New" pitchFamily="49" charset="0"/>
+                <a:cs typeface="Courier New" pitchFamily="49" charset="0"/>
+              </a:rPr>
+              <a:t>&lt;</a:t>
+            </a:r>
+            <a:r>
+              <a:rPr lang="en-US" sz="800" dirty="0" err="1">
+                <a:latin typeface="Courier New" pitchFamily="49" charset="0"/>
+                <a:cs typeface="Courier New" pitchFamily="49" charset="0"/>
+              </a:rPr>
+              <a:t>artifactId</a:t>
+            </a:r>
+            <a:r>
+              <a:rPr lang="en-US" sz="800" dirty="0">
+                <a:latin typeface="Courier New" pitchFamily="49" charset="0"/>
+                <a:cs typeface="Courier New" pitchFamily="49" charset="0"/>
+              </a:rPr>
+              <a:t>&gt;finance.portfolio_2.10&lt;/</a:t>
+            </a:r>
+            <a:r>
+              <a:rPr lang="en-US" sz="800" dirty="0" err="1">
+                <a:latin typeface="Courier New" pitchFamily="49" charset="0"/>
+                <a:cs typeface="Courier New" pitchFamily="49" charset="0"/>
+              </a:rPr>
+              <a:t>artifactId</a:t>
+            </a:r>
+            <a:r>
+              <a:rPr lang="en-US" sz="800" dirty="0">
+                <a:latin typeface="Courier New" pitchFamily="49" charset="0"/>
+                <a:cs typeface="Courier New" pitchFamily="49" charset="0"/>
+              </a:rPr>
+              <a:t>&gt;</a:t>
+            </a:r>
+          </a:p>
+          <a:p>
+            <a:pPr marL="0" indent="0">
+              <a:buNone/>
+            </a:pPr>
+            <a:r>
+              <a:rPr lang="en-US" sz="800" dirty="0">
+                <a:latin typeface="Courier New" pitchFamily="49" charset="0"/>
+                <a:cs typeface="Courier New" pitchFamily="49" charset="0"/>
+              </a:rPr>
+              <a:t>&lt;version&gt;0.1.0-SNAPSHOT&lt;/version&gt;</a:t>
+            </a:r>
+          </a:p>
+          <a:p>
+            <a:pPr marL="0" indent="0">
+              <a:buNone/>
+            </a:pPr>
+            <a:r>
+              <a:rPr lang="en-US" sz="800" dirty="0">
+                <a:latin typeface="Courier New" pitchFamily="49" charset="0"/>
+                <a:cs typeface="Courier New" pitchFamily="49" charset="0"/>
+              </a:rPr>
+              <a:t>&lt;/dependency&gt;</a:t>
+            </a:r>
+            <a:endParaRPr lang="en-US" sz="800" dirty="0">
+              <a:latin typeface="Courier New" pitchFamily="49" charset="0"/>
+              <a:cs typeface="Courier New" pitchFamily="49" charset="0"/>
+            </a:endParaRPr>
+          </a:p>
+        </p:txBody>
+      </p:sp>
+      <p:sp>
+        <p:nvSpPr>
+          <p:cNvPr id="4" name="Footer Placeholder 3"/>
+          <p:cNvSpPr>
+            <a:spLocks noGrp="1"/>
+          </p:cNvSpPr>
+          <p:nvPr>
+            <p:ph type="ftr" sz="quarter" idx="11"/>
+          </p:nvPr>
+        </p:nvSpPr>
+        <p:spPr/>
+        <p:txBody>
+          <a:bodyPr/>
+          <a:lstStyle/>
+          <a:p>
+            <a:r>
+              <a:rPr lang="en-MY" smtClean="0"/>
+              <a:t>Copyright (c) 2013 Chetan Gadgil</a:t>
+            </a:r>
+            <a:endParaRPr lang="en-MY"/>
+          </a:p>
+        </p:txBody>
+      </p:sp>
+      <p:sp>
+        <p:nvSpPr>
+          <p:cNvPr id="5" name="Slide Number Placeholder 4"/>
+          <p:cNvSpPr>
+            <a:spLocks noGrp="1"/>
+          </p:cNvSpPr>
+          <p:nvPr>
+            <p:ph type="sldNum" sz="quarter" idx="12"/>
+          </p:nvPr>
+        </p:nvSpPr>
+        <p:spPr/>
+        <p:txBody>
+          <a:bodyPr/>
+          <a:lstStyle/>
+          <a:p>
+            <a:fld id="{CB67D5E6-BE40-49DF-9411-62F59E255471}" type="slidenum">
+              <a:rPr lang="en-MY" smtClean="0"/>
+              <a:pPr/>
+              <a:t>11</a:t>
+            </a:fld>
+            <a:endParaRPr lang="en-MY"/>
+          </a:p>
+        </p:txBody>
+      </p:sp>
+      <p:sp>
+        <p:nvSpPr>
+          <p:cNvPr id="6" name="Content Placeholder 2"/>
+          <p:cNvSpPr txBox="1">
+            <a:spLocks/>
+          </p:cNvSpPr>
+          <p:nvPr/>
+        </p:nvSpPr>
+        <p:spPr>
+          <a:xfrm>
+            <a:off x="4953000" y="2173217"/>
+            <a:ext cx="3505200" cy="1941584"/>
+          </a:xfrm>
+          <a:prstGeom prst="rect">
+            <a:avLst/>
+          </a:prstGeom>
+        </p:spPr>
+        <p:txBody>
+          <a:bodyPr vert="horz" lIns="91440" tIns="45720" rIns="91440" bIns="45720" rtlCol="0">
+            <a:noAutofit/>
+          </a:bodyPr>
+          <a:lstStyle>
+            <a:lvl1pPr marL="228600" indent="-228600" algn="l" defTabSz="457200" rtl="0" eaLnBrk="1" latinLnBrk="0" hangingPunct="1">
+              <a:spcBef>
+                <a:spcPct val="20000"/>
+              </a:spcBef>
+              <a:buClr>
+                <a:schemeClr val="accent1"/>
+              </a:buClr>
+              <a:buSzPct val="95000"/>
+              <a:buFont typeface="Rage Italic" pitchFamily="66" charset="0"/>
+              <a:buChar char="0"/>
+              <a:defRPr sz="2400" kern="1200">
+                <a:solidFill>
+                  <a:schemeClr val="tx1">
+                    <a:lumMod val="75000"/>
+                    <a:lumOff val="25000"/>
+                  </a:schemeClr>
+                </a:solidFill>
+                <a:latin typeface="+mn-lt"/>
+                <a:ea typeface="+mn-ea"/>
+                <a:cs typeface="+mn-cs"/>
+              </a:defRPr>
+            </a:lvl1pPr>
+            <a:lvl2pPr marL="557784" indent="-228600" algn="l" defTabSz="457200" rtl="0" eaLnBrk="1" latinLnBrk="0" hangingPunct="1">
+              <a:spcBef>
+                <a:spcPct val="20000"/>
+              </a:spcBef>
+              <a:buClr>
+                <a:schemeClr val="accent1"/>
+              </a:buClr>
+              <a:buSzPct val="95000"/>
+              <a:buFont typeface="Rage Italic" pitchFamily="66" charset="0"/>
+              <a:buChar char="0"/>
+              <a:defRPr sz="2200" kern="1200">
+                <a:solidFill>
+                  <a:schemeClr val="tx1">
+                    <a:lumMod val="75000"/>
+                    <a:lumOff val="25000"/>
+                  </a:schemeClr>
+                </a:solidFill>
+                <a:latin typeface="+mn-lt"/>
+                <a:ea typeface="+mn-ea"/>
+                <a:cs typeface="+mn-cs"/>
+              </a:defRPr>
+            </a:lvl2pPr>
+            <a:lvl3pPr marL="822960" indent="-182880" algn="l" defTabSz="457200" rtl="0" eaLnBrk="1" latinLnBrk="0" hangingPunct="1">
+              <a:spcBef>
+                <a:spcPct val="20000"/>
+              </a:spcBef>
+              <a:buClr>
+                <a:schemeClr val="accent1"/>
+              </a:buClr>
+              <a:buSzPct val="95000"/>
+              <a:buFont typeface="Rage Italic" pitchFamily="66" charset="0"/>
+              <a:buChar char="0"/>
+              <a:defRPr sz="2000" kern="1200">
+                <a:solidFill>
+                  <a:schemeClr val="tx1">
+                    <a:lumMod val="75000"/>
+                    <a:lumOff val="25000"/>
+                  </a:schemeClr>
+                </a:solidFill>
+                <a:latin typeface="+mn-lt"/>
+                <a:ea typeface="+mn-ea"/>
+                <a:cs typeface="+mn-cs"/>
+              </a:defRPr>
+            </a:lvl3pPr>
+            <a:lvl4pPr marL="1097280" indent="-182880" algn="l" defTabSz="457200" rtl="0" eaLnBrk="1" latinLnBrk="0" hangingPunct="1">
+              <a:spcBef>
+                <a:spcPct val="20000"/>
+              </a:spcBef>
+              <a:buClr>
+                <a:schemeClr val="accent1"/>
+              </a:buClr>
+              <a:buSzPct val="95000"/>
+              <a:buFont typeface="Rage Italic" pitchFamily="66" charset="0"/>
+              <a:buChar char="0"/>
+              <a:defRPr sz="1600" kern="1200">
+                <a:solidFill>
+                  <a:schemeClr val="tx1">
+                    <a:lumMod val="75000"/>
+                    <a:lumOff val="25000"/>
+                  </a:schemeClr>
+                </a:solidFill>
+                <a:latin typeface="+mn-lt"/>
+                <a:ea typeface="+mn-ea"/>
+                <a:cs typeface="+mn-cs"/>
+              </a:defRPr>
+            </a:lvl4pPr>
+            <a:lvl5pPr marL="1417320" indent="-182880" algn="l" defTabSz="457200" rtl="0" eaLnBrk="1" latinLnBrk="0" hangingPunct="1">
+              <a:spcBef>
+                <a:spcPct val="20000"/>
+              </a:spcBef>
+              <a:buClr>
+                <a:schemeClr val="accent1"/>
+              </a:buClr>
+              <a:buSzPct val="95000"/>
+              <a:buFont typeface="Rage Italic" pitchFamily="66" charset="0"/>
+              <a:buChar char="0"/>
+              <a:defRPr sz="1400" kern="1200" baseline="0">
+                <a:solidFill>
+                  <a:schemeClr val="tx1">
+                    <a:lumMod val="75000"/>
+                    <a:lumOff val="25000"/>
+                  </a:schemeClr>
+                </a:solidFill>
+                <a:latin typeface="+mn-lt"/>
+                <a:ea typeface="+mn-ea"/>
+                <a:cs typeface="+mn-cs"/>
+              </a:defRPr>
+            </a:lvl5pPr>
+            <a:lvl6pPr marL="1645920" indent="-182880" algn="l" defTabSz="457200" rtl="0" eaLnBrk="1" latinLnBrk="0" hangingPunct="1">
+              <a:spcBef>
+                <a:spcPct val="20000"/>
+              </a:spcBef>
+              <a:buClr>
+                <a:schemeClr val="accent1"/>
+              </a:buClr>
+              <a:buSzPct val="95000"/>
+              <a:buFont typeface="Rage Italic" pitchFamily="66" charset="0"/>
+              <a:buChar char="0"/>
+              <a:defRPr sz="1400" kern="1200">
+                <a:solidFill>
+                  <a:schemeClr val="tx1">
+                    <a:lumMod val="75000"/>
+                    <a:lumOff val="25000"/>
+                  </a:schemeClr>
+                </a:solidFill>
+                <a:latin typeface="+mn-lt"/>
+                <a:ea typeface="+mn-ea"/>
+                <a:cs typeface="+mn-cs"/>
+              </a:defRPr>
+            </a:lvl6pPr>
+            <a:lvl7pPr marL="1920240" indent="-182880" algn="l" defTabSz="457200" rtl="0" eaLnBrk="1" latinLnBrk="0" hangingPunct="1">
+              <a:spcBef>
+                <a:spcPct val="20000"/>
+              </a:spcBef>
+              <a:buClr>
+                <a:schemeClr val="accent1"/>
+              </a:buClr>
+              <a:buSzPct val="95000"/>
+              <a:buFont typeface="Rage Italic" pitchFamily="66" charset="0"/>
+              <a:buChar char="0"/>
+              <a:defRPr sz="1400" kern="1200">
+                <a:solidFill>
+                  <a:schemeClr val="tx1">
+                    <a:lumMod val="75000"/>
+                    <a:lumOff val="25000"/>
+                  </a:schemeClr>
+                </a:solidFill>
+                <a:latin typeface="+mn-lt"/>
+                <a:ea typeface="+mn-ea"/>
+                <a:cs typeface="+mn-cs"/>
+              </a:defRPr>
+            </a:lvl7pPr>
+            <a:lvl8pPr marL="2194560" indent="-182880" algn="l" defTabSz="457200" rtl="0" eaLnBrk="1" latinLnBrk="0" hangingPunct="1">
+              <a:spcBef>
+                <a:spcPct val="20000"/>
+              </a:spcBef>
+              <a:buClr>
+                <a:schemeClr val="accent1"/>
+              </a:buClr>
+              <a:buSzPct val="95000"/>
+              <a:buFont typeface="Rage Italic" pitchFamily="66" charset="0"/>
+              <a:buChar char="0"/>
+              <a:defRPr sz="1400" kern="1200">
+                <a:solidFill>
+                  <a:schemeClr val="tx1">
+                    <a:lumMod val="75000"/>
+                    <a:lumOff val="25000"/>
+                  </a:schemeClr>
+                </a:solidFill>
+                <a:latin typeface="+mn-lt"/>
+                <a:ea typeface="+mn-ea"/>
+                <a:cs typeface="+mn-cs"/>
+              </a:defRPr>
+            </a:lvl8pPr>
+            <a:lvl9pPr marL="2468880" indent="-182880" algn="l" defTabSz="457200" rtl="0" eaLnBrk="1" latinLnBrk="0" hangingPunct="1">
+              <a:spcBef>
+                <a:spcPct val="20000"/>
+              </a:spcBef>
+              <a:buClr>
+                <a:schemeClr val="accent1"/>
+              </a:buClr>
+              <a:buSzPct val="95000"/>
+              <a:buFont typeface="Rage Italic" pitchFamily="66" charset="0"/>
+              <a:buChar char="0"/>
+              <a:defRPr sz="1400" kern="1200">
+                <a:solidFill>
+                  <a:schemeClr val="tx1">
+                    <a:lumMod val="75000"/>
+                    <a:lumOff val="25000"/>
+                  </a:schemeClr>
+                </a:solidFill>
+                <a:latin typeface="+mn-lt"/>
+                <a:ea typeface="+mn-ea"/>
+                <a:cs typeface="+mn-cs"/>
+              </a:defRPr>
+            </a:lvl9pPr>
+          </a:lstStyle>
+          <a:p>
+            <a:pPr marL="0" indent="0">
+              <a:buNone/>
+            </a:pPr>
+            <a:r>
+              <a:rPr lang="en-US" sz="800" b="1" dirty="0">
+                <a:latin typeface="Courier New" pitchFamily="49" charset="0"/>
+                <a:cs typeface="Courier New" pitchFamily="49" charset="0"/>
+              </a:rPr>
+              <a:t>public void </a:t>
+            </a:r>
+            <a:r>
+              <a:rPr lang="en-US" sz="800" b="1" dirty="0" err="1">
+                <a:latin typeface="Courier New" pitchFamily="49" charset="0"/>
+                <a:cs typeface="Courier New" pitchFamily="49" charset="0"/>
+              </a:rPr>
+              <a:t>testBlackScholesGeneralizedCallOption</a:t>
+            </a:r>
+            <a:r>
+              <a:rPr lang="en-US" sz="800" b="1" dirty="0">
+                <a:latin typeface="Courier New" pitchFamily="49" charset="0"/>
+                <a:cs typeface="Courier New" pitchFamily="49" charset="0"/>
+              </a:rPr>
+              <a:t>()</a:t>
+            </a:r>
+          </a:p>
+          <a:p>
+            <a:pPr marL="0" indent="0">
+              <a:buNone/>
+            </a:pPr>
+            <a:r>
+              <a:rPr lang="en-US" sz="800" dirty="0">
+                <a:latin typeface="Courier New" pitchFamily="49" charset="0"/>
+                <a:cs typeface="Courier New" pitchFamily="49" charset="0"/>
+              </a:rPr>
+              <a:t>{</a:t>
+            </a:r>
+          </a:p>
+          <a:p>
+            <a:pPr marL="0" indent="0">
+              <a:buNone/>
+            </a:pPr>
+            <a:r>
+              <a:rPr lang="en-US" sz="800" b="1" dirty="0">
+                <a:latin typeface="Courier New" pitchFamily="49" charset="0"/>
+                <a:cs typeface="Courier New" pitchFamily="49" charset="0"/>
+              </a:rPr>
+              <a:t>double </a:t>
+            </a:r>
+            <a:r>
+              <a:rPr lang="en-US" sz="800" b="1" dirty="0" err="1">
+                <a:latin typeface="Courier New" pitchFamily="49" charset="0"/>
+                <a:cs typeface="Courier New" pitchFamily="49" charset="0"/>
+              </a:rPr>
+              <a:t>optionValue</a:t>
+            </a:r>
+            <a:r>
+              <a:rPr lang="en-US" sz="800" b="1" dirty="0">
+                <a:latin typeface="Courier New" pitchFamily="49" charset="0"/>
+                <a:cs typeface="Courier New" pitchFamily="49" charset="0"/>
+              </a:rPr>
+              <a:t> = net.gadgil.cgoptprice.BlackScholes.callOptionGeneralizedBlackScholes(60, 65, 0.25, 0.08, 0.08, 0.3);</a:t>
+            </a:r>
+          </a:p>
+          <a:p>
+            <a:pPr marL="0" indent="0">
+              <a:buNone/>
+            </a:pPr>
+            <a:r>
+              <a:rPr lang="en-US" sz="800" b="1" dirty="0">
+                <a:latin typeface="Courier New" pitchFamily="49" charset="0"/>
+                <a:cs typeface="Courier New" pitchFamily="49" charset="0"/>
+              </a:rPr>
+              <a:t>double diff = </a:t>
+            </a:r>
+            <a:r>
+              <a:rPr lang="en-US" sz="800" b="1" dirty="0" err="1">
+                <a:latin typeface="Courier New" pitchFamily="49" charset="0"/>
+                <a:cs typeface="Courier New" pitchFamily="49" charset="0"/>
+              </a:rPr>
+              <a:t>Math.abs</a:t>
+            </a:r>
+            <a:r>
+              <a:rPr lang="en-US" sz="800" b="1" dirty="0">
+                <a:latin typeface="Courier New" pitchFamily="49" charset="0"/>
+                <a:cs typeface="Courier New" pitchFamily="49" charset="0"/>
+              </a:rPr>
+              <a:t>(2.1334 - </a:t>
+            </a:r>
+            <a:r>
+              <a:rPr lang="en-US" sz="800" b="1" dirty="0" err="1">
+                <a:latin typeface="Courier New" pitchFamily="49" charset="0"/>
+                <a:cs typeface="Courier New" pitchFamily="49" charset="0"/>
+              </a:rPr>
+              <a:t>optionValue</a:t>
+            </a:r>
+            <a:r>
+              <a:rPr lang="en-US" sz="800" b="1" dirty="0">
+                <a:latin typeface="Courier New" pitchFamily="49" charset="0"/>
+                <a:cs typeface="Courier New" pitchFamily="49" charset="0"/>
+              </a:rPr>
+              <a:t>);</a:t>
+            </a:r>
+          </a:p>
+          <a:p>
+            <a:pPr marL="0" indent="0">
+              <a:buNone/>
+            </a:pPr>
+            <a:r>
+              <a:rPr lang="en-US" sz="800" b="1" dirty="0">
+                <a:latin typeface="Courier New" pitchFamily="49" charset="0"/>
+                <a:cs typeface="Courier New" pitchFamily="49" charset="0"/>
+              </a:rPr>
+              <a:t>if(diff &lt; 0.0001)</a:t>
+            </a:r>
+          </a:p>
+          <a:p>
+            <a:pPr marL="0" indent="0">
+              <a:buNone/>
+            </a:pPr>
+            <a:r>
+              <a:rPr lang="en-US" sz="800" dirty="0" err="1">
+                <a:latin typeface="Courier New" pitchFamily="49" charset="0"/>
+                <a:cs typeface="Courier New" pitchFamily="49" charset="0"/>
+              </a:rPr>
+              <a:t>assertTrue</a:t>
+            </a:r>
+            <a:r>
+              <a:rPr lang="en-US" sz="800" dirty="0">
+                <a:latin typeface="Courier New" pitchFamily="49" charset="0"/>
+                <a:cs typeface="Courier New" pitchFamily="49" charset="0"/>
+              </a:rPr>
+              <a:t>( </a:t>
+            </a:r>
+            <a:r>
+              <a:rPr lang="en-US" sz="800" b="1" dirty="0">
+                <a:latin typeface="Courier New" pitchFamily="49" charset="0"/>
+                <a:cs typeface="Courier New" pitchFamily="49" charset="0"/>
+              </a:rPr>
+              <a:t>true );</a:t>
+            </a:r>
+          </a:p>
+          <a:p>
+            <a:pPr marL="0" indent="0">
+              <a:buNone/>
+            </a:pPr>
+            <a:r>
+              <a:rPr lang="en-US" sz="800" b="1" dirty="0">
+                <a:latin typeface="Courier New" pitchFamily="49" charset="0"/>
+                <a:cs typeface="Courier New" pitchFamily="49" charset="0"/>
+              </a:rPr>
+              <a:t>else </a:t>
+            </a:r>
+          </a:p>
+          <a:p>
+            <a:pPr marL="0" indent="0">
+              <a:buNone/>
+            </a:pPr>
+            <a:r>
+              <a:rPr lang="en-US" sz="800" dirty="0" err="1">
+                <a:latin typeface="Courier New" pitchFamily="49" charset="0"/>
+                <a:cs typeface="Courier New" pitchFamily="49" charset="0"/>
+              </a:rPr>
+              <a:t>assertTrue</a:t>
+            </a:r>
+            <a:r>
+              <a:rPr lang="en-US" sz="800" dirty="0">
+                <a:latin typeface="Courier New" pitchFamily="49" charset="0"/>
+                <a:cs typeface="Courier New" pitchFamily="49" charset="0"/>
+              </a:rPr>
+              <a:t>(</a:t>
+            </a:r>
+            <a:r>
+              <a:rPr lang="en-US" sz="800" b="1" dirty="0">
+                <a:latin typeface="Courier New" pitchFamily="49" charset="0"/>
+                <a:cs typeface="Courier New" pitchFamily="49" charset="0"/>
+              </a:rPr>
+              <a:t>false);</a:t>
+            </a:r>
+          </a:p>
+          <a:p>
+            <a:pPr marL="0" indent="0">
+              <a:buNone/>
+            </a:pPr>
+            <a:r>
+              <a:rPr lang="en-US" sz="800" dirty="0">
+                <a:latin typeface="Courier New" pitchFamily="49" charset="0"/>
+                <a:cs typeface="Courier New" pitchFamily="49" charset="0"/>
+              </a:rPr>
+              <a:t>}</a:t>
+            </a:r>
+            <a:endParaRPr lang="en-US" sz="800" dirty="0">
+              <a:latin typeface="Courier New" pitchFamily="49" charset="0"/>
+              <a:cs typeface="Courier New" pitchFamily="49" charset="0"/>
+            </a:endParaRPr>
+          </a:p>
+        </p:txBody>
+      </p:sp>
+      <p:sp>
+        <p:nvSpPr>
+          <p:cNvPr id="7" name="Rectangle 6"/>
+          <p:cNvSpPr/>
+          <p:nvPr/>
+        </p:nvSpPr>
+        <p:spPr>
+          <a:xfrm>
+            <a:off x="914400" y="4495800"/>
+            <a:ext cx="7086600" cy="369332"/>
+          </a:xfrm>
+          <a:prstGeom prst="rect">
+            <a:avLst/>
+          </a:prstGeom>
+        </p:spPr>
+        <p:txBody>
+          <a:bodyPr wrap="square">
+            <a:spAutoFit/>
+          </a:bodyPr>
+          <a:lstStyle/>
+          <a:p>
+            <a:r>
+              <a:rPr lang="en-US" dirty="0">
+                <a:solidFill>
+                  <a:srgbClr val="0070C0"/>
+                </a:solidFill>
+                <a:hlinkClick r:id="rId2"/>
+              </a:rPr>
+              <a:t>https://github.com/cgadgil/optionpricing/tree/master/javasamples</a:t>
+            </a:r>
+            <a:endParaRPr lang="en-US" dirty="0">
+              <a:solidFill>
+                <a:srgbClr val="0070C0"/>
+              </a:solidFill>
+            </a:endParaRPr>
+          </a:p>
+        </p:txBody>
+      </p:sp>
+    </p:spTree>
+    <p:extLst>
+      <p:ext uri="{BB962C8B-B14F-4D97-AF65-F5344CB8AC3E}">
+        <p14:creationId xmlns:p14="http://schemas.microsoft.com/office/powerpoint/2010/main" val="2403828773"/>
+      </p:ext>
+    </p:extLst>
+  </p:cSld>
+  <p:clrMapOvr>
+    <a:masterClrMapping/>
+  </p:clrMapOvr>
+</p:sld>
+</file>
+
+<file path=ppt/slides/slide12.xml><?xml version="1.0" encoding="utf-8"?>
+<p:sld xmlns:a="http://schemas.openxmlformats.org/drawingml/2006/main" xmlns:r="http://schemas.openxmlformats.org/officeDocument/2006/relationships" xmlns:p="http://schemas.openxmlformats.org/presentationml/2006/main">
+  <p:cSld>
+    <p:spTree>
+      <p:nvGrpSpPr>
+        <p:cNvPr id="1" name=""/>
+        <p:cNvGrpSpPr/>
+        <p:nvPr/>
+      </p:nvGrpSpPr>
+      <p:grpSpPr>
+        <a:xfrm>
+          <a:off x="0" y="0"/>
+          <a:ext cx="0" cy="0"/>
+          <a:chOff x="0" y="0"/>
+          <a:chExt cx="0" cy="0"/>
+        </a:xfrm>
+      </p:grpSpPr>
+      <p:sp>
+        <p:nvSpPr>
+          <p:cNvPr id="2" name="Title 1"/>
+          <p:cNvSpPr>
+            <a:spLocks noGrp="1"/>
+          </p:cNvSpPr>
+          <p:nvPr>
+            <p:ph type="title"/>
+          </p:nvPr>
+        </p:nvSpPr>
+        <p:spPr/>
+        <p:txBody>
+          <a:bodyPr/>
+          <a:lstStyle/>
+          <a:p>
+            <a:r>
+              <a:rPr lang="en-US" dirty="0" smtClean="0"/>
               <a:t>Questions?</a:t>
             </a:r>
             <a:endParaRPr lang="en-US" dirty="0"/>
+          </a:p>
+        </p:txBody>
+      </p:sp>
+      <p:sp>
+        <p:nvSpPr>
+          <p:cNvPr id="3" name="Footer Placeholder 2"/>
+          <p:cNvSpPr>
+            <a:spLocks noGrp="1"/>
+          </p:cNvSpPr>
+          <p:nvPr>
+            <p:ph type="ftr" sz="quarter" idx="11"/>
+          </p:nvPr>
+        </p:nvSpPr>
+        <p:spPr/>
+        <p:txBody>
+          <a:bodyPr/>
+          <a:lstStyle/>
+          <a:p>
+            <a:r>
+              <a:rPr lang="en-MY" smtClean="0"/>
+              <a:t>Copyright (c) 2013 Chetan Gadgil</a:t>
+            </a:r>
+            <a:endParaRPr lang="en-MY"/>
+          </a:p>
+        </p:txBody>
+      </p:sp>
+      <p:sp>
+        <p:nvSpPr>
+          <p:cNvPr id="4" name="Slide Number Placeholder 3"/>
+          <p:cNvSpPr>
+            <a:spLocks noGrp="1"/>
+          </p:cNvSpPr>
+          <p:nvPr>
+            <p:ph type="sldNum" sz="quarter" idx="12"/>
+          </p:nvPr>
+        </p:nvSpPr>
+        <p:spPr/>
+        <p:txBody>
+          <a:bodyPr/>
+          <a:lstStyle/>
+          <a:p>
+            <a:fld id="{CB67D5E6-BE40-49DF-9411-62F59E255471}" type="slidenum">
+              <a:rPr lang="en-MY" smtClean="0"/>
+              <a:pPr/>
+              <a:t>12</a:t>
+            </a:fld>
+            <a:endParaRPr lang="en-MY"/>
           </a:p>
         </p:txBody>
       </p:sp>
@@ -44277,6 +45931,13 @@
   <p:clrMapOvr>
     <a:masterClrMapping/>
   </p:clrMapOvr>
+  <p:timing>
+    <p:tnLst>
+      <p:par>
+        <p:cTn id="1" dur="indefinite" restart="never" nodeType="tmRoot"/>
+      </p:par>
+    </p:tnLst>
+  </p:timing>
 </p:sld>
 </file>
 
@@ -44314,7 +45975,11 @@
           <a:p>
             <a:r>
               <a:rPr lang="en-US" dirty="0" smtClean="0"/>
-              <a:t>Options Value Primer</a:t>
+              <a:t>Option </a:t>
+            </a:r>
+            <a:r>
+              <a:rPr lang="en-US" dirty="0" smtClean="0"/>
+              <a:t>Value Primer</a:t>
             </a:r>
             <a:endParaRPr lang="en-US" dirty="0"/>
           </a:p>
@@ -44344,7 +46009,7 @@
         <p:spPr bwMode="auto">
           <a:xfrm>
             <a:off x="2438400" y="1676400"/>
-            <a:ext cx="4267200" cy="4474590"/>
+            <a:ext cx="4114800" cy="4314783"/>
           </a:xfrm>
           <a:prstGeom prst="rect">
             <a:avLst/>
@@ -44361,6 +46026,117 @@
           </a:extLst>
         </p:spPr>
       </p:pic>
+      <p:sp>
+        <p:nvSpPr>
+          <p:cNvPr id="3" name="Footer Placeholder 2"/>
+          <p:cNvSpPr>
+            <a:spLocks noGrp="1"/>
+          </p:cNvSpPr>
+          <p:nvPr>
+            <p:ph type="ftr" sz="quarter" idx="11"/>
+          </p:nvPr>
+        </p:nvSpPr>
+        <p:spPr/>
+        <p:txBody>
+          <a:bodyPr/>
+          <a:lstStyle/>
+          <a:p>
+            <a:r>
+              <a:rPr lang="en-MY" smtClean="0"/>
+              <a:t>Copyright (c) 2013 Chetan Gadgil</a:t>
+            </a:r>
+            <a:endParaRPr lang="en-MY"/>
+          </a:p>
+        </p:txBody>
+      </p:sp>
+      <p:sp>
+        <p:nvSpPr>
+          <p:cNvPr id="4" name="Slide Number Placeholder 3"/>
+          <p:cNvSpPr>
+            <a:spLocks noGrp="1"/>
+          </p:cNvSpPr>
+          <p:nvPr>
+            <p:ph type="sldNum" sz="quarter" idx="12"/>
+          </p:nvPr>
+        </p:nvSpPr>
+        <p:spPr/>
+        <p:txBody>
+          <a:bodyPr/>
+          <a:lstStyle/>
+          <a:p>
+            <a:fld id="{CB67D5E6-BE40-49DF-9411-62F59E255471}" type="slidenum">
+              <a:rPr lang="en-MY" smtClean="0"/>
+              <a:pPr/>
+              <a:t>2</a:t>
+            </a:fld>
+            <a:endParaRPr lang="en-MY"/>
+          </a:p>
+        </p:txBody>
+      </p:sp>
+      <p:sp>
+        <p:nvSpPr>
+          <p:cNvPr id="5" name="TextBox 4"/>
+          <p:cNvSpPr txBox="1"/>
+          <p:nvPr/>
+        </p:nvSpPr>
+        <p:spPr>
+          <a:xfrm>
+            <a:off x="3429000" y="5760351"/>
+            <a:ext cx="2362200" cy="246221"/>
+          </a:xfrm>
+          <a:prstGeom prst="rect">
+            <a:avLst/>
+          </a:prstGeom>
+          <a:noFill/>
+        </p:spPr>
+        <p:txBody>
+          <a:bodyPr wrap="square" rtlCol="0">
+            <a:spAutoFit/>
+          </a:bodyPr>
+          <a:lstStyle/>
+          <a:p>
+            <a:r>
+              <a:rPr lang="en-US" sz="1000" dirty="0" smtClean="0"/>
+              <a:t>Price of an option just about to expire</a:t>
+            </a:r>
+            <a:endParaRPr lang="en-US" sz="1000" dirty="0"/>
+          </a:p>
+        </p:txBody>
+      </p:sp>
+      <p:sp>
+        <p:nvSpPr>
+          <p:cNvPr id="7" name="TextBox 6"/>
+          <p:cNvSpPr txBox="1"/>
+          <p:nvPr/>
+        </p:nvSpPr>
+        <p:spPr>
+          <a:xfrm>
+            <a:off x="2133600" y="5943600"/>
+            <a:ext cx="4724400" cy="230832"/>
+          </a:xfrm>
+          <a:prstGeom prst="rect">
+            <a:avLst/>
+          </a:prstGeom>
+          <a:noFill/>
+        </p:spPr>
+        <p:txBody>
+          <a:bodyPr wrap="square" rtlCol="0">
+            <a:spAutoFit/>
+          </a:bodyPr>
+          <a:lstStyle/>
+          <a:p>
+            <a:r>
+              <a:rPr lang="en-US" sz="900" dirty="0"/>
+              <a:t>Source</a:t>
+            </a:r>
+            <a:r>
+              <a:rPr lang="en-US" sz="900" dirty="0"/>
+              <a:t>: http://bit.ly/12xfS1C</a:t>
+            </a:r>
+            <a:endParaRPr lang="en-US" sz="900" dirty="0"/>
+          </a:p>
+        </p:txBody>
+      </p:sp>
     </p:spTree>
     <p:extLst>
       <p:ext uri="{BB962C8B-B14F-4D97-AF65-F5344CB8AC3E}">
@@ -44408,7 +46184,12 @@
             <p:ph type="title"/>
           </p:nvPr>
         </p:nvSpPr>
-        <p:spPr/>
+        <p:spPr>
+          <a:xfrm>
+            <a:off x="551280" y="436563"/>
+            <a:ext cx="8041440" cy="935037"/>
+          </a:xfrm>
+        </p:spPr>
         <p:txBody>
           <a:bodyPr/>
           <a:lstStyle/>
@@ -44421,9 +46202,89 @@
           </a:p>
         </p:txBody>
       </p:sp>
+      <p:sp>
+        <p:nvSpPr>
+          <p:cNvPr id="3" name="Footer Placeholder 2"/>
+          <p:cNvSpPr>
+            <a:spLocks noGrp="1"/>
+          </p:cNvSpPr>
+          <p:nvPr>
+            <p:ph type="ftr" sz="quarter" idx="11"/>
+          </p:nvPr>
+        </p:nvSpPr>
+        <p:spPr/>
+        <p:txBody>
+          <a:bodyPr/>
+          <a:lstStyle/>
+          <a:p>
+            <a:r>
+              <a:rPr lang="en-MY" smtClean="0"/>
+              <a:t>Copyright (c) 2013 Chetan Gadgil</a:t>
+            </a:r>
+            <a:endParaRPr lang="en-MY"/>
+          </a:p>
+        </p:txBody>
+      </p:sp>
+      <p:sp>
+        <p:nvSpPr>
+          <p:cNvPr id="4" name="Slide Number Placeholder 3"/>
+          <p:cNvSpPr>
+            <a:spLocks noGrp="1"/>
+          </p:cNvSpPr>
+          <p:nvPr>
+            <p:ph type="sldNum" sz="quarter" idx="12"/>
+          </p:nvPr>
+        </p:nvSpPr>
+        <p:spPr/>
+        <p:txBody>
+          <a:bodyPr/>
+          <a:lstStyle/>
+          <a:p>
+            <a:fld id="{CB67D5E6-BE40-49DF-9411-62F59E255471}" type="slidenum">
+              <a:rPr lang="en-MY" smtClean="0"/>
+              <a:pPr/>
+              <a:t>3</a:t>
+            </a:fld>
+            <a:endParaRPr lang="en-MY"/>
+          </a:p>
+        </p:txBody>
+      </p:sp>
+      <p:sp>
+        <p:nvSpPr>
+          <p:cNvPr id="5" name="TextBox 4"/>
+          <p:cNvSpPr txBox="1"/>
+          <p:nvPr/>
+        </p:nvSpPr>
+        <p:spPr>
+          <a:xfrm>
+            <a:off x="1851804" y="5706424"/>
+            <a:ext cx="5638800" cy="307777"/>
+          </a:xfrm>
+          <a:prstGeom prst="rect">
+            <a:avLst/>
+          </a:prstGeom>
+          <a:noFill/>
+        </p:spPr>
+        <p:txBody>
+          <a:bodyPr wrap="square" rtlCol="0">
+            <a:spAutoFit/>
+          </a:bodyPr>
+          <a:lstStyle/>
+          <a:p>
+            <a:r>
+              <a:rPr lang="en-US" sz="1400" dirty="0" smtClean="0"/>
+              <a:t>Black &amp; Scholes Formula. Source</a:t>
+            </a:r>
+            <a:r>
+              <a:rPr lang="en-US" sz="1400" dirty="0"/>
+              <a:t>: http://bit.ly/13pHQZP</a:t>
+            </a:r>
+          </a:p>
+        </p:txBody>
+      </p:sp>
       <p:pic>
         <p:nvPicPr>
-          <p:cNvPr id="3074" name="Picture 2"/>
+          <p:cNvPr id="1031" name="Picture 7"/>
           <p:cNvPicPr>
             <a:picLocks noChangeAspect="1" noChangeArrowheads="1"/>
           </p:cNvPicPr>
@@ -44444,8 +46305,8 @@
         </p:blipFill>
         <p:spPr bwMode="auto">
           <a:xfrm>
-            <a:off x="1143000" y="1676400"/>
-            <a:ext cx="6629400" cy="4364962"/>
+            <a:off x="1129605" y="1447800"/>
+            <a:ext cx="6757095" cy="4258624"/>
           </a:xfrm>
           <a:prstGeom prst="rect">
             <a:avLst/>
@@ -44547,7 +46408,7 @@
                   </a:outerShdw>
                 </a:effectLst>
               </a:rPr>
-              <a:t>Decisions, Decisions…</a:t>
+              <a:t>“Choice. The problem is choice”.</a:t>
             </a:r>
             <a:endParaRPr lang="en-US" dirty="0">
               <a:effectLst>
@@ -44683,16 +46544,63 @@
           </a:p>
         </p:txBody>
       </p:sp>
+      <p:sp>
+        <p:nvSpPr>
+          <p:cNvPr id="3" name="Footer Placeholder 2"/>
+          <p:cNvSpPr>
+            <a:spLocks noGrp="1"/>
+          </p:cNvSpPr>
+          <p:nvPr>
+            <p:ph type="ftr" sz="quarter" idx="11"/>
+          </p:nvPr>
+        </p:nvSpPr>
+        <p:spPr/>
+        <p:txBody>
+          <a:bodyPr/>
+          <a:lstStyle/>
+          <a:p>
+            <a:r>
+              <a:rPr lang="en-MY" smtClean="0"/>
+              <a:t>Copyright (c) 2013 Chetan Gadgil</a:t>
+            </a:r>
+            <a:endParaRPr lang="en-MY"/>
+          </a:p>
+        </p:txBody>
+      </p:sp>
+      <p:sp>
+        <p:nvSpPr>
+          <p:cNvPr id="4" name="Slide Number Placeholder 3"/>
+          <p:cNvSpPr>
+            <a:spLocks noGrp="1"/>
+          </p:cNvSpPr>
+          <p:nvPr>
+            <p:ph type="sldNum" sz="quarter" idx="12"/>
+          </p:nvPr>
+        </p:nvSpPr>
+        <p:spPr/>
+        <p:txBody>
+          <a:bodyPr/>
+          <a:lstStyle/>
+          <a:p>
+            <a:fld id="{CB67D5E6-BE40-49DF-9411-62F59E255471}" type="slidenum">
+              <a:rPr lang="en-MY" smtClean="0"/>
+              <a:pPr/>
+              <a:t>4</a:t>
+            </a:fld>
+            <a:endParaRPr lang="en-MY"/>
+          </a:p>
+        </p:txBody>
+      </p:sp>
     </p:spTree>
   </p:cSld>
   <p:clrMapOvr>
     <a:masterClrMapping/>
   </p:clrMapOvr>
-  <mc:AlternateContent xmlns:mc="http://schemas.openxmlformats.org/markup-compatibility/2006">
-    <mc:Choice xmlns:p14="http://schemas.microsoft.com/office/powerpoint/2010/main" Requires="p14">
+  <mc:AlternateContent xmlns:mc="http://schemas.openxmlformats.org/markup-compatibility/2006" xmlns:p14="http://schemas.microsoft.com/office/powerpoint/2010/main">
+    <mc:Choice Requires="p14">
       <p:transition spd="slow" p14:dur="2000"/>
     </mc:Choice>
-    <mc:Fallback>
+    <mc:Fallback xmlns="">
       <p:transition spd="slow"/>
     </mc:Fallback>
   </mc:AlternateContent>
@@ -44787,16 +46695,63 @@
           </a:graphicData>
         </a:graphic>
       </p:graphicFrame>
+      <p:sp>
+        <p:nvSpPr>
+          <p:cNvPr id="3" name="Footer Placeholder 2"/>
+          <p:cNvSpPr>
+            <a:spLocks noGrp="1"/>
+          </p:cNvSpPr>
+          <p:nvPr>
+            <p:ph type="ftr" sz="quarter" idx="11"/>
+          </p:nvPr>
+        </p:nvSpPr>
+        <p:spPr/>
+        <p:txBody>
+          <a:bodyPr/>
+          <a:lstStyle/>
+          <a:p>
+            <a:r>
+              <a:rPr lang="en-MY" smtClean="0"/>
+              <a:t>Copyright (c) 2013 Chetan Gadgil</a:t>
+            </a:r>
+            <a:endParaRPr lang="en-MY"/>
+          </a:p>
+        </p:txBody>
+      </p:sp>
+      <p:sp>
+        <p:nvSpPr>
+          <p:cNvPr id="5" name="Slide Number Placeholder 4"/>
+          <p:cNvSpPr>
+            <a:spLocks noGrp="1"/>
+          </p:cNvSpPr>
+          <p:nvPr>
+            <p:ph type="sldNum" sz="quarter" idx="12"/>
+          </p:nvPr>
+        </p:nvSpPr>
+        <p:spPr/>
+        <p:txBody>
+          <a:bodyPr/>
+          <a:lstStyle/>
+          <a:p>
+            <a:fld id="{CB67D5E6-BE40-49DF-9411-62F59E255471}" type="slidenum">
+              <a:rPr lang="en-MY" smtClean="0"/>
+              <a:pPr/>
+              <a:t>5</a:t>
+            </a:fld>
+            <a:endParaRPr lang="en-MY"/>
+          </a:p>
+        </p:txBody>
+      </p:sp>
     </p:spTree>
   </p:cSld>
   <p:clrMapOvr>
     <a:masterClrMapping/>
   </p:clrMapOvr>
-  <mc:AlternateContent xmlns:mc="http://schemas.openxmlformats.org/markup-compatibility/2006">
-    <mc:Choice xmlns:p14="http://schemas.microsoft.com/office/powerpoint/2010/main" Requires="p14">
+  <mc:AlternateContent xmlns:mc="http://schemas.openxmlformats.org/markup-compatibility/2006" xmlns:p14="http://schemas.microsoft.com/office/powerpoint/2010/main">
+    <mc:Choice Requires="p14">
       <p:transition spd="slow" p14:dur="2000"/>
     </mc:Choice>
-    <mc:Fallback>
+    <mc:Fallback xmlns="">
       <p:transition spd="slow"/>
     </mc:Fallback>
   </mc:AlternateContent>
@@ -44852,19 +46807,7 @@
                   </a:outerShdw>
                 </a:effectLst>
               </a:rPr>
-              <a:t>Open Options </a:t>
-            </a:r>
-            <a:r>
-              <a:rPr lang="en-US" dirty="0" smtClean="0">
-                <a:effectLst>
-                  <a:outerShdw blurRad="38100" dist="38100" dir="2700000" algn="tl">
-                    <a:srgbClr val="000000">
-                      <a:alpha val="43137"/>
-                    </a:srgbClr>
-                  </a:outerShdw>
-                </a:effectLst>
-              </a:rPr>
-              <a:t>Overview</a:t>
+              <a:t>Open Options Overview</a:t>
             </a:r>
             <a:endParaRPr lang="en-US" dirty="0">
               <a:effectLst>
@@ -44903,16 +46846,63 @@
           </a:graphicData>
         </a:graphic>
       </p:graphicFrame>
+      <p:sp>
+        <p:nvSpPr>
+          <p:cNvPr id="3" name="Footer Placeholder 2"/>
+          <p:cNvSpPr>
+            <a:spLocks noGrp="1"/>
+          </p:cNvSpPr>
+          <p:nvPr>
+            <p:ph type="ftr" sz="quarter" idx="11"/>
+          </p:nvPr>
+        </p:nvSpPr>
+        <p:spPr/>
+        <p:txBody>
+          <a:bodyPr/>
+          <a:lstStyle/>
+          <a:p>
+            <a:r>
+              <a:rPr lang="en-MY" smtClean="0"/>
+              <a:t>Copyright (c) 2013 Chetan Gadgil</a:t>
+            </a:r>
+            <a:endParaRPr lang="en-MY"/>
+          </a:p>
+        </p:txBody>
+      </p:sp>
+      <p:sp>
+        <p:nvSpPr>
+          <p:cNvPr id="4" name="Slide Number Placeholder 3"/>
+          <p:cNvSpPr>
+            <a:spLocks noGrp="1"/>
+          </p:cNvSpPr>
+          <p:nvPr>
+            <p:ph type="sldNum" sz="quarter" idx="12"/>
+          </p:nvPr>
+        </p:nvSpPr>
+        <p:spPr/>
+        <p:txBody>
+          <a:bodyPr/>
+          <a:lstStyle/>
+          <a:p>
+            <a:fld id="{CB67D5E6-BE40-49DF-9411-62F59E255471}" type="slidenum">
+              <a:rPr lang="en-MY" smtClean="0"/>
+              <a:pPr/>
+              <a:t>6</a:t>
+            </a:fld>
+            <a:endParaRPr lang="en-MY"/>
+          </a:p>
+        </p:txBody>
+      </p:sp>
     </p:spTree>
   </p:cSld>
   <p:clrMapOvr>
     <a:masterClrMapping/>
   </p:clrMapOvr>
-  <mc:AlternateContent xmlns:mc="http://schemas.openxmlformats.org/markup-compatibility/2006">
-    <mc:Choice xmlns:p14="http://schemas.microsoft.com/office/powerpoint/2010/main" Requires="p14">
+  <mc:AlternateContent xmlns:mc="http://schemas.openxmlformats.org/markup-compatibility/2006" xmlns:p14="http://schemas.microsoft.com/office/powerpoint/2010/main">
+    <mc:Choice Requires="p14">
       <p:transition spd="slow" p14:dur="2000"/>
     </mc:Choice>
-    <mc:Fallback>
+    <mc:Fallback xmlns="">
       <p:transition spd="slow"/>
     </mc:Fallback>
   </mc:AlternateContent>
@@ -44951,7 +46941,7 @@
         </p:nvSpPr>
         <p:spPr>
           <a:xfrm>
-            <a:off x="5285834" y="4283145"/>
+            <a:off x="5285834" y="4054545"/>
             <a:ext cx="1582948" cy="822507"/>
           </a:xfrm>
           <a:prstGeom prst="roundRect">
@@ -45028,7 +47018,7 @@
         </p:nvSpPr>
         <p:spPr>
           <a:xfrm>
-            <a:off x="609600" y="3440337"/>
+            <a:off x="609600" y="3211737"/>
             <a:ext cx="6629401" cy="260952"/>
           </a:xfrm>
           <a:prstGeom prst="roundRect">
@@ -45133,7 +47123,7 @@
         </p:nvSpPr>
         <p:spPr>
           <a:xfrm rot="16200000">
-            <a:off x="597298" y="3950097"/>
+            <a:off x="597298" y="3721497"/>
             <a:ext cx="1091404" cy="304800"/>
           </a:xfrm>
           <a:prstGeom prst="roundRect">
@@ -45175,7 +47165,7 @@
         </p:nvSpPr>
         <p:spPr>
           <a:xfrm rot="16200000">
-            <a:off x="1367564" y="3966272"/>
+            <a:off x="1367564" y="3737672"/>
             <a:ext cx="1076308" cy="287546"/>
           </a:xfrm>
           <a:prstGeom prst="roundRect">
@@ -45217,7 +47207,7 @@
         </p:nvSpPr>
         <p:spPr>
           <a:xfrm rot="16200000">
-            <a:off x="2192465" y="3955129"/>
+            <a:off x="2192465" y="3726529"/>
             <a:ext cx="1091405" cy="294736"/>
           </a:xfrm>
           <a:prstGeom prst="roundRect">
@@ -45259,7 +47249,7 @@
         </p:nvSpPr>
         <p:spPr>
           <a:xfrm>
-            <a:off x="3673132" y="4284915"/>
+            <a:off x="3673132" y="4056315"/>
             <a:ext cx="1245959" cy="866549"/>
           </a:xfrm>
           <a:prstGeom prst="roundRect">
@@ -45336,7 +47326,7 @@
         </p:nvSpPr>
         <p:spPr>
           <a:xfrm>
-            <a:off x="6312738" y="4666934"/>
+            <a:off x="6312738" y="4438334"/>
             <a:ext cx="419100" cy="304800"/>
           </a:xfrm>
           <a:prstGeom prst="flowChartMagneticDisk">
@@ -45380,7 +47370,7 @@
         </p:nvSpPr>
         <p:spPr>
           <a:xfrm>
-            <a:off x="5461957" y="4667340"/>
+            <a:off x="5461957" y="4438740"/>
             <a:ext cx="419100" cy="304800"/>
           </a:xfrm>
           <a:prstGeom prst="flowChartMagneticDisk">
@@ -45424,7 +47414,7 @@
         </p:nvSpPr>
         <p:spPr>
           <a:xfrm>
-            <a:off x="592346" y="2057400"/>
+            <a:off x="592346" y="1981200"/>
             <a:ext cx="8170654" cy="242258"/>
           </a:xfrm>
           <a:prstGeom prst="roundRect">
@@ -45516,7 +47506,7 @@
         </p:blipFill>
         <p:spPr bwMode="auto">
           <a:xfrm>
-            <a:off x="862562" y="4694398"/>
+            <a:off x="862562" y="4465798"/>
             <a:ext cx="560874" cy="373916"/>
           </a:xfrm>
           <a:prstGeom prst="rect">
@@ -45557,7 +47547,7 @@
         </p:blipFill>
         <p:spPr bwMode="auto">
           <a:xfrm>
-            <a:off x="1626515" y="4714629"/>
+            <a:off x="1626515" y="4486029"/>
             <a:ext cx="638573" cy="518003"/>
           </a:xfrm>
           <a:prstGeom prst="rect">
@@ -45598,7 +47588,7 @@
         </p:blipFill>
         <p:spPr bwMode="auto">
           <a:xfrm>
-            <a:off x="2524959" y="4667340"/>
+            <a:off x="2524959" y="4438740"/>
             <a:ext cx="426415" cy="484124"/>
           </a:xfrm>
           <a:prstGeom prst="rect">
@@ -45624,7 +47614,7 @@
         </p:nvSpPr>
         <p:spPr>
           <a:xfrm>
-            <a:off x="4211325" y="3749058"/>
+            <a:off x="4211325" y="3520458"/>
             <a:ext cx="163573" cy="514287"/>
           </a:xfrm>
           <a:prstGeom prst="upDownArrow">
@@ -45664,7 +47654,7 @@
         </p:nvSpPr>
         <p:spPr>
           <a:xfrm>
-            <a:off x="5954382" y="3749058"/>
+            <a:off x="5954382" y="3520458"/>
             <a:ext cx="245853" cy="501513"/>
           </a:xfrm>
           <a:prstGeom prst="upDownArrow">
@@ -45704,8 +47694,8 @@
         </p:nvSpPr>
         <p:spPr>
           <a:xfrm>
-            <a:off x="609601" y="2667000"/>
-            <a:ext cx="6629400" cy="330199"/>
+            <a:off x="609601" y="2493458"/>
+            <a:ext cx="6629400" cy="275141"/>
           </a:xfrm>
           <a:prstGeom prst="roundRect">
             <a:avLst/>
@@ -45981,7 +47971,7 @@
         </p:nvSpPr>
         <p:spPr>
           <a:xfrm>
-            <a:off x="743129" y="2895599"/>
+            <a:off x="743129" y="2666999"/>
             <a:ext cx="799739" cy="220133"/>
           </a:xfrm>
           <a:prstGeom prst="roundRect">
@@ -46023,7 +48013,7 @@
         </p:nvSpPr>
         <p:spPr>
           <a:xfrm>
-            <a:off x="1649621" y="2895599"/>
+            <a:off x="1649621" y="2666999"/>
             <a:ext cx="799739" cy="220133"/>
           </a:xfrm>
           <a:prstGeom prst="roundRect">
@@ -46189,8 +48179,8 @@
         </p:nvSpPr>
         <p:spPr>
           <a:xfrm>
-            <a:off x="4479464" y="2299657"/>
-            <a:ext cx="199127" cy="359858"/>
+            <a:off x="4479464" y="2223458"/>
+            <a:ext cx="152889" cy="270000"/>
           </a:xfrm>
           <a:prstGeom prst="upDownArrow">
             <a:avLst/>
@@ -46229,7 +48219,7 @@
         </p:nvSpPr>
         <p:spPr>
           <a:xfrm>
-            <a:off x="3822616" y="2997199"/>
+            <a:off x="3822616" y="2768599"/>
             <a:ext cx="215984" cy="443138"/>
           </a:xfrm>
           <a:prstGeom prst="upDownArrow">
@@ -46353,7 +48343,7 @@
         </p:nvSpPr>
         <p:spPr>
           <a:xfrm>
-            <a:off x="4966319" y="2905392"/>
+            <a:off x="4966319" y="2676792"/>
             <a:ext cx="799739" cy="220133"/>
           </a:xfrm>
           <a:prstGeom prst="roundRect">
@@ -46456,7 +48446,7 @@
         </p:nvSpPr>
         <p:spPr>
           <a:xfrm>
-            <a:off x="3751918" y="4584331"/>
+            <a:off x="3751918" y="4355731"/>
             <a:ext cx="1088385" cy="220133"/>
           </a:xfrm>
           <a:prstGeom prst="roundRect">
@@ -46498,7 +48488,7 @@
         </p:nvSpPr>
         <p:spPr>
           <a:xfrm>
-            <a:off x="3751918" y="4848181"/>
+            <a:off x="3751918" y="4619581"/>
             <a:ext cx="1088385" cy="220133"/>
           </a:xfrm>
           <a:prstGeom prst="roundRect">
@@ -46540,7 +48530,7 @@
         </p:nvSpPr>
         <p:spPr>
           <a:xfrm>
-            <a:off x="507914" y="5301648"/>
+            <a:off x="507914" y="5073048"/>
             <a:ext cx="6731087" cy="260952"/>
           </a:xfrm>
           <a:prstGeom prst="roundRect">
@@ -46617,7 +48607,7 @@
         </p:nvSpPr>
         <p:spPr>
           <a:xfrm>
-            <a:off x="919887" y="5907657"/>
+            <a:off x="919887" y="5679057"/>
             <a:ext cx="842057" cy="485549"/>
           </a:xfrm>
           <a:prstGeom prst="roundRect">
@@ -46681,7 +48671,7 @@
         </p:nvSpPr>
         <p:spPr>
           <a:xfrm>
-            <a:off x="1259863" y="5567550"/>
+            <a:off x="1259863" y="5338950"/>
             <a:ext cx="139009" cy="340107"/>
           </a:xfrm>
           <a:prstGeom prst="upDownArrow">
@@ -46723,7 +48713,7 @@
         </p:nvSpPr>
         <p:spPr>
           <a:xfrm>
-            <a:off x="1873985" y="5907657"/>
+            <a:off x="1873985" y="5679057"/>
             <a:ext cx="842057" cy="485549"/>
           </a:xfrm>
           <a:prstGeom prst="roundRect">
@@ -46787,7 +48777,7 @@
         </p:nvSpPr>
         <p:spPr>
           <a:xfrm>
-            <a:off x="2213961" y="5567550"/>
+            <a:off x="2213961" y="5338950"/>
             <a:ext cx="139009" cy="340107"/>
           </a:xfrm>
           <a:prstGeom prst="upDownArrow">
@@ -46829,7 +48819,7 @@
         </p:nvSpPr>
         <p:spPr>
           <a:xfrm>
-            <a:off x="2826042" y="5907657"/>
+            <a:off x="2826042" y="5679057"/>
             <a:ext cx="842057" cy="485549"/>
           </a:xfrm>
           <a:prstGeom prst="roundRect">
@@ -46893,7 +48883,7 @@
         </p:nvSpPr>
         <p:spPr>
           <a:xfrm>
-            <a:off x="3166018" y="5567550"/>
+            <a:off x="3166018" y="5338950"/>
             <a:ext cx="139009" cy="340107"/>
           </a:xfrm>
           <a:prstGeom prst="upDownArrow">
@@ -46935,7 +48925,7 @@
         </p:nvSpPr>
         <p:spPr>
           <a:xfrm>
-            <a:off x="3790296" y="5907657"/>
+            <a:off x="3790296" y="5679057"/>
             <a:ext cx="842057" cy="485549"/>
           </a:xfrm>
           <a:prstGeom prst="roundRect">
@@ -46999,7 +48989,7 @@
         </p:nvSpPr>
         <p:spPr>
           <a:xfrm>
-            <a:off x="4130272" y="5567550"/>
+            <a:off x="4130272" y="5338950"/>
             <a:ext cx="139009" cy="340107"/>
           </a:xfrm>
           <a:prstGeom prst="upDownArrow">
@@ -47067,7 +49057,53 @@
               <a:rPr lang="en-US" sz="1000" dirty="0"/>
               <a:t>or registered trademarks are the property of their respective owners.</a:t>
             </a:r>
-            <a:endParaRPr lang="en-US" sz="1000" dirty="0"/>
+          </a:p>
+        </p:txBody>
+      </p:sp>
+      <p:sp>
+        <p:nvSpPr>
+          <p:cNvPr id="3" name="Footer Placeholder 2"/>
+          <p:cNvSpPr>
+            <a:spLocks noGrp="1"/>
+          </p:cNvSpPr>
+          <p:nvPr>
+            <p:ph type="ftr" sz="quarter" idx="11"/>
+          </p:nvPr>
+        </p:nvSpPr>
+        <p:spPr/>
+        <p:txBody>
+          <a:bodyPr/>
+          <a:lstStyle/>
+          <a:p>
+            <a:r>
+              <a:rPr lang="en-MY" smtClean="0"/>
+              <a:t>Copyright (c) 2013 Chetan Gadgil</a:t>
+            </a:r>
+            <a:endParaRPr lang="en-MY"/>
+          </a:p>
+        </p:txBody>
+      </p:sp>
+      <p:sp>
+        <p:nvSpPr>
+          <p:cNvPr id="4" name="Slide Number Placeholder 3"/>
+          <p:cNvSpPr>
+            <a:spLocks noGrp="1"/>
+          </p:cNvSpPr>
+          <p:nvPr>
+            <p:ph type="sldNum" sz="quarter" idx="12"/>
+          </p:nvPr>
+        </p:nvSpPr>
+        <p:spPr/>
+        <p:txBody>
+          <a:bodyPr/>
+          <a:lstStyle/>
+          <a:p>
+            <a:fld id="{CB67D5E6-BE40-49DF-9411-62F59E255471}" type="slidenum">
+              <a:rPr lang="en-MY" smtClean="0"/>
+              <a:pPr/>
+              <a:t>7</a:t>
+            </a:fld>
+            <a:endParaRPr lang="en-MY"/>
           </a:p>
         </p:txBody>
       </p:sp>
@@ -47076,11 +49112,11 @@
   <p:clrMapOvr>
     <a:masterClrMapping/>
   </p:clrMapOvr>
-  <mc:AlternateContent xmlns:mc="http://schemas.openxmlformats.org/markup-compatibility/2006">
-    <mc:Choice xmlns:p14="http://schemas.microsoft.com/office/powerpoint/2010/main" Requires="p14">
+  <mc:AlternateContent xmlns:mc="http://schemas.openxmlformats.org/markup-compatibility/2006" xmlns:p14="http://schemas.microsoft.com/office/powerpoint/2010/main">
+    <mc:Choice Requires="p14">
       <p:transition spd="slow" p14:dur="2000"/>
     </mc:Choice>
-    <mc:Fallback>
+    <mc:Fallback xmlns="">
       <p:transition spd="slow"/>
     </mc:Fallback>
   </mc:AlternateContent>
@@ -47113,7 +49149,7 @@
       </p:grpSpPr>
       <p:sp>
         <p:nvSpPr>
-          <p:cNvPr id="2" name="Rectangle 2"/>
+          <p:cNvPr id="2" name="Title 1"/>
           <p:cNvSpPr>
             <a:spLocks noGrp="1"/>
           </p:cNvSpPr>
@@ -47121,64 +49157,830 @@
             <p:ph type="title"/>
           </p:nvPr>
         </p:nvSpPr>
+        <p:spPr>
+          <a:xfrm>
+            <a:off x="551280" y="436563"/>
+            <a:ext cx="8041440" cy="1163637"/>
+          </a:xfrm>
+        </p:spPr>
+        <p:txBody>
+          <a:bodyPr/>
+          <a:lstStyle/>
+          <a:p>
+            <a:r>
+              <a:rPr lang="en-US" dirty="0" smtClean="0"/>
+              <a:t>Technology Details</a:t>
+            </a:r>
+            <a:endParaRPr lang="en-US" dirty="0"/>
+          </a:p>
+        </p:txBody>
+      </p:sp>
+      <p:sp>
+        <p:nvSpPr>
+          <p:cNvPr id="4" name="Footer Placeholder 3"/>
+          <p:cNvSpPr>
+            <a:spLocks noGrp="1"/>
+          </p:cNvSpPr>
+          <p:nvPr>
+            <p:ph type="ftr" sz="quarter" idx="11"/>
+          </p:nvPr>
+        </p:nvSpPr>
         <p:spPr/>
         <p:txBody>
           <a:bodyPr/>
           <a:lstStyle/>
           <a:p>
             <a:r>
+              <a:rPr lang="en-MY" smtClean="0"/>
+              <a:t>Copyright (c) 2013 Chetan Gadgil</a:t>
+            </a:r>
+            <a:endParaRPr lang="en-MY"/>
+          </a:p>
+        </p:txBody>
+      </p:sp>
+      <p:sp>
+        <p:nvSpPr>
+          <p:cNvPr id="5" name="Slide Number Placeholder 4"/>
+          <p:cNvSpPr>
+            <a:spLocks noGrp="1"/>
+          </p:cNvSpPr>
+          <p:nvPr>
+            <p:ph type="sldNum" sz="quarter" idx="12"/>
+          </p:nvPr>
+        </p:nvSpPr>
+        <p:spPr/>
+        <p:txBody>
+          <a:bodyPr/>
+          <a:lstStyle/>
+          <a:p>
+            <a:fld id="{CB67D5E6-BE40-49DF-9411-62F59E255471}" type="slidenum">
+              <a:rPr lang="en-MY" smtClean="0"/>
+              <a:pPr/>
+              <a:t>8</a:t>
+            </a:fld>
+            <a:endParaRPr lang="en-MY"/>
+          </a:p>
+        </p:txBody>
+      </p:sp>
+      <p:sp>
+        <p:nvSpPr>
+          <p:cNvPr id="6" name="Rounded Rectangle 5"/>
+          <p:cNvSpPr/>
+          <p:nvPr/>
+        </p:nvSpPr>
+        <p:spPr>
+          <a:xfrm>
+            <a:off x="762000" y="3810000"/>
+            <a:ext cx="7620000" cy="437072"/>
+          </a:xfrm>
+          <a:prstGeom prst="roundRect">
+            <a:avLst/>
+          </a:prstGeom>
+        </p:spPr>
+        <p:style>
+          <a:lnRef idx="2">
+            <a:schemeClr val="accent1">
+              <a:shade val="50000"/>
+            </a:schemeClr>
+          </a:lnRef>
+          <a:fillRef idx="1">
+            <a:schemeClr val="accent1"/>
+          </a:fillRef>
+          <a:effectRef idx="0">
+            <a:schemeClr val="accent1"/>
+          </a:effectRef>
+          <a:fontRef idx="minor">
+            <a:schemeClr val="lt1"/>
+          </a:fontRef>
+        </p:style>
+        <p:txBody>
+          <a:bodyPr rtlCol="0" anchor="ctr"/>
+          <a:lstStyle/>
+          <a:p>
+            <a:pPr algn="ctr"/>
+            <a:r>
               <a:rPr lang="en-US" dirty="0" smtClean="0"/>
-              <a:t>Roadmap</a:t>
+              <a:t>Apache Camel</a:t>
             </a:r>
             <a:endParaRPr lang="en-US" dirty="0"/>
           </a:p>
         </p:txBody>
       </p:sp>
-      <p:graphicFrame>
-        <p:nvGraphicFramePr>
-          <p:cNvPr id="4" name="Diagram 4"/>
-          <p:cNvGraphicFramePr>
-            <a:graphicFrameLocks noGrp="1"/>
-          </p:cNvGraphicFramePr>
-          <p:nvPr>
-            <p:ph idx="1"/>
-            <p:extLst>
-              <p:ext uri="{D42A27DB-BD31-4B8C-83A1-F6EECF244321}">
-                <p14:modId xmlns:p14="http://schemas.microsoft.com/office/powerpoint/2010/main" val="2343697102"/>
-              </p:ext>
-            </p:extLst>
-          </p:nvPr>
-        </p:nvGraphicFramePr>
-        <p:xfrm>
-          <a:off x="838200" y="2038350"/>
-          <a:ext cx="7467600" cy="3951288"/>
-        </p:xfrm>
-        <a:graphic>
-          <a:graphicData uri="http://schemas.openxmlformats.org/drawingml/2006/diagram">
-            <dgm:relIds xmlns:dgm="http://schemas.openxmlformats.org/drawingml/2006/diagram" xmlns:r="http://schemas.openxmlformats.org/officeDocument/2006/relationships" r:dm="rId3" r:lo="rId4" r:qs="rId5" r:cs="rId6"/>
-          </a:graphicData>
-        </a:graphic>
-      </p:graphicFrame>
+      <p:sp>
+        <p:nvSpPr>
+          <p:cNvPr id="7" name="Rounded Rectangle 6"/>
+          <p:cNvSpPr/>
+          <p:nvPr/>
+        </p:nvSpPr>
+        <p:spPr>
+          <a:xfrm>
+            <a:off x="1135811" y="4114800"/>
+            <a:ext cx="762000" cy="533400"/>
+          </a:xfrm>
+          <a:prstGeom prst="roundRect">
+            <a:avLst/>
+          </a:prstGeom>
+          <a:solidFill>
+            <a:schemeClr val="accent5">
+              <a:lumMod val="50000"/>
+            </a:schemeClr>
+          </a:solidFill>
+        </p:spPr>
+        <p:style>
+          <a:lnRef idx="2">
+            <a:schemeClr val="accent1">
+              <a:shade val="50000"/>
+            </a:schemeClr>
+          </a:lnRef>
+          <a:fillRef idx="1">
+            <a:schemeClr val="accent1"/>
+          </a:fillRef>
+          <a:effectRef idx="0">
+            <a:schemeClr val="accent1"/>
+          </a:effectRef>
+          <a:fontRef idx="minor">
+            <a:schemeClr val="lt1"/>
+          </a:fontRef>
+        </p:style>
+        <p:txBody>
+          <a:bodyPr rtlCol="0" anchor="ctr"/>
+          <a:lstStyle/>
+          <a:p>
+            <a:pPr algn="ctr"/>
+            <a:r>
+              <a:rPr lang="en-US" sz="900" dirty="0" smtClean="0"/>
+              <a:t>Commons HTTP</a:t>
+            </a:r>
+            <a:endParaRPr lang="en-US" sz="900" dirty="0"/>
+          </a:p>
+        </p:txBody>
+      </p:sp>
+      <p:sp>
+        <p:nvSpPr>
+          <p:cNvPr id="8" name="Rounded Rectangle 7"/>
+          <p:cNvSpPr/>
+          <p:nvPr/>
+        </p:nvSpPr>
+        <p:spPr>
+          <a:xfrm>
+            <a:off x="2050211" y="4114800"/>
+            <a:ext cx="762000" cy="533400"/>
+          </a:xfrm>
+          <a:prstGeom prst="roundRect">
+            <a:avLst/>
+          </a:prstGeom>
+          <a:solidFill>
+            <a:schemeClr val="accent5">
+              <a:lumMod val="50000"/>
+            </a:schemeClr>
+          </a:solidFill>
+        </p:spPr>
+        <p:style>
+          <a:lnRef idx="2">
+            <a:schemeClr val="accent1">
+              <a:shade val="50000"/>
+            </a:schemeClr>
+          </a:lnRef>
+          <a:fillRef idx="1">
+            <a:schemeClr val="accent1"/>
+          </a:fillRef>
+          <a:effectRef idx="0">
+            <a:schemeClr val="accent1"/>
+          </a:effectRef>
+          <a:fontRef idx="minor">
+            <a:schemeClr val="lt1"/>
+          </a:fontRef>
+        </p:style>
+        <p:txBody>
+          <a:bodyPr rtlCol="0" anchor="ctr"/>
+          <a:lstStyle/>
+          <a:p>
+            <a:pPr algn="ctr"/>
+            <a:r>
+              <a:rPr lang="en-US" sz="900" dirty="0" smtClean="0"/>
+              <a:t>Apollo/</a:t>
+            </a:r>
+          </a:p>
+          <a:p>
+            <a:pPr algn="ctr"/>
+            <a:r>
+              <a:rPr lang="en-US" sz="900" dirty="0" smtClean="0"/>
+              <a:t>STOMP</a:t>
+            </a:r>
+            <a:endParaRPr lang="en-US" sz="900" dirty="0"/>
+          </a:p>
+        </p:txBody>
+      </p:sp>
+      <p:sp>
+        <p:nvSpPr>
+          <p:cNvPr id="9" name="Rounded Rectangle 8"/>
+          <p:cNvSpPr/>
+          <p:nvPr/>
+        </p:nvSpPr>
+        <p:spPr>
+          <a:xfrm>
+            <a:off x="2938731" y="4114800"/>
+            <a:ext cx="762000" cy="533400"/>
+          </a:xfrm>
+          <a:prstGeom prst="roundRect">
+            <a:avLst/>
+          </a:prstGeom>
+          <a:solidFill>
+            <a:schemeClr val="accent5">
+              <a:lumMod val="50000"/>
+            </a:schemeClr>
+          </a:solidFill>
+        </p:spPr>
+        <p:style>
+          <a:lnRef idx="2">
+            <a:schemeClr val="accent1">
+              <a:shade val="50000"/>
+            </a:schemeClr>
+          </a:lnRef>
+          <a:fillRef idx="1">
+            <a:schemeClr val="accent1"/>
+          </a:fillRef>
+          <a:effectRef idx="0">
+            <a:schemeClr val="accent1"/>
+          </a:effectRef>
+          <a:fontRef idx="minor">
+            <a:schemeClr val="lt1"/>
+          </a:fontRef>
+        </p:style>
+        <p:txBody>
+          <a:bodyPr rtlCol="0" anchor="ctr"/>
+          <a:lstStyle/>
+          <a:p>
+            <a:pPr algn="ctr"/>
+            <a:r>
+              <a:rPr lang="en-US" sz="900" dirty="0" smtClean="0"/>
+              <a:t>Apollo/</a:t>
+            </a:r>
+          </a:p>
+          <a:p>
+            <a:pPr algn="ctr"/>
+            <a:r>
+              <a:rPr lang="en-US" sz="900" dirty="0" smtClean="0"/>
+              <a:t>JMS</a:t>
+            </a:r>
+            <a:endParaRPr lang="en-US" sz="900" dirty="0"/>
+          </a:p>
+        </p:txBody>
+      </p:sp>
+      <p:sp>
+        <p:nvSpPr>
+          <p:cNvPr id="10" name="Rounded Rectangle 9"/>
+          <p:cNvSpPr/>
+          <p:nvPr/>
+        </p:nvSpPr>
+        <p:spPr>
+          <a:xfrm>
+            <a:off x="7391400" y="4114800"/>
+            <a:ext cx="762000" cy="533400"/>
+          </a:xfrm>
+          <a:prstGeom prst="roundRect">
+            <a:avLst/>
+          </a:prstGeom>
+          <a:solidFill>
+            <a:schemeClr val="accent5">
+              <a:lumMod val="50000"/>
+            </a:schemeClr>
+          </a:solidFill>
+        </p:spPr>
+        <p:style>
+          <a:lnRef idx="2">
+            <a:schemeClr val="accent1">
+              <a:shade val="50000"/>
+            </a:schemeClr>
+          </a:lnRef>
+          <a:fillRef idx="1">
+            <a:schemeClr val="accent1"/>
+          </a:fillRef>
+          <a:effectRef idx="0">
+            <a:schemeClr val="accent1"/>
+          </a:effectRef>
+          <a:fontRef idx="minor">
+            <a:schemeClr val="lt1"/>
+          </a:fontRef>
+        </p:style>
+        <p:txBody>
+          <a:bodyPr rtlCol="0" anchor="ctr"/>
+          <a:lstStyle/>
+          <a:p>
+            <a:pPr algn="ctr"/>
+            <a:r>
+              <a:rPr lang="en-US" sz="900" dirty="0" smtClean="0"/>
+              <a:t>Twitter</a:t>
+            </a:r>
+            <a:endParaRPr lang="en-US" sz="900" dirty="0"/>
+          </a:p>
+        </p:txBody>
+      </p:sp>
+      <p:sp>
+        <p:nvSpPr>
+          <p:cNvPr id="21" name="Rounded Rectangle 20"/>
+          <p:cNvSpPr/>
+          <p:nvPr/>
+        </p:nvSpPr>
+        <p:spPr>
+          <a:xfrm>
+            <a:off x="762000" y="4953000"/>
+            <a:ext cx="7620000" cy="437072"/>
+          </a:xfrm>
+          <a:prstGeom prst="roundRect">
+            <a:avLst/>
+          </a:prstGeom>
+        </p:spPr>
+        <p:style>
+          <a:lnRef idx="2">
+            <a:schemeClr val="accent1">
+              <a:shade val="50000"/>
+            </a:schemeClr>
+          </a:lnRef>
+          <a:fillRef idx="1">
+            <a:schemeClr val="accent1"/>
+          </a:fillRef>
+          <a:effectRef idx="0">
+            <a:schemeClr val="accent1"/>
+          </a:effectRef>
+          <a:fontRef idx="minor">
+            <a:schemeClr val="lt1"/>
+          </a:fontRef>
+        </p:style>
+        <p:txBody>
+          <a:bodyPr rtlCol="0" anchor="ctr"/>
+          <a:lstStyle/>
+          <a:p>
+            <a:pPr algn="ctr"/>
+            <a:r>
+              <a:rPr lang="en-US" dirty="0" err="1" smtClean="0"/>
+              <a:t>Scala</a:t>
+            </a:r>
+            <a:r>
+              <a:rPr lang="en-US" dirty="0" smtClean="0"/>
+              <a:t>/</a:t>
+            </a:r>
+            <a:r>
+              <a:rPr lang="en-US" dirty="0" err="1" smtClean="0"/>
+              <a:t>Akka</a:t>
+            </a:r>
+            <a:r>
+              <a:rPr lang="en-US" dirty="0" smtClean="0"/>
+              <a:t>/Slick/</a:t>
+            </a:r>
+            <a:r>
+              <a:rPr lang="en-US" dirty="0" err="1" smtClean="0"/>
+              <a:t>Anorm</a:t>
+            </a:r>
+            <a:endParaRPr lang="en-US" dirty="0"/>
+          </a:p>
+        </p:txBody>
+      </p:sp>
+      <p:sp>
+        <p:nvSpPr>
+          <p:cNvPr id="22" name="Rounded Rectangle 21"/>
+          <p:cNvSpPr/>
+          <p:nvPr/>
+        </p:nvSpPr>
+        <p:spPr>
+          <a:xfrm>
+            <a:off x="1262332" y="5562600"/>
+            <a:ext cx="762000" cy="304800"/>
+          </a:xfrm>
+          <a:prstGeom prst="roundRect">
+            <a:avLst/>
+          </a:prstGeom>
+          <a:solidFill>
+            <a:schemeClr val="accent5">
+              <a:lumMod val="50000"/>
+            </a:schemeClr>
+          </a:solidFill>
+        </p:spPr>
+        <p:style>
+          <a:lnRef idx="2">
+            <a:schemeClr val="accent1">
+              <a:shade val="50000"/>
+            </a:schemeClr>
+          </a:lnRef>
+          <a:fillRef idx="1">
+            <a:schemeClr val="accent1"/>
+          </a:fillRef>
+          <a:effectRef idx="0">
+            <a:schemeClr val="accent1"/>
+          </a:effectRef>
+          <a:fontRef idx="minor">
+            <a:schemeClr val="lt1"/>
+          </a:fontRef>
+        </p:style>
+        <p:txBody>
+          <a:bodyPr rtlCol="0" anchor="ctr"/>
+          <a:lstStyle/>
+          <a:p>
+            <a:pPr algn="ctr"/>
+            <a:r>
+              <a:rPr lang="en-US" sz="900" dirty="0" smtClean="0"/>
+              <a:t>H2DB</a:t>
+            </a:r>
+            <a:endParaRPr lang="en-US" sz="900" dirty="0"/>
+          </a:p>
+        </p:txBody>
+      </p:sp>
+      <p:sp>
+        <p:nvSpPr>
+          <p:cNvPr id="23" name="Rounded Rectangle 22"/>
+          <p:cNvSpPr/>
+          <p:nvPr/>
+        </p:nvSpPr>
+        <p:spPr>
+          <a:xfrm>
+            <a:off x="2176732" y="5562600"/>
+            <a:ext cx="762000" cy="304800"/>
+          </a:xfrm>
+          <a:prstGeom prst="roundRect">
+            <a:avLst/>
+          </a:prstGeom>
+          <a:solidFill>
+            <a:schemeClr val="accent5">
+              <a:lumMod val="50000"/>
+            </a:schemeClr>
+          </a:solidFill>
+        </p:spPr>
+        <p:style>
+          <a:lnRef idx="2">
+            <a:schemeClr val="accent1">
+              <a:shade val="50000"/>
+            </a:schemeClr>
+          </a:lnRef>
+          <a:fillRef idx="1">
+            <a:schemeClr val="accent1"/>
+          </a:fillRef>
+          <a:effectRef idx="0">
+            <a:schemeClr val="accent1"/>
+          </a:effectRef>
+          <a:fontRef idx="minor">
+            <a:schemeClr val="lt1"/>
+          </a:fontRef>
+        </p:style>
+        <p:txBody>
+          <a:bodyPr rtlCol="0" anchor="ctr"/>
+          <a:lstStyle/>
+          <a:p>
+            <a:pPr algn="ctr"/>
+            <a:r>
+              <a:rPr lang="en-US" sz="900" dirty="0" smtClean="0"/>
+              <a:t>MySQL</a:t>
+            </a:r>
+            <a:endParaRPr lang="en-US" sz="900" dirty="0"/>
+          </a:p>
+        </p:txBody>
+      </p:sp>
+      <p:sp>
+        <p:nvSpPr>
+          <p:cNvPr id="24" name="Rounded Rectangle 23"/>
+          <p:cNvSpPr/>
+          <p:nvPr/>
+        </p:nvSpPr>
+        <p:spPr>
+          <a:xfrm>
+            <a:off x="6553200" y="4114800"/>
+            <a:ext cx="762000" cy="533400"/>
+          </a:xfrm>
+          <a:prstGeom prst="roundRect">
+            <a:avLst/>
+          </a:prstGeom>
+          <a:solidFill>
+            <a:schemeClr val="accent5">
+              <a:lumMod val="50000"/>
+            </a:schemeClr>
+          </a:solidFill>
+        </p:spPr>
+        <p:style>
+          <a:lnRef idx="2">
+            <a:schemeClr val="accent1">
+              <a:shade val="50000"/>
+            </a:schemeClr>
+          </a:lnRef>
+          <a:fillRef idx="1">
+            <a:schemeClr val="accent1"/>
+          </a:fillRef>
+          <a:effectRef idx="0">
+            <a:schemeClr val="accent1"/>
+          </a:effectRef>
+          <a:fontRef idx="minor">
+            <a:schemeClr val="lt1"/>
+          </a:fontRef>
+        </p:style>
+        <p:txBody>
+          <a:bodyPr rtlCol="0" anchor="ctr"/>
+          <a:lstStyle/>
+          <a:p>
+            <a:pPr algn="ctr"/>
+            <a:r>
+              <a:rPr lang="en-US" sz="900" dirty="0" smtClean="0"/>
+              <a:t>Jetty</a:t>
+            </a:r>
+            <a:endParaRPr lang="en-US" sz="900" dirty="0"/>
+          </a:p>
+        </p:txBody>
+      </p:sp>
+      <p:sp>
+        <p:nvSpPr>
+          <p:cNvPr id="25" name="Rounded Rectangle 24"/>
+          <p:cNvSpPr/>
+          <p:nvPr/>
+        </p:nvSpPr>
+        <p:spPr>
+          <a:xfrm>
+            <a:off x="762000" y="2286000"/>
+            <a:ext cx="7620000" cy="1371600"/>
+          </a:xfrm>
+          <a:prstGeom prst="roundRect">
+            <a:avLst/>
+          </a:prstGeom>
+        </p:spPr>
+        <p:style>
+          <a:lnRef idx="2">
+            <a:schemeClr val="accent1">
+              <a:shade val="50000"/>
+            </a:schemeClr>
+          </a:lnRef>
+          <a:fillRef idx="1">
+            <a:schemeClr val="accent1"/>
+          </a:fillRef>
+          <a:effectRef idx="0">
+            <a:schemeClr val="accent1"/>
+          </a:effectRef>
+          <a:fontRef idx="minor">
+            <a:schemeClr val="lt1"/>
+          </a:fontRef>
+        </p:style>
+        <p:txBody>
+          <a:bodyPr rtlCol="0" anchor="ctr"/>
+          <a:lstStyle/>
+          <a:p>
+            <a:pPr algn="ctr"/>
+            <a:r>
+              <a:rPr lang="en-US" dirty="0" err="1" smtClean="0"/>
+              <a:t>Guice</a:t>
+            </a:r>
+            <a:r>
+              <a:rPr lang="en-US" dirty="0" smtClean="0"/>
+              <a:t> Container</a:t>
+            </a:r>
+            <a:endParaRPr lang="en-US" dirty="0"/>
+          </a:p>
+        </p:txBody>
+      </p:sp>
+      <p:sp>
+        <p:nvSpPr>
+          <p:cNvPr id="26" name="Rounded Rectangle 25"/>
+          <p:cNvSpPr/>
+          <p:nvPr/>
+        </p:nvSpPr>
+        <p:spPr>
+          <a:xfrm>
+            <a:off x="762000" y="1676400"/>
+            <a:ext cx="7620000" cy="437072"/>
+          </a:xfrm>
+          <a:prstGeom prst="roundRect">
+            <a:avLst/>
+          </a:prstGeom>
+        </p:spPr>
+        <p:style>
+          <a:lnRef idx="2">
+            <a:schemeClr val="accent1">
+              <a:shade val="50000"/>
+            </a:schemeClr>
+          </a:lnRef>
+          <a:fillRef idx="1">
+            <a:schemeClr val="accent1"/>
+          </a:fillRef>
+          <a:effectRef idx="0">
+            <a:schemeClr val="accent1"/>
+          </a:effectRef>
+          <a:fontRef idx="minor">
+            <a:schemeClr val="lt1"/>
+          </a:fontRef>
+        </p:style>
+        <p:txBody>
+          <a:bodyPr rtlCol="0" anchor="ctr"/>
+          <a:lstStyle/>
+          <a:p>
+            <a:pPr algn="ctr"/>
+            <a:r>
+              <a:rPr lang="en-US" dirty="0" smtClean="0"/>
+              <a:t>Play Framework</a:t>
+            </a:r>
+            <a:endParaRPr lang="en-US" dirty="0"/>
+          </a:p>
+        </p:txBody>
+      </p:sp>
+      <p:sp>
+        <p:nvSpPr>
+          <p:cNvPr id="27" name="Rounded Rectangle 26"/>
+          <p:cNvSpPr/>
+          <p:nvPr/>
+        </p:nvSpPr>
+        <p:spPr>
+          <a:xfrm>
+            <a:off x="6383547" y="2362200"/>
+            <a:ext cx="762000" cy="381000"/>
+          </a:xfrm>
+          <a:prstGeom prst="roundRect">
+            <a:avLst/>
+          </a:prstGeom>
+          <a:solidFill>
+            <a:schemeClr val="accent5">
+              <a:lumMod val="50000"/>
+            </a:schemeClr>
+          </a:solidFill>
+        </p:spPr>
+        <p:style>
+          <a:lnRef idx="2">
+            <a:schemeClr val="accent1">
+              <a:shade val="50000"/>
+            </a:schemeClr>
+          </a:lnRef>
+          <a:fillRef idx="1">
+            <a:schemeClr val="accent1"/>
+          </a:fillRef>
+          <a:effectRef idx="0">
+            <a:schemeClr val="accent1"/>
+          </a:effectRef>
+          <a:fontRef idx="minor">
+            <a:schemeClr val="lt1"/>
+          </a:fontRef>
+        </p:style>
+        <p:txBody>
+          <a:bodyPr rtlCol="0" anchor="ctr"/>
+          <a:lstStyle/>
+          <a:p>
+            <a:pPr algn="ctr"/>
+            <a:r>
+              <a:rPr lang="en-US" sz="900" dirty="0" smtClean="0"/>
+              <a:t>Open Options</a:t>
+            </a:r>
+            <a:endParaRPr lang="en-US" sz="900" dirty="0"/>
+          </a:p>
+        </p:txBody>
+      </p:sp>
+      <p:sp>
+        <p:nvSpPr>
+          <p:cNvPr id="28" name="Rounded Rectangle 27"/>
+          <p:cNvSpPr/>
+          <p:nvPr/>
+        </p:nvSpPr>
+        <p:spPr>
+          <a:xfrm>
+            <a:off x="6383547" y="2819400"/>
+            <a:ext cx="762000" cy="457200"/>
+          </a:xfrm>
+          <a:prstGeom prst="roundRect">
+            <a:avLst/>
+          </a:prstGeom>
+          <a:solidFill>
+            <a:schemeClr val="accent5">
+              <a:lumMod val="50000"/>
+            </a:schemeClr>
+          </a:solidFill>
+        </p:spPr>
+        <p:style>
+          <a:lnRef idx="2">
+            <a:schemeClr val="accent1">
+              <a:shade val="50000"/>
+            </a:schemeClr>
+          </a:lnRef>
+          <a:fillRef idx="1">
+            <a:schemeClr val="accent1"/>
+          </a:fillRef>
+          <a:effectRef idx="0">
+            <a:schemeClr val="accent1"/>
+          </a:effectRef>
+          <a:fontRef idx="minor">
+            <a:schemeClr val="lt1"/>
+          </a:fontRef>
+        </p:style>
+        <p:txBody>
+          <a:bodyPr rtlCol="0" anchor="ctr"/>
+          <a:lstStyle/>
+          <a:p>
+            <a:pPr algn="ctr"/>
+            <a:r>
+              <a:rPr lang="en-US" sz="900" dirty="0" smtClean="0"/>
+              <a:t>Open Positions</a:t>
+            </a:r>
+            <a:endParaRPr lang="en-US" sz="900" dirty="0"/>
+          </a:p>
+        </p:txBody>
+      </p:sp>
+      <p:sp>
+        <p:nvSpPr>
+          <p:cNvPr id="29" name="Rounded Rectangle 28"/>
+          <p:cNvSpPr/>
+          <p:nvPr/>
+        </p:nvSpPr>
+        <p:spPr>
+          <a:xfrm>
+            <a:off x="7387087" y="2819400"/>
+            <a:ext cx="762000" cy="457200"/>
+          </a:xfrm>
+          <a:prstGeom prst="roundRect">
+            <a:avLst/>
+          </a:prstGeom>
+          <a:solidFill>
+            <a:schemeClr val="accent5">
+              <a:lumMod val="50000"/>
+            </a:schemeClr>
+          </a:solidFill>
+        </p:spPr>
+        <p:style>
+          <a:lnRef idx="2">
+            <a:schemeClr val="accent1">
+              <a:shade val="50000"/>
+            </a:schemeClr>
+          </a:lnRef>
+          <a:fillRef idx="1">
+            <a:schemeClr val="accent1"/>
+          </a:fillRef>
+          <a:effectRef idx="0">
+            <a:schemeClr val="accent1"/>
+          </a:effectRef>
+          <a:fontRef idx="minor">
+            <a:schemeClr val="lt1"/>
+          </a:fontRef>
+        </p:style>
+        <p:txBody>
+          <a:bodyPr rtlCol="0" anchor="ctr"/>
+          <a:lstStyle/>
+          <a:p>
+            <a:pPr algn="ctr"/>
+            <a:r>
+              <a:rPr lang="en-US" sz="900" dirty="0" smtClean="0"/>
+              <a:t>Open Eyes</a:t>
+            </a:r>
+            <a:endParaRPr lang="en-US" sz="900" dirty="0"/>
+          </a:p>
+        </p:txBody>
+      </p:sp>
+      <p:sp>
+        <p:nvSpPr>
+          <p:cNvPr id="30" name="Rounded Rectangle 29"/>
+          <p:cNvSpPr/>
+          <p:nvPr/>
+        </p:nvSpPr>
+        <p:spPr>
+          <a:xfrm>
+            <a:off x="7387087" y="2380891"/>
+            <a:ext cx="762000" cy="381000"/>
+          </a:xfrm>
+          <a:prstGeom prst="roundRect">
+            <a:avLst/>
+          </a:prstGeom>
+          <a:solidFill>
+            <a:schemeClr val="accent5">
+              <a:lumMod val="50000"/>
+            </a:schemeClr>
+          </a:solidFill>
+        </p:spPr>
+        <p:style>
+          <a:lnRef idx="2">
+            <a:schemeClr val="accent1">
+              <a:shade val="50000"/>
+            </a:schemeClr>
+          </a:lnRef>
+          <a:fillRef idx="1">
+            <a:schemeClr val="accent1"/>
+          </a:fillRef>
+          <a:effectRef idx="0">
+            <a:schemeClr val="accent1"/>
+          </a:effectRef>
+          <a:fontRef idx="minor">
+            <a:schemeClr val="lt1"/>
+          </a:fontRef>
+        </p:style>
+        <p:txBody>
+          <a:bodyPr rtlCol="0" anchor="ctr"/>
+          <a:lstStyle/>
+          <a:p>
+            <a:pPr algn="ctr"/>
+            <a:r>
+              <a:rPr lang="en-US" sz="900" dirty="0" smtClean="0"/>
+              <a:t>Open Mind</a:t>
+            </a:r>
+            <a:endParaRPr lang="en-US" sz="900" dirty="0"/>
+          </a:p>
+        </p:txBody>
+      </p:sp>
     </p:spTree>
+    <p:extLst>
+      <p:ext uri="{BB962C8B-B14F-4D97-AF65-F5344CB8AC3E}">
+        <p14:creationId xmlns:p14="http://schemas.microsoft.com/office/powerpoint/2010/main" val="1224603399"/>
+      </p:ext>
+    </p:extLst>
   </p:cSld>
   <p:clrMapOvr>
     <a:masterClrMapping/>
   </p:clrMapOvr>
-  <mc:AlternateContent xmlns:mc="http://schemas.openxmlformats.org/markup-compatibility/2006">
-    <mc:Choice xmlns:p14="http://schemas.microsoft.com/office/powerpoint/2010/main" Requires="p14">
-      <p:transition spd="slow" p14:dur="2000"/>
-    </mc:Choice>
-    <mc:Fallback>
-      <p:transition spd="slow"/>
-    </mc:Fallback>
-  </mc:AlternateContent>
-  <p:timing>
-    <p:tnLst>
-      <p:par>
-        <p:cTn id="1" dur="indefinite" restart="never" nodeType="tmRoot"/>
-      </p:par>
-    </p:tnLst>
-  </p:timing>
 </p:sld>
 </file>
 
@@ -47216,7 +50018,7 @@
           <a:p>
             <a:r>
               <a:rPr lang="en-US" dirty="0" smtClean="0"/>
-              <a:t>Demo</a:t>
+              <a:t>Roadmap</a:t>
             </a:r>
             <a:endParaRPr lang="en-US" dirty="0"/>
           </a:p>
@@ -47232,7 +50034,7 @@
             <p:ph idx="1"/>
             <p:extLst>
               <p:ext uri="{D42A27DB-BD31-4B8C-83A1-F6EECF244321}">
-                <p14:modId xmlns:p14="http://schemas.microsoft.com/office/powerpoint/2010/main" val="828797440"/>
+                <p14:modId xmlns:p14="http://schemas.microsoft.com/office/powerpoint/2010/main" val="2343697102"/>
               </p:ext>
             </p:extLst>
           </p:nvPr>
@@ -47249,91 +50051,48 @@
       </p:graphicFrame>
       <p:sp>
         <p:nvSpPr>
-          <p:cNvPr id="3" name="Rounded Rectangle 2"/>
-          <p:cNvSpPr/>
-          <p:nvPr/>
+          <p:cNvPr id="3" name="Footer Placeholder 2"/>
+          <p:cNvSpPr>
+            <a:spLocks noGrp="1"/>
+          </p:cNvSpPr>
+          <p:nvPr>
+            <p:ph type="ftr" sz="quarter" idx="11"/>
+          </p:nvPr>
         </p:nvSpPr>
-        <p:spPr>
-          <a:xfrm>
-            <a:off x="4572000" y="2763328"/>
-            <a:ext cx="3886200" cy="2514600"/>
-          </a:xfrm>
-          <a:prstGeom prst="roundRect">
-            <a:avLst/>
-          </a:prstGeom>
-          <a:solidFill>
-            <a:srgbClr val="002060">
-              <a:alpha val="59000"/>
-            </a:srgbClr>
-          </a:solidFill>
-        </p:spPr>
-        <p:style>
-          <a:lnRef idx="2">
-            <a:schemeClr val="accent1">
-              <a:shade val="50000"/>
-            </a:schemeClr>
-          </a:lnRef>
-          <a:fillRef idx="1">
-            <a:schemeClr val="accent1"/>
-          </a:fillRef>
-          <a:effectRef idx="0">
-            <a:schemeClr val="accent1"/>
-          </a:effectRef>
-          <a:fontRef idx="minor">
-            <a:schemeClr val="lt1"/>
-          </a:fontRef>
-        </p:style>
+        <p:spPr/>
         <p:txBody>
-          <a:bodyPr rtlCol="0" anchor="ctr"/>
+          <a:bodyPr/>
           <a:lstStyle/>
           <a:p>
-            <a:pPr algn="ctr"/>
-            <a:endParaRPr lang="en-US"/>
+            <a:r>
+              <a:rPr lang="en-MY" smtClean="0"/>
+              <a:t>Copyright (c) 2013 Chetan Gadgil</a:t>
+            </a:r>
+            <a:endParaRPr lang="en-MY"/>
           </a:p>
         </p:txBody>
       </p:sp>
       <p:sp>
         <p:nvSpPr>
-          <p:cNvPr id="5" name="Rounded Rectangle 4"/>
-          <p:cNvSpPr/>
-          <p:nvPr/>
+          <p:cNvPr id="5" name="Slide Number Placeholder 4"/>
+          <p:cNvSpPr>
+            <a:spLocks noGrp="1"/>
+          </p:cNvSpPr>
+          <p:nvPr>
+            <p:ph type="sldNum" sz="quarter" idx="12"/>
+          </p:nvPr>
         </p:nvSpPr>
-        <p:spPr>
-          <a:xfrm>
-            <a:off x="609600" y="2763328"/>
-            <a:ext cx="3962400" cy="2514600"/>
-          </a:xfrm>
-          <a:prstGeom prst="roundRect">
-            <a:avLst/>
-          </a:prstGeom>
-          <a:solidFill>
-            <a:srgbClr val="92D050">
-              <a:alpha val="10000"/>
-            </a:srgbClr>
-          </a:solidFill>
-        </p:spPr>
-        <p:style>
-          <a:lnRef idx="2">
-            <a:schemeClr val="accent1">
-              <a:shade val="50000"/>
-            </a:schemeClr>
-          </a:lnRef>
-          <a:fillRef idx="1">
-            <a:schemeClr val="accent1"/>
-          </a:fillRef>
-          <a:effectRef idx="0">
-            <a:schemeClr val="accent1"/>
-          </a:effectRef>
-          <a:fontRef idx="minor">
-            <a:schemeClr val="lt1"/>
-          </a:fontRef>
-        </p:style>
+        <p:spPr/>
         <p:txBody>
-          <a:bodyPr rtlCol="0" anchor="ctr"/>
+          <a:bodyPr/>
           <a:lstStyle/>
           <a:p>
-            <a:pPr algn="ctr"/>
-            <a:endParaRPr lang="en-US"/>
+            <a:fld id="{CB67D5E6-BE40-49DF-9411-62F59E255471}" type="slidenum">
+              <a:rPr lang="en-MY" smtClean="0"/>
+              <a:pPr/>
+              <a:t>9</a:t>
+            </a:fld>
+            <a:endParaRPr lang="en-MY"/>
           </a:p>
         </p:txBody>
       </p:sp>
@@ -47342,11 +50101,11 @@
   <p:clrMapOvr>
     <a:masterClrMapping/>
   </p:clrMapOvr>
-  <mc:AlternateContent xmlns:mc="http://schemas.openxmlformats.org/markup-compatibility/2006">
-    <mc:Choice xmlns:p14="http://schemas.microsoft.com/office/powerpoint/2010/main" Requires="p14">
+  <mc:AlternateContent xmlns:mc="http://schemas.openxmlformats.org/markup-compatibility/2006" xmlns:p14="http://schemas.microsoft.com/office/powerpoint/2010/main">
+    <mc:Choice Requires="p14">
       <p:transition spd="slow" p14:dur="2000"/>
     </mc:Choice>
-    <mc:Fallback>
+    <mc:Fallback xmlns="">
       <p:transition spd="slow"/>
     </mc:Fallback>
   </mc:AlternateContent>

</xml_diff>